<commit_message>
doc: work on logo for NVIcheckmate
</commit_message>
<xml_diff>
--- a/data-raw/logos.pptx
+++ b/data-raw/logos.pptx
@@ -248,7 +248,7 @@
           <a:p>
             <a:fld id="{09605B3F-6133-425E-A10B-41F9F06FCAC6}" type="datetimeFigureOut">
               <a:rPr lang="nb-NO" smtClean="0"/>
-              <a:t>11.05.2022</a:t>
+              <a:t>13.05.2022</a:t>
             </a:fld>
             <a:endParaRPr lang="nb-NO"/>
           </a:p>
@@ -418,7 +418,7 @@
           <a:p>
             <a:fld id="{09605B3F-6133-425E-A10B-41F9F06FCAC6}" type="datetimeFigureOut">
               <a:rPr lang="nb-NO" smtClean="0"/>
-              <a:t>11.05.2022</a:t>
+              <a:t>13.05.2022</a:t>
             </a:fld>
             <a:endParaRPr lang="nb-NO"/>
           </a:p>
@@ -598,7 +598,7 @@
           <a:p>
             <a:fld id="{09605B3F-6133-425E-A10B-41F9F06FCAC6}" type="datetimeFigureOut">
               <a:rPr lang="nb-NO" smtClean="0"/>
-              <a:t>11.05.2022</a:t>
+              <a:t>13.05.2022</a:t>
             </a:fld>
             <a:endParaRPr lang="nb-NO"/>
           </a:p>
@@ -768,7 +768,7 @@
           <a:p>
             <a:fld id="{09605B3F-6133-425E-A10B-41F9F06FCAC6}" type="datetimeFigureOut">
               <a:rPr lang="nb-NO" smtClean="0"/>
-              <a:t>11.05.2022</a:t>
+              <a:t>13.05.2022</a:t>
             </a:fld>
             <a:endParaRPr lang="nb-NO"/>
           </a:p>
@@ -1014,7 +1014,7 @@
           <a:p>
             <a:fld id="{09605B3F-6133-425E-A10B-41F9F06FCAC6}" type="datetimeFigureOut">
               <a:rPr lang="nb-NO" smtClean="0"/>
-              <a:t>11.05.2022</a:t>
+              <a:t>13.05.2022</a:t>
             </a:fld>
             <a:endParaRPr lang="nb-NO"/>
           </a:p>
@@ -1246,7 +1246,7 @@
           <a:p>
             <a:fld id="{09605B3F-6133-425E-A10B-41F9F06FCAC6}" type="datetimeFigureOut">
               <a:rPr lang="nb-NO" smtClean="0"/>
-              <a:t>11.05.2022</a:t>
+              <a:t>13.05.2022</a:t>
             </a:fld>
             <a:endParaRPr lang="nb-NO"/>
           </a:p>
@@ -1613,7 +1613,7 @@
           <a:p>
             <a:fld id="{09605B3F-6133-425E-A10B-41F9F06FCAC6}" type="datetimeFigureOut">
               <a:rPr lang="nb-NO" smtClean="0"/>
-              <a:t>11.05.2022</a:t>
+              <a:t>13.05.2022</a:t>
             </a:fld>
             <a:endParaRPr lang="nb-NO"/>
           </a:p>
@@ -1731,7 +1731,7 @@
           <a:p>
             <a:fld id="{09605B3F-6133-425E-A10B-41F9F06FCAC6}" type="datetimeFigureOut">
               <a:rPr lang="nb-NO" smtClean="0"/>
-              <a:t>11.05.2022</a:t>
+              <a:t>13.05.2022</a:t>
             </a:fld>
             <a:endParaRPr lang="nb-NO"/>
           </a:p>
@@ -1826,7 +1826,7 @@
           <a:p>
             <a:fld id="{09605B3F-6133-425E-A10B-41F9F06FCAC6}" type="datetimeFigureOut">
               <a:rPr lang="nb-NO" smtClean="0"/>
-              <a:t>11.05.2022</a:t>
+              <a:t>13.05.2022</a:t>
             </a:fld>
             <a:endParaRPr lang="nb-NO"/>
           </a:p>
@@ -2103,7 +2103,7 @@
           <a:p>
             <a:fld id="{09605B3F-6133-425E-A10B-41F9F06FCAC6}" type="datetimeFigureOut">
               <a:rPr lang="nb-NO" smtClean="0"/>
-              <a:t>11.05.2022</a:t>
+              <a:t>13.05.2022</a:t>
             </a:fld>
             <a:endParaRPr lang="nb-NO"/>
           </a:p>
@@ -2356,7 +2356,7 @@
           <a:p>
             <a:fld id="{09605B3F-6133-425E-A10B-41F9F06FCAC6}" type="datetimeFigureOut">
               <a:rPr lang="nb-NO" smtClean="0"/>
-              <a:t>11.05.2022</a:t>
+              <a:t>13.05.2022</a:t>
             </a:fld>
             <a:endParaRPr lang="nb-NO"/>
           </a:p>
@@ -2569,7 +2569,7 @@
           <a:p>
             <a:fld id="{09605B3F-6133-425E-A10B-41F9F06FCAC6}" type="datetimeFigureOut">
               <a:rPr lang="nb-NO" smtClean="0"/>
-              <a:t>11.05.2022</a:t>
+              <a:t>13.05.2022</a:t>
             </a:fld>
             <a:endParaRPr lang="nb-NO"/>
           </a:p>
@@ -13570,7 +13570,7 @@
       </p:sp>
       <p:sp>
         <p:nvSpPr>
-          <p:cNvPr id="31" name="Bue 30"/>
+          <p:cNvPr id="55" name="Bue 54"/>
           <p:cNvSpPr/>
           <p:nvPr/>
         </p:nvSpPr>
@@ -13608,7 +13608,7 @@
       </p:sp>
       <p:sp>
         <p:nvSpPr>
-          <p:cNvPr id="54" name="Bue 53"/>
+          <p:cNvPr id="56" name="Bue 55"/>
           <p:cNvSpPr/>
           <p:nvPr/>
         </p:nvSpPr>
@@ -13644,6 +13644,262 @@
           </a:p>
         </p:txBody>
       </p:sp>
+      <p:sp>
+        <p:nvSpPr>
+          <p:cNvPr id="71" name="Frihåndsform 70"/>
+          <p:cNvSpPr/>
+          <p:nvPr/>
+        </p:nvSpPr>
+        <p:spPr>
+          <a:xfrm rot="1502173">
+            <a:off x="8726205" y="3923147"/>
+            <a:ext cx="1065617" cy="1234565"/>
+          </a:xfrm>
+          <a:custGeom>
+            <a:avLst/>
+            <a:gdLst>
+              <a:gd name="connsiteX0" fmla="*/ 50084 w 1065617"/>
+              <a:gd name="connsiteY0" fmla="*/ 0 h 1234565"/>
+              <a:gd name="connsiteX1" fmla="*/ 1065617 w 1065617"/>
+              <a:gd name="connsiteY1" fmla="*/ 849948 h 1234565"/>
+              <a:gd name="connsiteX2" fmla="*/ 743714 w 1065617"/>
+              <a:gd name="connsiteY2" fmla="*/ 1234565 h 1234565"/>
+              <a:gd name="connsiteX3" fmla="*/ 50084 w 1065617"/>
+              <a:gd name="connsiteY3" fmla="*/ 0 h 1234565"/>
+            </a:gdLst>
+            <a:ahLst/>
+            <a:cxnLst>
+              <a:cxn ang="0">
+                <a:pos x="connsiteX0" y="connsiteY0"/>
+              </a:cxn>
+              <a:cxn ang="0">
+                <a:pos x="connsiteX1" y="connsiteY1"/>
+              </a:cxn>
+              <a:cxn ang="0">
+                <a:pos x="connsiteX2" y="connsiteY2"/>
+              </a:cxn>
+              <a:cxn ang="0">
+                <a:pos x="connsiteX3" y="connsiteY3"/>
+              </a:cxn>
+            </a:cxnLst>
+            <a:rect l="l" t="t" r="r" b="b"/>
+            <a:pathLst>
+              <a:path w="1065617" h="1234565">
+                <a:moveTo>
+                  <a:pt x="50084" y="0"/>
+                </a:moveTo>
+                <a:lnTo>
+                  <a:pt x="1065617" y="849948"/>
+                </a:lnTo>
+                <a:lnTo>
+                  <a:pt x="743714" y="1234565"/>
+                </a:lnTo>
+                <a:cubicBezTo>
+                  <a:pt x="182850" y="765152"/>
+                  <a:pt x="-127699" y="212417"/>
+                  <a:pt x="50084" y="0"/>
+                </a:cubicBezTo>
+                <a:close/>
+              </a:path>
+            </a:pathLst>
+          </a:custGeom>
+          <a:solidFill>
+            <a:srgbClr val="133E4D"/>
+          </a:solidFill>
+          <a:ln>
+            <a:solidFill>
+              <a:srgbClr val="133E4D"/>
+            </a:solidFill>
+          </a:ln>
+        </p:spPr>
+        <p:style>
+          <a:lnRef idx="1">
+            <a:schemeClr val="accent1"/>
+          </a:lnRef>
+          <a:fillRef idx="0">
+            <a:schemeClr val="accent1"/>
+          </a:fillRef>
+          <a:effectRef idx="0">
+            <a:schemeClr val="accent1"/>
+          </a:effectRef>
+          <a:fontRef idx="minor">
+            <a:schemeClr val="tx1"/>
+          </a:fontRef>
+        </p:style>
+        <p:txBody>
+          <a:bodyPr wrap="square" rtlCol="0" anchor="ctr">
+            <a:noAutofit/>
+          </a:bodyPr>
+          <a:lstStyle/>
+          <a:p>
+            <a:pPr algn="ctr"/>
+            <a:endParaRPr lang="nb-NO"/>
+          </a:p>
+        </p:txBody>
+      </p:sp>
+      <p:sp>
+        <p:nvSpPr>
+          <p:cNvPr id="70" name="Frihåndsform 69"/>
+          <p:cNvSpPr/>
+          <p:nvPr/>
+        </p:nvSpPr>
+        <p:spPr>
+          <a:xfrm rot="1502173">
+            <a:off x="7783624" y="3820774"/>
+            <a:ext cx="501551" cy="1324281"/>
+          </a:xfrm>
+          <a:custGeom>
+            <a:avLst/>
+            <a:gdLst>
+              <a:gd name="connsiteX0" fmla="*/ 0 w 501551"/>
+              <a:gd name="connsiteY0" fmla="*/ 0 h 1324281"/>
+              <a:gd name="connsiteX1" fmla="*/ 501551 w 501551"/>
+              <a:gd name="connsiteY1" fmla="*/ 1324281 h 1324281"/>
+              <a:gd name="connsiteX2" fmla="*/ 0 w 501551"/>
+              <a:gd name="connsiteY2" fmla="*/ 1324281 h 1324281"/>
+              <a:gd name="connsiteX3" fmla="*/ 0 w 501551"/>
+              <a:gd name="connsiteY3" fmla="*/ 0 h 1324281"/>
+            </a:gdLst>
+            <a:ahLst/>
+            <a:cxnLst>
+              <a:cxn ang="0">
+                <a:pos x="connsiteX0" y="connsiteY0"/>
+              </a:cxn>
+              <a:cxn ang="0">
+                <a:pos x="connsiteX1" y="connsiteY1"/>
+              </a:cxn>
+              <a:cxn ang="0">
+                <a:pos x="connsiteX2" y="connsiteY2"/>
+              </a:cxn>
+              <a:cxn ang="0">
+                <a:pos x="connsiteX3" y="connsiteY3"/>
+              </a:cxn>
+            </a:cxnLst>
+            <a:rect l="l" t="t" r="r" b="b"/>
+            <a:pathLst>
+              <a:path w="501551" h="1324281">
+                <a:moveTo>
+                  <a:pt x="0" y="0"/>
+                </a:moveTo>
+                <a:cubicBezTo>
+                  <a:pt x="276998" y="0"/>
+                  <a:pt x="501550" y="592901"/>
+                  <a:pt x="501551" y="1324281"/>
+                </a:cubicBezTo>
+                <a:lnTo>
+                  <a:pt x="0" y="1324281"/>
+                </a:lnTo>
+                <a:lnTo>
+                  <a:pt x="0" y="0"/>
+                </a:lnTo>
+                <a:close/>
+              </a:path>
+            </a:pathLst>
+          </a:custGeom>
+          <a:solidFill>
+            <a:srgbClr val="133E4D"/>
+          </a:solidFill>
+          <a:ln>
+            <a:solidFill>
+              <a:srgbClr val="133E4D"/>
+            </a:solidFill>
+          </a:ln>
+        </p:spPr>
+        <p:style>
+          <a:lnRef idx="1">
+            <a:schemeClr val="accent1"/>
+          </a:lnRef>
+          <a:fillRef idx="0">
+            <a:schemeClr val="accent1"/>
+          </a:fillRef>
+          <a:effectRef idx="0">
+            <a:schemeClr val="accent1"/>
+          </a:effectRef>
+          <a:fontRef idx="minor">
+            <a:schemeClr val="tx1"/>
+          </a:fontRef>
+        </p:style>
+        <p:txBody>
+          <a:bodyPr wrap="square" rtlCol="0" anchor="ctr">
+            <a:noAutofit/>
+          </a:bodyPr>
+          <a:lstStyle/>
+          <a:p>
+            <a:pPr algn="ctr"/>
+            <a:endParaRPr lang="nb-NO"/>
+          </a:p>
+        </p:txBody>
+      </p:sp>
+      <p:cxnSp>
+        <p:nvCxnSpPr>
+          <p:cNvPr id="46" name="Rett linje 45"/>
+          <p:cNvCxnSpPr/>
+          <p:nvPr/>
+        </p:nvCxnSpPr>
+        <p:spPr>
+          <a:xfrm flipV="1">
+            <a:off x="8087398" y="3776862"/>
+            <a:ext cx="995476" cy="1"/>
+          </a:xfrm>
+          <a:prstGeom prst="line">
+            <a:avLst/>
+          </a:prstGeom>
+          <a:ln>
+            <a:solidFill>
+              <a:srgbClr val="979EA6"/>
+            </a:solidFill>
+          </a:ln>
+        </p:spPr>
+        <p:style>
+          <a:lnRef idx="1">
+            <a:schemeClr val="accent1"/>
+          </a:lnRef>
+          <a:fillRef idx="0">
+            <a:schemeClr val="accent1"/>
+          </a:fillRef>
+          <a:effectRef idx="0">
+            <a:schemeClr val="accent1"/>
+          </a:effectRef>
+          <a:fontRef idx="minor">
+            <a:schemeClr val="tx1"/>
+          </a:fontRef>
+        </p:style>
+      </p:cxnSp>
+      <p:cxnSp>
+        <p:nvCxnSpPr>
+          <p:cNvPr id="58" name="Rett linje 57"/>
+          <p:cNvCxnSpPr/>
+          <p:nvPr/>
+        </p:nvCxnSpPr>
+        <p:spPr>
+          <a:xfrm flipV="1">
+            <a:off x="7981398" y="5188965"/>
+            <a:ext cx="1207476" cy="1"/>
+          </a:xfrm>
+          <a:prstGeom prst="line">
+            <a:avLst/>
+          </a:prstGeom>
+          <a:ln>
+            <a:solidFill>
+              <a:srgbClr val="979EA6"/>
+            </a:solidFill>
+          </a:ln>
+        </p:spPr>
+        <p:style>
+          <a:lnRef idx="1">
+            <a:schemeClr val="accent1"/>
+          </a:lnRef>
+          <a:fillRef idx="0">
+            <a:schemeClr val="accent1"/>
+          </a:fillRef>
+          <a:effectRef idx="0">
+            <a:schemeClr val="accent1"/>
+          </a:effectRef>
+          <a:fontRef idx="minor">
+            <a:schemeClr val="tx1"/>
+          </a:fontRef>
+        </p:style>
+      </p:cxnSp>
     </p:spTree>
     <p:extLst>
       <p:ext uri="{BB962C8B-B14F-4D97-AF65-F5344CB8AC3E}">
@@ -16025,6 +16281,21 @@
 </file>
 
 <file path=customXml/item1.xml><?xml version="1.0" encoding="utf-8"?>
+<p:properties xmlns:p="http://schemas.microsoft.com/office/2006/metadata/properties" xmlns:xsi="http://www.w3.org/2001/XMLSchema-instance" xmlns:pc="http://schemas.microsoft.com/office/infopath/2007/PartnerControls">
+  <documentManagement/>
+</p:properties>
+</file>
+
+<file path=customXml/item2.xml><?xml version="1.0" encoding="utf-8"?>
+<?mso-contentType ?>
+<FormTemplates xmlns="http://schemas.microsoft.com/sharepoint/v3/contenttype/forms">
+  <Display>DocumentLibraryForm</Display>
+  <Edit>DocumentLibraryForm</Edit>
+  <New>DocumentLibraryForm</New>
+</FormTemplates>
+</file>
+
+<file path=customXml/item3.xml><?xml version="1.0" encoding="utf-8"?>
 <ct:contentTypeSchema xmlns:ct="http://schemas.microsoft.com/office/2006/metadata/contentType" xmlns:ma="http://schemas.microsoft.com/office/2006/metadata/properties/metaAttributes" ct:_="" ma:_="" ma:contentTypeName="Dokument" ma:contentTypeID="0x0101004E8DCD7061C9614189F6D0F57B1C8645" ma:contentTypeVersion="9" ma:contentTypeDescription="Opprett et nytt dokument." ma:contentTypeScope="" ma:versionID="d59b8845ebd1283ad3bf6a548e8d2471">
   <xsd:schema xmlns:xsd="http://www.w3.org/2001/XMLSchema" xmlns:xs="http://www.w3.org/2001/XMLSchema" xmlns:p="http://schemas.microsoft.com/office/2006/metadata/properties" xmlns:ns3="077b9b9c-7f67-45a8-98b7-b654137cbace" targetNamespace="http://schemas.microsoft.com/office/2006/metadata/properties" ma:root="true" ma:fieldsID="972a228023c3d388b754ae5803fd6dc7" ns3:_="">
     <xsd:import namespace="077b9b9c-7f67-45a8-98b7-b654137cbace"/>
@@ -16202,22 +16473,31 @@
 </ct:contentTypeSchema>
 </file>
 
-<file path=customXml/item2.xml><?xml version="1.0" encoding="utf-8"?>
-<?mso-contentType ?>
-<FormTemplates xmlns="http://schemas.microsoft.com/sharepoint/v3/contenttype/forms">
-  <Display>DocumentLibraryForm</Display>
-  <Edit>DocumentLibraryForm</Edit>
-  <New>DocumentLibraryForm</New>
-</FormTemplates>
+<file path=customXml/itemProps1.xml><?xml version="1.0" encoding="utf-8"?>
+<ds:datastoreItem xmlns:ds="http://schemas.openxmlformats.org/officeDocument/2006/customXml" ds:itemID="{7DEC415D-4AD5-4872-9DD1-7B94914CAE4D}">
+  <ds:schemaRefs>
+    <ds:schemaRef ds:uri="http://purl.org/dc/elements/1.1/"/>
+    <ds:schemaRef ds:uri="http://schemas.microsoft.com/office/2006/metadata/properties"/>
+    <ds:schemaRef ds:uri="http://schemas.microsoft.com/office/2006/documentManagement/types"/>
+    <ds:schemaRef ds:uri="http://schemas.openxmlformats.org/package/2006/metadata/core-properties"/>
+    <ds:schemaRef ds:uri="077b9b9c-7f67-45a8-98b7-b654137cbace"/>
+    <ds:schemaRef ds:uri="http://purl.org/dc/dcmitype/"/>
+    <ds:schemaRef ds:uri="http://schemas.microsoft.com/office/infopath/2007/PartnerControls"/>
+    <ds:schemaRef ds:uri="http://www.w3.org/XML/1998/namespace"/>
+    <ds:schemaRef ds:uri="http://purl.org/dc/terms/"/>
+  </ds:schemaRefs>
+</ds:datastoreItem>
 </file>
 
-<file path=customXml/item3.xml><?xml version="1.0" encoding="utf-8"?>
-<p:properties xmlns:p="http://schemas.microsoft.com/office/2006/metadata/properties" xmlns:xsi="http://www.w3.org/2001/XMLSchema-instance" xmlns:pc="http://schemas.microsoft.com/office/infopath/2007/PartnerControls">
-  <documentManagement/>
-</p:properties>
+<file path=customXml/itemProps2.xml><?xml version="1.0" encoding="utf-8"?>
+<ds:datastoreItem xmlns:ds="http://schemas.openxmlformats.org/officeDocument/2006/customXml" ds:itemID="{4BE7E9B0-0351-4956-BF80-844462B099ED}">
+  <ds:schemaRefs>
+    <ds:schemaRef ds:uri="http://schemas.microsoft.com/sharepoint/v3/contenttype/forms"/>
+  </ds:schemaRefs>
+</ds:datastoreItem>
 </file>
 
-<file path=customXml/itemProps1.xml><?xml version="1.0" encoding="utf-8"?>
+<file path=customXml/itemProps3.xml><?xml version="1.0" encoding="utf-8"?>
 <ds:datastoreItem xmlns:ds="http://schemas.openxmlformats.org/officeDocument/2006/customXml" ds:itemID="{A3A0C07D-31B7-4057-9C9C-1ED42245A98F}">
   <ds:schemaRefs>
     <ds:schemaRef ds:uri="http://schemas.microsoft.com/office/2006/metadata/contentType"/>
@@ -16233,28 +16513,4 @@
     <ds:schemaRef ds:uri="http://schemas.microsoft.com/internal/obd"/>
   </ds:schemaRefs>
 </ds:datastoreItem>
-</file>
-
-<file path=customXml/itemProps2.xml><?xml version="1.0" encoding="utf-8"?>
-<ds:datastoreItem xmlns:ds="http://schemas.openxmlformats.org/officeDocument/2006/customXml" ds:itemID="{4BE7E9B0-0351-4956-BF80-844462B099ED}">
-  <ds:schemaRefs>
-    <ds:schemaRef ds:uri="http://schemas.microsoft.com/sharepoint/v3/contenttype/forms"/>
-  </ds:schemaRefs>
-</ds:datastoreItem>
-</file>
-
-<file path=customXml/itemProps3.xml><?xml version="1.0" encoding="utf-8"?>
-<ds:datastoreItem xmlns:ds="http://schemas.openxmlformats.org/officeDocument/2006/customXml" ds:itemID="{7DEC415D-4AD5-4872-9DD1-7B94914CAE4D}">
-  <ds:schemaRefs>
-    <ds:schemaRef ds:uri="http://purl.org/dc/elements/1.1/"/>
-    <ds:schemaRef ds:uri="http://schemas.microsoft.com/office/2006/metadata/properties"/>
-    <ds:schemaRef ds:uri="http://schemas.microsoft.com/office/2006/documentManagement/types"/>
-    <ds:schemaRef ds:uri="http://schemas.openxmlformats.org/package/2006/metadata/core-properties"/>
-    <ds:schemaRef ds:uri="077b9b9c-7f67-45a8-98b7-b654137cbace"/>
-    <ds:schemaRef ds:uri="http://purl.org/dc/dcmitype/"/>
-    <ds:schemaRef ds:uri="http://schemas.microsoft.com/office/infopath/2007/PartnerControls"/>
-    <ds:schemaRef ds:uri="http://www.w3.org/XML/1998/namespace"/>
-    <ds:schemaRef ds:uri="http://purl.org/dc/terms/"/>
-  </ds:schemaRefs>
-</ds:datastoreItem>
 </file>
</xml_diff>

<commit_message>
feat: Created logo for NVIcheckmate
</commit_message>
<xml_diff>
--- a/data-raw/logos.pptx
+++ b/data-raw/logos.pptx
@@ -111,7 +111,18 @@
   </p:defaultTextStyle>
   <p:extLst>
     <p:ext uri="{EFAFB233-063F-42B5-8137-9DF3F51BA10A}">
-      <p15:sldGuideLst xmlns:p15="http://schemas.microsoft.com/office/powerpoint/2012/main"/>
+      <p15:sldGuideLst xmlns:p15="http://schemas.microsoft.com/office/powerpoint/2012/main">
+        <p15:guide id="1" orient="horz" pos="2160" userDrawn="1">
+          <p15:clr>
+            <a:srgbClr val="A4A3A4"/>
+          </p15:clr>
+        </p15:guide>
+        <p15:guide id="2" pos="3840" userDrawn="1">
+          <p15:clr>
+            <a:srgbClr val="A4A3A4"/>
+          </p15:clr>
+        </p15:guide>
+      </p15:sldGuideLst>
     </p:ext>
   </p:extLst>
 </p:presentation>
@@ -248,7 +259,7 @@
           <a:p>
             <a:fld id="{09605B3F-6133-425E-A10B-41F9F06FCAC6}" type="datetimeFigureOut">
               <a:rPr lang="nb-NO" smtClean="0"/>
-              <a:t>13.05.2022</a:t>
+              <a:t>18.05.2022</a:t>
             </a:fld>
             <a:endParaRPr lang="nb-NO"/>
           </a:p>
@@ -418,7 +429,7 @@
           <a:p>
             <a:fld id="{09605B3F-6133-425E-A10B-41F9F06FCAC6}" type="datetimeFigureOut">
               <a:rPr lang="nb-NO" smtClean="0"/>
-              <a:t>13.05.2022</a:t>
+              <a:t>18.05.2022</a:t>
             </a:fld>
             <a:endParaRPr lang="nb-NO"/>
           </a:p>
@@ -598,7 +609,7 @@
           <a:p>
             <a:fld id="{09605B3F-6133-425E-A10B-41F9F06FCAC6}" type="datetimeFigureOut">
               <a:rPr lang="nb-NO" smtClean="0"/>
-              <a:t>13.05.2022</a:t>
+              <a:t>18.05.2022</a:t>
             </a:fld>
             <a:endParaRPr lang="nb-NO"/>
           </a:p>
@@ -768,7 +779,7 @@
           <a:p>
             <a:fld id="{09605B3F-6133-425E-A10B-41F9F06FCAC6}" type="datetimeFigureOut">
               <a:rPr lang="nb-NO" smtClean="0"/>
-              <a:t>13.05.2022</a:t>
+              <a:t>18.05.2022</a:t>
             </a:fld>
             <a:endParaRPr lang="nb-NO"/>
           </a:p>
@@ -1014,7 +1025,7 @@
           <a:p>
             <a:fld id="{09605B3F-6133-425E-A10B-41F9F06FCAC6}" type="datetimeFigureOut">
               <a:rPr lang="nb-NO" smtClean="0"/>
-              <a:t>13.05.2022</a:t>
+              <a:t>18.05.2022</a:t>
             </a:fld>
             <a:endParaRPr lang="nb-NO"/>
           </a:p>
@@ -1246,7 +1257,7 @@
           <a:p>
             <a:fld id="{09605B3F-6133-425E-A10B-41F9F06FCAC6}" type="datetimeFigureOut">
               <a:rPr lang="nb-NO" smtClean="0"/>
-              <a:t>13.05.2022</a:t>
+              <a:t>18.05.2022</a:t>
             </a:fld>
             <a:endParaRPr lang="nb-NO"/>
           </a:p>
@@ -1613,7 +1624,7 @@
           <a:p>
             <a:fld id="{09605B3F-6133-425E-A10B-41F9F06FCAC6}" type="datetimeFigureOut">
               <a:rPr lang="nb-NO" smtClean="0"/>
-              <a:t>13.05.2022</a:t>
+              <a:t>18.05.2022</a:t>
             </a:fld>
             <a:endParaRPr lang="nb-NO"/>
           </a:p>
@@ -1731,7 +1742,7 @@
           <a:p>
             <a:fld id="{09605B3F-6133-425E-A10B-41F9F06FCAC6}" type="datetimeFigureOut">
               <a:rPr lang="nb-NO" smtClean="0"/>
-              <a:t>13.05.2022</a:t>
+              <a:t>18.05.2022</a:t>
             </a:fld>
             <a:endParaRPr lang="nb-NO"/>
           </a:p>
@@ -1826,7 +1837,7 @@
           <a:p>
             <a:fld id="{09605B3F-6133-425E-A10B-41F9F06FCAC6}" type="datetimeFigureOut">
               <a:rPr lang="nb-NO" smtClean="0"/>
-              <a:t>13.05.2022</a:t>
+              <a:t>18.05.2022</a:t>
             </a:fld>
             <a:endParaRPr lang="nb-NO"/>
           </a:p>
@@ -2103,7 +2114,7 @@
           <a:p>
             <a:fld id="{09605B3F-6133-425E-A10B-41F9F06FCAC6}" type="datetimeFigureOut">
               <a:rPr lang="nb-NO" smtClean="0"/>
-              <a:t>13.05.2022</a:t>
+              <a:t>18.05.2022</a:t>
             </a:fld>
             <a:endParaRPr lang="nb-NO"/>
           </a:p>
@@ -2356,7 +2367,7 @@
           <a:p>
             <a:fld id="{09605B3F-6133-425E-A10B-41F9F06FCAC6}" type="datetimeFigureOut">
               <a:rPr lang="nb-NO" smtClean="0"/>
-              <a:t>13.05.2022</a:t>
+              <a:t>18.05.2022</a:t>
             </a:fld>
             <a:endParaRPr lang="nb-NO"/>
           </a:p>
@@ -2569,7 +2580,7 @@
           <a:p>
             <a:fld id="{09605B3F-6133-425E-A10B-41F9F06FCAC6}" type="datetimeFigureOut">
               <a:rPr lang="nb-NO" smtClean="0"/>
-              <a:t>13.05.2022</a:t>
+              <a:t>18.05.2022</a:t>
             </a:fld>
             <a:endParaRPr lang="nb-NO"/>
           </a:p>
@@ -8477,6 +8488,13 @@
   <p:clrMapOvr>
     <a:masterClrMapping/>
   </p:clrMapOvr>
+  <p:timing>
+    <p:tnLst>
+      <p:par>
+        <p:cTn id="1" dur="indefinite" restart="never" nodeType="tmRoot"/>
+      </p:par>
+    </p:tnLst>
+  </p:timing>
 </p:sld>
 </file>
 
@@ -11785,6 +11803,13 @@
   <p:clrMapOvr>
     <a:masterClrMapping/>
   </p:clrMapOvr>
+  <p:timing>
+    <p:tnLst>
+      <p:par>
+        <p:cTn id="1" dur="indefinite" restart="never" nodeType="tmRoot"/>
+      </p:par>
+    </p:tnLst>
+  </p:timing>
 </p:sld>
 </file>
 
@@ -11807,13 +11832,13 @@
       </p:grpSpPr>
       <p:grpSp>
         <p:nvGrpSpPr>
-          <p:cNvPr id="53" name="Gruppe 52"/>
+          <p:cNvPr id="92" name="Gruppe 91"/>
           <p:cNvGrpSpPr/>
           <p:nvPr/>
         </p:nvGrpSpPr>
         <p:grpSpPr>
           <a:xfrm>
-            <a:off x="4117500" y="2122800"/>
+            <a:off x="4735200" y="2244483"/>
             <a:ext cx="2721600" cy="2369033"/>
             <a:chOff x="4117500" y="2122800"/>
             <a:chExt cx="2721600" cy="2369033"/>
@@ -11881,1527 +11906,6 @@
             </a:p>
           </p:txBody>
         </p:sp>
-        <p:grpSp>
-          <p:nvGrpSpPr>
-            <p:cNvPr id="52" name="Gruppe 51"/>
-            <p:cNvGrpSpPr/>
-            <p:nvPr/>
-          </p:nvGrpSpPr>
-          <p:grpSpPr>
-            <a:xfrm>
-              <a:off x="4703028" y="2957472"/>
-              <a:ext cx="630656" cy="791472"/>
-              <a:chOff x="4727412" y="2987952"/>
-              <a:chExt cx="630656" cy="791472"/>
-            </a:xfrm>
-          </p:grpSpPr>
-          <p:sp>
-            <p:nvSpPr>
-              <p:cNvPr id="4" name="Rektangel 3"/>
-              <p:cNvSpPr/>
-              <p:nvPr/>
-            </p:nvSpPr>
-            <p:spPr>
-              <a:xfrm flipH="1">
-                <a:off x="4727413" y="3114082"/>
-                <a:ext cx="630655" cy="551508"/>
-              </a:xfrm>
-              <a:prstGeom prst="rect">
-                <a:avLst/>
-              </a:prstGeom>
-              <a:solidFill>
-                <a:srgbClr val="DE2212"/>
-              </a:solidFill>
-              <a:ln w="28575">
-                <a:solidFill>
-                  <a:srgbClr val="DE2212"/>
-                </a:solidFill>
-              </a:ln>
-            </p:spPr>
-            <p:style>
-              <a:lnRef idx="2">
-                <a:schemeClr val="accent1">
-                  <a:shade val="50000"/>
-                </a:schemeClr>
-              </a:lnRef>
-              <a:fillRef idx="1">
-                <a:schemeClr val="accent1"/>
-              </a:fillRef>
-              <a:effectRef idx="0">
-                <a:schemeClr val="accent1"/>
-              </a:effectRef>
-              <a:fontRef idx="minor">
-                <a:schemeClr val="lt1"/>
-              </a:fontRef>
-            </p:style>
-            <p:txBody>
-              <a:bodyPr rtlCol="0" anchor="ctr"/>
-              <a:lstStyle/>
-              <a:p>
-                <a:pPr algn="ctr"/>
-                <a:endParaRPr lang="nb-NO"/>
-              </a:p>
-            </p:txBody>
-          </p:sp>
-          <p:grpSp>
-            <p:nvGrpSpPr>
-              <p:cNvPr id="5" name="Gruppe 4"/>
-              <p:cNvGrpSpPr/>
-              <p:nvPr/>
-            </p:nvGrpSpPr>
-            <p:grpSpPr>
-              <a:xfrm flipH="1">
-                <a:off x="4727412" y="3347424"/>
-                <a:ext cx="630655" cy="252263"/>
-                <a:chOff x="3845167" y="2086704"/>
-                <a:chExt cx="2473571" cy="937849"/>
-              </a:xfrm>
-              <a:solidFill>
-                <a:srgbClr val="DE2212"/>
-              </a:solidFill>
-            </p:grpSpPr>
-            <p:sp>
-              <p:nvSpPr>
-                <p:cNvPr id="15" name="Bue 14"/>
-                <p:cNvSpPr/>
-                <p:nvPr/>
-              </p:nvSpPr>
-              <p:spPr>
-                <a:xfrm flipV="1">
-                  <a:off x="3845167" y="2086708"/>
-                  <a:ext cx="2473571" cy="937845"/>
-                </a:xfrm>
-                <a:prstGeom prst="arc">
-                  <a:avLst/>
-                </a:prstGeom>
-                <a:grpFill/>
-                <a:ln w="28575">
-                  <a:solidFill>
-                    <a:schemeClr val="bg2"/>
-                  </a:solidFill>
-                </a:ln>
-              </p:spPr>
-              <p:style>
-                <a:lnRef idx="1">
-                  <a:schemeClr val="accent1"/>
-                </a:lnRef>
-                <a:fillRef idx="0">
-                  <a:schemeClr val="accent1"/>
-                </a:fillRef>
-                <a:effectRef idx="0">
-                  <a:schemeClr val="accent1"/>
-                </a:effectRef>
-                <a:fontRef idx="minor">
-                  <a:schemeClr val="tx1"/>
-                </a:fontRef>
-              </p:style>
-              <p:txBody>
-                <a:bodyPr rtlCol="0" anchor="ctr"/>
-                <a:lstStyle/>
-                <a:p>
-                  <a:pPr algn="ctr"/>
-                  <a:endParaRPr lang="nb-NO"/>
-                </a:p>
-              </p:txBody>
-            </p:sp>
-            <p:sp>
-              <p:nvSpPr>
-                <p:cNvPr id="16" name="Bue 15"/>
-                <p:cNvSpPr/>
-                <p:nvPr/>
-              </p:nvSpPr>
-              <p:spPr>
-                <a:xfrm flipH="1" flipV="1">
-                  <a:off x="3845167" y="2086704"/>
-                  <a:ext cx="2473571" cy="937845"/>
-                </a:xfrm>
-                <a:prstGeom prst="arc">
-                  <a:avLst/>
-                </a:prstGeom>
-                <a:grpFill/>
-                <a:ln w="28575">
-                  <a:solidFill>
-                    <a:schemeClr val="bg2"/>
-                  </a:solidFill>
-                </a:ln>
-              </p:spPr>
-              <p:style>
-                <a:lnRef idx="1">
-                  <a:schemeClr val="accent1"/>
-                </a:lnRef>
-                <a:fillRef idx="0">
-                  <a:schemeClr val="accent1"/>
-                </a:fillRef>
-                <a:effectRef idx="0">
-                  <a:schemeClr val="accent1"/>
-                </a:effectRef>
-                <a:fontRef idx="minor">
-                  <a:schemeClr val="tx1"/>
-                </a:fontRef>
-              </p:style>
-              <p:txBody>
-                <a:bodyPr rtlCol="0" anchor="ctr"/>
-                <a:lstStyle/>
-                <a:p>
-                  <a:pPr algn="ctr"/>
-                  <a:endParaRPr lang="nb-NO"/>
-                </a:p>
-              </p:txBody>
-            </p:sp>
-          </p:grpSp>
-          <p:grpSp>
-            <p:nvGrpSpPr>
-              <p:cNvPr id="6" name="Gruppe 5"/>
-              <p:cNvGrpSpPr/>
-              <p:nvPr/>
-            </p:nvGrpSpPr>
-            <p:grpSpPr>
-              <a:xfrm flipH="1">
-                <a:off x="4727413" y="3527161"/>
-                <a:ext cx="630655" cy="252263"/>
-                <a:chOff x="3845167" y="2086704"/>
-                <a:chExt cx="2473571" cy="937849"/>
-              </a:xfrm>
-              <a:solidFill>
-                <a:srgbClr val="DE2212"/>
-              </a:solidFill>
-            </p:grpSpPr>
-            <p:sp>
-              <p:nvSpPr>
-                <p:cNvPr id="13" name="Bue 12"/>
-                <p:cNvSpPr/>
-                <p:nvPr/>
-              </p:nvSpPr>
-              <p:spPr>
-                <a:xfrm flipV="1">
-                  <a:off x="3845167" y="2086708"/>
-                  <a:ext cx="2473571" cy="937845"/>
-                </a:xfrm>
-                <a:prstGeom prst="arc">
-                  <a:avLst/>
-                </a:prstGeom>
-                <a:grpFill/>
-                <a:ln w="28575">
-                  <a:solidFill>
-                    <a:schemeClr val="bg2"/>
-                  </a:solidFill>
-                </a:ln>
-              </p:spPr>
-              <p:style>
-                <a:lnRef idx="1">
-                  <a:schemeClr val="accent1"/>
-                </a:lnRef>
-                <a:fillRef idx="0">
-                  <a:schemeClr val="accent1"/>
-                </a:fillRef>
-                <a:effectRef idx="0">
-                  <a:schemeClr val="accent1"/>
-                </a:effectRef>
-                <a:fontRef idx="minor">
-                  <a:schemeClr val="tx1"/>
-                </a:fontRef>
-              </p:style>
-              <p:txBody>
-                <a:bodyPr rtlCol="0" anchor="ctr"/>
-                <a:lstStyle/>
-                <a:p>
-                  <a:pPr algn="ctr"/>
-                  <a:endParaRPr lang="nb-NO"/>
-                </a:p>
-              </p:txBody>
-            </p:sp>
-            <p:sp>
-              <p:nvSpPr>
-                <p:cNvPr id="14" name="Bue 13"/>
-                <p:cNvSpPr/>
-                <p:nvPr/>
-              </p:nvSpPr>
-              <p:spPr>
-                <a:xfrm flipH="1" flipV="1">
-                  <a:off x="3845167" y="2086704"/>
-                  <a:ext cx="2473571" cy="937845"/>
-                </a:xfrm>
-                <a:prstGeom prst="arc">
-                  <a:avLst/>
-                </a:prstGeom>
-                <a:grpFill/>
-                <a:ln w="28575">
-                  <a:solidFill>
-                    <a:schemeClr val="bg2"/>
-                  </a:solidFill>
-                </a:ln>
-              </p:spPr>
-              <p:style>
-                <a:lnRef idx="1">
-                  <a:schemeClr val="accent1"/>
-                </a:lnRef>
-                <a:fillRef idx="0">
-                  <a:schemeClr val="accent1"/>
-                </a:fillRef>
-                <a:effectRef idx="0">
-                  <a:schemeClr val="accent1"/>
-                </a:effectRef>
-                <a:fontRef idx="minor">
-                  <a:schemeClr val="tx1"/>
-                </a:fontRef>
-              </p:style>
-              <p:txBody>
-                <a:bodyPr rtlCol="0" anchor="ctr"/>
-                <a:lstStyle/>
-                <a:p>
-                  <a:pPr algn="ctr"/>
-                  <a:endParaRPr lang="nb-NO"/>
-                </a:p>
-              </p:txBody>
-            </p:sp>
-          </p:grpSp>
-          <p:sp>
-            <p:nvSpPr>
-              <p:cNvPr id="7" name="Ellipse 6"/>
-              <p:cNvSpPr/>
-              <p:nvPr/>
-            </p:nvSpPr>
-            <p:spPr>
-              <a:xfrm flipH="1">
-                <a:off x="4727412" y="2987952"/>
-                <a:ext cx="630655" cy="252262"/>
-              </a:xfrm>
-              <a:prstGeom prst="ellipse">
-                <a:avLst/>
-              </a:prstGeom>
-              <a:solidFill>
-                <a:srgbClr val="DE2212"/>
-              </a:solidFill>
-              <a:ln w="28575">
-                <a:solidFill>
-                  <a:schemeClr val="bg2"/>
-                </a:solidFill>
-              </a:ln>
-            </p:spPr>
-            <p:style>
-              <a:lnRef idx="2">
-                <a:schemeClr val="accent1">
-                  <a:shade val="50000"/>
-                </a:schemeClr>
-              </a:lnRef>
-              <a:fillRef idx="1">
-                <a:schemeClr val="accent1"/>
-              </a:fillRef>
-              <a:effectRef idx="0">
-                <a:schemeClr val="accent1"/>
-              </a:effectRef>
-              <a:fontRef idx="minor">
-                <a:schemeClr val="lt1"/>
-              </a:fontRef>
-            </p:style>
-            <p:txBody>
-              <a:bodyPr rtlCol="0" anchor="ctr"/>
-              <a:lstStyle/>
-              <a:p>
-                <a:pPr algn="ctr"/>
-                <a:endParaRPr lang="nb-NO"/>
-              </a:p>
-            </p:txBody>
-          </p:sp>
-          <p:cxnSp>
-            <p:nvCxnSpPr>
-              <p:cNvPr id="8" name="Rett linje 7"/>
-              <p:cNvCxnSpPr>
-                <a:stCxn id="7" idx="6"/>
-              </p:cNvCxnSpPr>
-              <p:nvPr/>
-            </p:nvCxnSpPr>
-            <p:spPr>
-              <a:xfrm flipH="1">
-                <a:off x="4727412" y="3114083"/>
-                <a:ext cx="0" cy="539210"/>
-              </a:xfrm>
-              <a:prstGeom prst="line">
-                <a:avLst/>
-              </a:prstGeom>
-              <a:solidFill>
-                <a:srgbClr val="FF0000"/>
-              </a:solidFill>
-              <a:ln w="28575">
-                <a:solidFill>
-                  <a:schemeClr val="bg2"/>
-                </a:solidFill>
-              </a:ln>
-            </p:spPr>
-            <p:style>
-              <a:lnRef idx="1">
-                <a:schemeClr val="accent1"/>
-              </a:lnRef>
-              <a:fillRef idx="0">
-                <a:schemeClr val="accent1"/>
-              </a:fillRef>
-              <a:effectRef idx="0">
-                <a:schemeClr val="accent1"/>
-              </a:effectRef>
-              <a:fontRef idx="minor">
-                <a:schemeClr val="tx1"/>
-              </a:fontRef>
-            </p:style>
-          </p:cxnSp>
-          <p:cxnSp>
-            <p:nvCxnSpPr>
-              <p:cNvPr id="9" name="Rett linje 8"/>
-              <p:cNvCxnSpPr/>
-              <p:nvPr/>
-            </p:nvCxnSpPr>
-            <p:spPr>
-              <a:xfrm flipH="1">
-                <a:off x="5358067" y="3114083"/>
-                <a:ext cx="0" cy="539210"/>
-              </a:xfrm>
-              <a:prstGeom prst="line">
-                <a:avLst/>
-              </a:prstGeom>
-              <a:solidFill>
-                <a:srgbClr val="FF0000"/>
-              </a:solidFill>
-              <a:ln w="28575">
-                <a:solidFill>
-                  <a:schemeClr val="bg2"/>
-                </a:solidFill>
-              </a:ln>
-            </p:spPr>
-            <p:style>
-              <a:lnRef idx="1">
-                <a:schemeClr val="accent1"/>
-              </a:lnRef>
-              <a:fillRef idx="0">
-                <a:schemeClr val="accent1"/>
-              </a:fillRef>
-              <a:effectRef idx="0">
-                <a:schemeClr val="accent1"/>
-              </a:effectRef>
-              <a:fontRef idx="minor">
-                <a:schemeClr val="tx1"/>
-              </a:fontRef>
-            </p:style>
-          </p:cxnSp>
-          <p:grpSp>
-            <p:nvGrpSpPr>
-              <p:cNvPr id="10" name="Gruppe 9"/>
-              <p:cNvGrpSpPr/>
-              <p:nvPr/>
-            </p:nvGrpSpPr>
-            <p:grpSpPr>
-              <a:xfrm flipH="1">
-                <a:off x="4727412" y="3167687"/>
-                <a:ext cx="630655" cy="252263"/>
-                <a:chOff x="3845167" y="2086704"/>
-                <a:chExt cx="2473571" cy="937849"/>
-              </a:xfrm>
-              <a:solidFill>
-                <a:srgbClr val="DE2212"/>
-              </a:solidFill>
-            </p:grpSpPr>
-            <p:sp>
-              <p:nvSpPr>
-                <p:cNvPr id="11" name="Bue 10"/>
-                <p:cNvSpPr/>
-                <p:nvPr/>
-              </p:nvSpPr>
-              <p:spPr>
-                <a:xfrm flipV="1">
-                  <a:off x="3845167" y="2086708"/>
-                  <a:ext cx="2473571" cy="937845"/>
-                </a:xfrm>
-                <a:prstGeom prst="arc">
-                  <a:avLst/>
-                </a:prstGeom>
-                <a:grpFill/>
-                <a:ln w="28575">
-                  <a:solidFill>
-                    <a:schemeClr val="bg2"/>
-                  </a:solidFill>
-                </a:ln>
-              </p:spPr>
-              <p:style>
-                <a:lnRef idx="1">
-                  <a:schemeClr val="accent1"/>
-                </a:lnRef>
-                <a:fillRef idx="0">
-                  <a:schemeClr val="accent1"/>
-                </a:fillRef>
-                <a:effectRef idx="0">
-                  <a:schemeClr val="accent1"/>
-                </a:effectRef>
-                <a:fontRef idx="minor">
-                  <a:schemeClr val="tx1"/>
-                </a:fontRef>
-              </p:style>
-              <p:txBody>
-                <a:bodyPr rtlCol="0" anchor="ctr"/>
-                <a:lstStyle/>
-                <a:p>
-                  <a:pPr algn="ctr"/>
-                  <a:endParaRPr lang="nb-NO"/>
-                </a:p>
-              </p:txBody>
-            </p:sp>
-            <p:sp>
-              <p:nvSpPr>
-                <p:cNvPr id="12" name="Bue 11"/>
-                <p:cNvSpPr/>
-                <p:nvPr/>
-              </p:nvSpPr>
-              <p:spPr>
-                <a:xfrm flipH="1" flipV="1">
-                  <a:off x="3845167" y="2086704"/>
-                  <a:ext cx="2473571" cy="937845"/>
-                </a:xfrm>
-                <a:prstGeom prst="arc">
-                  <a:avLst/>
-                </a:prstGeom>
-                <a:grpFill/>
-                <a:ln w="28575">
-                  <a:solidFill>
-                    <a:schemeClr val="bg2"/>
-                  </a:solidFill>
-                </a:ln>
-              </p:spPr>
-              <p:style>
-                <a:lnRef idx="1">
-                  <a:schemeClr val="accent1"/>
-                </a:lnRef>
-                <a:fillRef idx="0">
-                  <a:schemeClr val="accent1"/>
-                </a:fillRef>
-                <a:effectRef idx="0">
-                  <a:schemeClr val="accent1"/>
-                </a:effectRef>
-                <a:fontRef idx="minor">
-                  <a:schemeClr val="tx1"/>
-                </a:fontRef>
-              </p:style>
-              <p:txBody>
-                <a:bodyPr rtlCol="0" anchor="ctr"/>
-                <a:lstStyle/>
-                <a:p>
-                  <a:pPr algn="ctr"/>
-                  <a:endParaRPr lang="nb-NO"/>
-                </a:p>
-              </p:txBody>
-            </p:sp>
-          </p:grpSp>
-        </p:grpSp>
-        <p:grpSp>
-          <p:nvGrpSpPr>
-            <p:cNvPr id="51" name="Gruppe 50"/>
-            <p:cNvGrpSpPr/>
-            <p:nvPr/>
-          </p:nvGrpSpPr>
-          <p:grpSpPr>
-            <a:xfrm>
-              <a:off x="5562455" y="2957472"/>
-              <a:ext cx="630656" cy="791472"/>
-              <a:chOff x="5538071" y="2987952"/>
-              <a:chExt cx="630656" cy="791472"/>
-            </a:xfrm>
-          </p:grpSpPr>
-          <p:sp>
-            <p:nvSpPr>
-              <p:cNvPr id="18" name="Rektangel 17"/>
-              <p:cNvSpPr/>
-              <p:nvPr/>
-            </p:nvSpPr>
-            <p:spPr>
-              <a:xfrm flipH="1">
-                <a:off x="5538072" y="3114082"/>
-                <a:ext cx="630655" cy="551508"/>
-              </a:xfrm>
-              <a:prstGeom prst="rect">
-                <a:avLst/>
-              </a:prstGeom>
-              <a:solidFill>
-                <a:srgbClr val="00A6EB"/>
-              </a:solidFill>
-              <a:ln w="28575">
-                <a:solidFill>
-                  <a:srgbClr val="00A6EB"/>
-                </a:solidFill>
-              </a:ln>
-            </p:spPr>
-            <p:style>
-              <a:lnRef idx="2">
-                <a:schemeClr val="accent1">
-                  <a:shade val="50000"/>
-                </a:schemeClr>
-              </a:lnRef>
-              <a:fillRef idx="1">
-                <a:schemeClr val="accent1"/>
-              </a:fillRef>
-              <a:effectRef idx="0">
-                <a:schemeClr val="accent1"/>
-              </a:effectRef>
-              <a:fontRef idx="minor">
-                <a:schemeClr val="lt1"/>
-              </a:fontRef>
-            </p:style>
-            <p:txBody>
-              <a:bodyPr rtlCol="0" anchor="ctr"/>
-              <a:lstStyle/>
-              <a:p>
-                <a:pPr algn="ctr"/>
-                <a:endParaRPr lang="nb-NO"/>
-              </a:p>
-            </p:txBody>
-          </p:sp>
-          <p:grpSp>
-            <p:nvGrpSpPr>
-              <p:cNvPr id="19" name="Gruppe 18"/>
-              <p:cNvGrpSpPr/>
-              <p:nvPr/>
-            </p:nvGrpSpPr>
-            <p:grpSpPr>
-              <a:xfrm flipH="1">
-                <a:off x="5538071" y="3347424"/>
-                <a:ext cx="630655" cy="252263"/>
-                <a:chOff x="3845167" y="2086704"/>
-                <a:chExt cx="2473571" cy="937849"/>
-              </a:xfrm>
-              <a:solidFill>
-                <a:srgbClr val="00A6EB"/>
-              </a:solidFill>
-            </p:grpSpPr>
-            <p:sp>
-              <p:nvSpPr>
-                <p:cNvPr id="29" name="Bue 28"/>
-                <p:cNvSpPr/>
-                <p:nvPr/>
-              </p:nvSpPr>
-              <p:spPr>
-                <a:xfrm flipV="1">
-                  <a:off x="3845167" y="2086708"/>
-                  <a:ext cx="2473571" cy="937845"/>
-                </a:xfrm>
-                <a:prstGeom prst="arc">
-                  <a:avLst/>
-                </a:prstGeom>
-                <a:grpFill/>
-                <a:ln w="28575">
-                  <a:solidFill>
-                    <a:schemeClr val="bg2"/>
-                  </a:solidFill>
-                </a:ln>
-              </p:spPr>
-              <p:style>
-                <a:lnRef idx="1">
-                  <a:schemeClr val="accent1"/>
-                </a:lnRef>
-                <a:fillRef idx="0">
-                  <a:schemeClr val="accent1"/>
-                </a:fillRef>
-                <a:effectRef idx="0">
-                  <a:schemeClr val="accent1"/>
-                </a:effectRef>
-                <a:fontRef idx="minor">
-                  <a:schemeClr val="tx1"/>
-                </a:fontRef>
-              </p:style>
-              <p:txBody>
-                <a:bodyPr rtlCol="0" anchor="ctr"/>
-                <a:lstStyle/>
-                <a:p>
-                  <a:pPr algn="ctr"/>
-                  <a:endParaRPr lang="nb-NO"/>
-                </a:p>
-              </p:txBody>
-            </p:sp>
-            <p:sp>
-              <p:nvSpPr>
-                <p:cNvPr id="30" name="Bue 29"/>
-                <p:cNvSpPr/>
-                <p:nvPr/>
-              </p:nvSpPr>
-              <p:spPr>
-                <a:xfrm flipH="1" flipV="1">
-                  <a:off x="3845167" y="2086704"/>
-                  <a:ext cx="2473571" cy="937845"/>
-                </a:xfrm>
-                <a:prstGeom prst="arc">
-                  <a:avLst/>
-                </a:prstGeom>
-                <a:grpFill/>
-                <a:ln w="28575">
-                  <a:solidFill>
-                    <a:schemeClr val="bg2"/>
-                  </a:solidFill>
-                </a:ln>
-              </p:spPr>
-              <p:style>
-                <a:lnRef idx="1">
-                  <a:schemeClr val="accent1"/>
-                </a:lnRef>
-                <a:fillRef idx="0">
-                  <a:schemeClr val="accent1"/>
-                </a:fillRef>
-                <a:effectRef idx="0">
-                  <a:schemeClr val="accent1"/>
-                </a:effectRef>
-                <a:fontRef idx="minor">
-                  <a:schemeClr val="tx1"/>
-                </a:fontRef>
-              </p:style>
-              <p:txBody>
-                <a:bodyPr rtlCol="0" anchor="ctr"/>
-                <a:lstStyle/>
-                <a:p>
-                  <a:pPr algn="ctr"/>
-                  <a:endParaRPr lang="nb-NO"/>
-                </a:p>
-              </p:txBody>
-            </p:sp>
-          </p:grpSp>
-          <p:grpSp>
-            <p:nvGrpSpPr>
-              <p:cNvPr id="20" name="Gruppe 19"/>
-              <p:cNvGrpSpPr/>
-              <p:nvPr/>
-            </p:nvGrpSpPr>
-            <p:grpSpPr>
-              <a:xfrm flipH="1">
-                <a:off x="5538072" y="3527161"/>
-                <a:ext cx="630655" cy="252263"/>
-                <a:chOff x="3845167" y="2086704"/>
-                <a:chExt cx="2473571" cy="937849"/>
-              </a:xfrm>
-              <a:solidFill>
-                <a:srgbClr val="00A6EB"/>
-              </a:solidFill>
-            </p:grpSpPr>
-            <p:sp>
-              <p:nvSpPr>
-                <p:cNvPr id="27" name="Bue 26"/>
-                <p:cNvSpPr/>
-                <p:nvPr/>
-              </p:nvSpPr>
-              <p:spPr>
-                <a:xfrm flipV="1">
-                  <a:off x="3845167" y="2086708"/>
-                  <a:ext cx="2473571" cy="937845"/>
-                </a:xfrm>
-                <a:prstGeom prst="arc">
-                  <a:avLst/>
-                </a:prstGeom>
-                <a:grpFill/>
-                <a:ln w="28575">
-                  <a:solidFill>
-                    <a:schemeClr val="bg2"/>
-                  </a:solidFill>
-                </a:ln>
-              </p:spPr>
-              <p:style>
-                <a:lnRef idx="1">
-                  <a:schemeClr val="accent1"/>
-                </a:lnRef>
-                <a:fillRef idx="0">
-                  <a:schemeClr val="accent1"/>
-                </a:fillRef>
-                <a:effectRef idx="0">
-                  <a:schemeClr val="accent1"/>
-                </a:effectRef>
-                <a:fontRef idx="minor">
-                  <a:schemeClr val="tx1"/>
-                </a:fontRef>
-              </p:style>
-              <p:txBody>
-                <a:bodyPr rtlCol="0" anchor="ctr"/>
-                <a:lstStyle/>
-                <a:p>
-                  <a:pPr algn="ctr"/>
-                  <a:endParaRPr lang="nb-NO"/>
-                </a:p>
-              </p:txBody>
-            </p:sp>
-            <p:sp>
-              <p:nvSpPr>
-                <p:cNvPr id="28" name="Bue 27"/>
-                <p:cNvSpPr/>
-                <p:nvPr/>
-              </p:nvSpPr>
-              <p:spPr>
-                <a:xfrm flipH="1" flipV="1">
-                  <a:off x="3845167" y="2086704"/>
-                  <a:ext cx="2473571" cy="937845"/>
-                </a:xfrm>
-                <a:prstGeom prst="arc">
-                  <a:avLst/>
-                </a:prstGeom>
-                <a:grpFill/>
-                <a:ln w="28575">
-                  <a:solidFill>
-                    <a:schemeClr val="bg2"/>
-                  </a:solidFill>
-                </a:ln>
-              </p:spPr>
-              <p:style>
-                <a:lnRef idx="1">
-                  <a:schemeClr val="accent1"/>
-                </a:lnRef>
-                <a:fillRef idx="0">
-                  <a:schemeClr val="accent1"/>
-                </a:fillRef>
-                <a:effectRef idx="0">
-                  <a:schemeClr val="accent1"/>
-                </a:effectRef>
-                <a:fontRef idx="minor">
-                  <a:schemeClr val="tx1"/>
-                </a:fontRef>
-              </p:style>
-              <p:txBody>
-                <a:bodyPr rtlCol="0" anchor="ctr"/>
-                <a:lstStyle/>
-                <a:p>
-                  <a:pPr algn="ctr"/>
-                  <a:endParaRPr lang="nb-NO"/>
-                </a:p>
-              </p:txBody>
-            </p:sp>
-          </p:grpSp>
-          <p:sp>
-            <p:nvSpPr>
-              <p:cNvPr id="21" name="Ellipse 20"/>
-              <p:cNvSpPr/>
-              <p:nvPr/>
-            </p:nvSpPr>
-            <p:spPr>
-              <a:xfrm flipH="1">
-                <a:off x="5538071" y="2987952"/>
-                <a:ext cx="630655" cy="252262"/>
-              </a:xfrm>
-              <a:prstGeom prst="ellipse">
-                <a:avLst/>
-              </a:prstGeom>
-              <a:solidFill>
-                <a:srgbClr val="00A6EB"/>
-              </a:solidFill>
-              <a:ln w="28575">
-                <a:solidFill>
-                  <a:schemeClr val="bg2"/>
-                </a:solidFill>
-              </a:ln>
-            </p:spPr>
-            <p:style>
-              <a:lnRef idx="2">
-                <a:schemeClr val="accent1">
-                  <a:shade val="50000"/>
-                </a:schemeClr>
-              </a:lnRef>
-              <a:fillRef idx="1">
-                <a:schemeClr val="accent1"/>
-              </a:fillRef>
-              <a:effectRef idx="0">
-                <a:schemeClr val="accent1"/>
-              </a:effectRef>
-              <a:fontRef idx="minor">
-                <a:schemeClr val="lt1"/>
-              </a:fontRef>
-            </p:style>
-            <p:txBody>
-              <a:bodyPr rtlCol="0" anchor="ctr"/>
-              <a:lstStyle/>
-              <a:p>
-                <a:pPr algn="ctr"/>
-                <a:endParaRPr lang="nb-NO"/>
-              </a:p>
-            </p:txBody>
-          </p:sp>
-          <p:cxnSp>
-            <p:nvCxnSpPr>
-              <p:cNvPr id="22" name="Rett linje 21"/>
-              <p:cNvCxnSpPr>
-                <a:stCxn id="21" idx="6"/>
-              </p:cNvCxnSpPr>
-              <p:nvPr/>
-            </p:nvCxnSpPr>
-            <p:spPr>
-              <a:xfrm flipH="1">
-                <a:off x="5538071" y="3114083"/>
-                <a:ext cx="0" cy="539210"/>
-              </a:xfrm>
-              <a:prstGeom prst="line">
-                <a:avLst/>
-              </a:prstGeom>
-              <a:solidFill>
-                <a:srgbClr val="FF0000"/>
-              </a:solidFill>
-              <a:ln w="28575">
-                <a:solidFill>
-                  <a:schemeClr val="bg2"/>
-                </a:solidFill>
-              </a:ln>
-            </p:spPr>
-            <p:style>
-              <a:lnRef idx="1">
-                <a:schemeClr val="accent1"/>
-              </a:lnRef>
-              <a:fillRef idx="0">
-                <a:schemeClr val="accent1"/>
-              </a:fillRef>
-              <a:effectRef idx="0">
-                <a:schemeClr val="accent1"/>
-              </a:effectRef>
-              <a:fontRef idx="minor">
-                <a:schemeClr val="tx1"/>
-              </a:fontRef>
-            </p:style>
-          </p:cxnSp>
-          <p:cxnSp>
-            <p:nvCxnSpPr>
-              <p:cNvPr id="23" name="Rett linje 22"/>
-              <p:cNvCxnSpPr/>
-              <p:nvPr/>
-            </p:nvCxnSpPr>
-            <p:spPr>
-              <a:xfrm flipH="1">
-                <a:off x="6168726" y="3114083"/>
-                <a:ext cx="0" cy="539210"/>
-              </a:xfrm>
-              <a:prstGeom prst="line">
-                <a:avLst/>
-              </a:prstGeom>
-              <a:solidFill>
-                <a:srgbClr val="FF0000"/>
-              </a:solidFill>
-              <a:ln w="28575">
-                <a:solidFill>
-                  <a:schemeClr val="bg2"/>
-                </a:solidFill>
-              </a:ln>
-            </p:spPr>
-            <p:style>
-              <a:lnRef idx="1">
-                <a:schemeClr val="accent1"/>
-              </a:lnRef>
-              <a:fillRef idx="0">
-                <a:schemeClr val="accent1"/>
-              </a:fillRef>
-              <a:effectRef idx="0">
-                <a:schemeClr val="accent1"/>
-              </a:effectRef>
-              <a:fontRef idx="minor">
-                <a:schemeClr val="tx1"/>
-              </a:fontRef>
-            </p:style>
-          </p:cxnSp>
-          <p:grpSp>
-            <p:nvGrpSpPr>
-              <p:cNvPr id="24" name="Gruppe 23"/>
-              <p:cNvGrpSpPr/>
-              <p:nvPr/>
-            </p:nvGrpSpPr>
-            <p:grpSpPr>
-              <a:xfrm flipH="1">
-                <a:off x="5538071" y="3167687"/>
-                <a:ext cx="630655" cy="252263"/>
-                <a:chOff x="3845167" y="2086704"/>
-                <a:chExt cx="2473571" cy="937849"/>
-              </a:xfrm>
-              <a:solidFill>
-                <a:srgbClr val="00A6EB"/>
-              </a:solidFill>
-            </p:grpSpPr>
-            <p:sp>
-              <p:nvSpPr>
-                <p:cNvPr id="25" name="Bue 24"/>
-                <p:cNvSpPr/>
-                <p:nvPr/>
-              </p:nvSpPr>
-              <p:spPr>
-                <a:xfrm flipV="1">
-                  <a:off x="3845167" y="2086708"/>
-                  <a:ext cx="2473571" cy="937845"/>
-                </a:xfrm>
-                <a:prstGeom prst="arc">
-                  <a:avLst/>
-                </a:prstGeom>
-                <a:grpFill/>
-                <a:ln w="28575">
-                  <a:solidFill>
-                    <a:schemeClr val="bg2"/>
-                  </a:solidFill>
-                </a:ln>
-              </p:spPr>
-              <p:style>
-                <a:lnRef idx="1">
-                  <a:schemeClr val="accent1"/>
-                </a:lnRef>
-                <a:fillRef idx="0">
-                  <a:schemeClr val="accent1"/>
-                </a:fillRef>
-                <a:effectRef idx="0">
-                  <a:schemeClr val="accent1"/>
-                </a:effectRef>
-                <a:fontRef idx="minor">
-                  <a:schemeClr val="tx1"/>
-                </a:fontRef>
-              </p:style>
-              <p:txBody>
-                <a:bodyPr rtlCol="0" anchor="ctr"/>
-                <a:lstStyle/>
-                <a:p>
-                  <a:pPr algn="ctr"/>
-                  <a:endParaRPr lang="nb-NO"/>
-                </a:p>
-              </p:txBody>
-            </p:sp>
-            <p:sp>
-              <p:nvSpPr>
-                <p:cNvPr id="26" name="Bue 25"/>
-                <p:cNvSpPr/>
-                <p:nvPr/>
-              </p:nvSpPr>
-              <p:spPr>
-                <a:xfrm flipH="1" flipV="1">
-                  <a:off x="3845167" y="2086704"/>
-                  <a:ext cx="2473571" cy="937845"/>
-                </a:xfrm>
-                <a:prstGeom prst="arc">
-                  <a:avLst/>
-                </a:prstGeom>
-                <a:grpFill/>
-                <a:ln w="28575">
-                  <a:solidFill>
-                    <a:schemeClr val="bg2"/>
-                  </a:solidFill>
-                </a:ln>
-              </p:spPr>
-              <p:style>
-                <a:lnRef idx="1">
-                  <a:schemeClr val="accent1"/>
-                </a:lnRef>
-                <a:fillRef idx="0">
-                  <a:schemeClr val="accent1"/>
-                </a:fillRef>
-                <a:effectRef idx="0">
-                  <a:schemeClr val="accent1"/>
-                </a:effectRef>
-                <a:fontRef idx="minor">
-                  <a:schemeClr val="tx1"/>
-                </a:fontRef>
-              </p:style>
-              <p:txBody>
-                <a:bodyPr rtlCol="0" anchor="ctr"/>
-                <a:lstStyle/>
-                <a:p>
-                  <a:pPr algn="ctr"/>
-                  <a:endParaRPr lang="nb-NO"/>
-                </a:p>
-              </p:txBody>
-            </p:sp>
-          </p:grpSp>
-        </p:grpSp>
-        <p:grpSp>
-          <p:nvGrpSpPr>
-            <p:cNvPr id="50" name="Gruppe 49"/>
-            <p:cNvGrpSpPr/>
-            <p:nvPr/>
-          </p:nvGrpSpPr>
-          <p:grpSpPr>
-            <a:xfrm>
-              <a:off x="5162972" y="3524600"/>
-              <a:ext cx="630656" cy="791472"/>
-              <a:chOff x="5162972" y="3524600"/>
-              <a:chExt cx="630656" cy="791472"/>
-            </a:xfrm>
-          </p:grpSpPr>
-          <p:sp>
-            <p:nvSpPr>
-              <p:cNvPr id="32" name="Rektangel 31"/>
-              <p:cNvSpPr/>
-              <p:nvPr/>
-            </p:nvSpPr>
-            <p:spPr>
-              <a:xfrm flipH="1">
-                <a:off x="5162973" y="3650730"/>
-                <a:ext cx="630655" cy="551508"/>
-              </a:xfrm>
-              <a:prstGeom prst="rect">
-                <a:avLst/>
-              </a:prstGeom>
-              <a:solidFill>
-                <a:srgbClr val="00A14A"/>
-              </a:solidFill>
-              <a:ln w="28575">
-                <a:solidFill>
-                  <a:srgbClr val="00A14A"/>
-                </a:solidFill>
-              </a:ln>
-            </p:spPr>
-            <p:style>
-              <a:lnRef idx="2">
-                <a:schemeClr val="accent1">
-                  <a:shade val="50000"/>
-                </a:schemeClr>
-              </a:lnRef>
-              <a:fillRef idx="1">
-                <a:schemeClr val="accent1"/>
-              </a:fillRef>
-              <a:effectRef idx="0">
-                <a:schemeClr val="accent1"/>
-              </a:effectRef>
-              <a:fontRef idx="minor">
-                <a:schemeClr val="lt1"/>
-              </a:fontRef>
-            </p:style>
-            <p:txBody>
-              <a:bodyPr rtlCol="0" anchor="ctr"/>
-              <a:lstStyle/>
-              <a:p>
-                <a:pPr algn="ctr"/>
-                <a:endParaRPr lang="nb-NO"/>
-              </a:p>
-            </p:txBody>
-          </p:sp>
-          <p:grpSp>
-            <p:nvGrpSpPr>
-              <p:cNvPr id="33" name="Gruppe 32"/>
-              <p:cNvGrpSpPr/>
-              <p:nvPr/>
-            </p:nvGrpSpPr>
-            <p:grpSpPr>
-              <a:xfrm flipH="1">
-                <a:off x="5162972" y="3884072"/>
-                <a:ext cx="630655" cy="252263"/>
-                <a:chOff x="3845167" y="2086704"/>
-                <a:chExt cx="2473571" cy="937849"/>
-              </a:xfrm>
-              <a:solidFill>
-                <a:srgbClr val="00A14A"/>
-              </a:solidFill>
-            </p:grpSpPr>
-            <p:sp>
-              <p:nvSpPr>
-                <p:cNvPr id="43" name="Bue 42"/>
-                <p:cNvSpPr/>
-                <p:nvPr/>
-              </p:nvSpPr>
-              <p:spPr>
-                <a:xfrm flipV="1">
-                  <a:off x="3845167" y="2086708"/>
-                  <a:ext cx="2473571" cy="937845"/>
-                </a:xfrm>
-                <a:prstGeom prst="arc">
-                  <a:avLst/>
-                </a:prstGeom>
-                <a:grpFill/>
-                <a:ln w="28575">
-                  <a:solidFill>
-                    <a:schemeClr val="bg2"/>
-                  </a:solidFill>
-                </a:ln>
-              </p:spPr>
-              <p:style>
-                <a:lnRef idx="1">
-                  <a:schemeClr val="accent1"/>
-                </a:lnRef>
-                <a:fillRef idx="0">
-                  <a:schemeClr val="accent1"/>
-                </a:fillRef>
-                <a:effectRef idx="0">
-                  <a:schemeClr val="accent1"/>
-                </a:effectRef>
-                <a:fontRef idx="minor">
-                  <a:schemeClr val="tx1"/>
-                </a:fontRef>
-              </p:style>
-              <p:txBody>
-                <a:bodyPr rtlCol="0" anchor="ctr"/>
-                <a:lstStyle/>
-                <a:p>
-                  <a:pPr algn="ctr"/>
-                  <a:endParaRPr lang="nb-NO"/>
-                </a:p>
-              </p:txBody>
-            </p:sp>
-            <p:sp>
-              <p:nvSpPr>
-                <p:cNvPr id="44" name="Bue 43"/>
-                <p:cNvSpPr/>
-                <p:nvPr/>
-              </p:nvSpPr>
-              <p:spPr>
-                <a:xfrm flipH="1" flipV="1">
-                  <a:off x="3845167" y="2086704"/>
-                  <a:ext cx="2473571" cy="937845"/>
-                </a:xfrm>
-                <a:prstGeom prst="arc">
-                  <a:avLst/>
-                </a:prstGeom>
-                <a:grpFill/>
-                <a:ln w="28575">
-                  <a:solidFill>
-                    <a:schemeClr val="bg2"/>
-                  </a:solidFill>
-                </a:ln>
-              </p:spPr>
-              <p:style>
-                <a:lnRef idx="1">
-                  <a:schemeClr val="accent1"/>
-                </a:lnRef>
-                <a:fillRef idx="0">
-                  <a:schemeClr val="accent1"/>
-                </a:fillRef>
-                <a:effectRef idx="0">
-                  <a:schemeClr val="accent1"/>
-                </a:effectRef>
-                <a:fontRef idx="minor">
-                  <a:schemeClr val="tx1"/>
-                </a:fontRef>
-              </p:style>
-              <p:txBody>
-                <a:bodyPr rtlCol="0" anchor="ctr"/>
-                <a:lstStyle/>
-                <a:p>
-                  <a:pPr algn="ctr"/>
-                  <a:endParaRPr lang="nb-NO"/>
-                </a:p>
-              </p:txBody>
-            </p:sp>
-          </p:grpSp>
-          <p:grpSp>
-            <p:nvGrpSpPr>
-              <p:cNvPr id="34" name="Gruppe 33"/>
-              <p:cNvGrpSpPr/>
-              <p:nvPr/>
-            </p:nvGrpSpPr>
-            <p:grpSpPr>
-              <a:xfrm flipH="1">
-                <a:off x="5162973" y="4063809"/>
-                <a:ext cx="630655" cy="252263"/>
-                <a:chOff x="3845167" y="2086704"/>
-                <a:chExt cx="2473571" cy="937849"/>
-              </a:xfrm>
-              <a:solidFill>
-                <a:srgbClr val="00A14A"/>
-              </a:solidFill>
-            </p:grpSpPr>
-            <p:sp>
-              <p:nvSpPr>
-                <p:cNvPr id="41" name="Bue 40"/>
-                <p:cNvSpPr/>
-                <p:nvPr/>
-              </p:nvSpPr>
-              <p:spPr>
-                <a:xfrm flipV="1">
-                  <a:off x="3845167" y="2086708"/>
-                  <a:ext cx="2473571" cy="937845"/>
-                </a:xfrm>
-                <a:prstGeom prst="arc">
-                  <a:avLst/>
-                </a:prstGeom>
-                <a:grpFill/>
-                <a:ln w="28575">
-                  <a:solidFill>
-                    <a:schemeClr val="bg2"/>
-                  </a:solidFill>
-                </a:ln>
-              </p:spPr>
-              <p:style>
-                <a:lnRef idx="1">
-                  <a:schemeClr val="accent1"/>
-                </a:lnRef>
-                <a:fillRef idx="0">
-                  <a:schemeClr val="accent1"/>
-                </a:fillRef>
-                <a:effectRef idx="0">
-                  <a:schemeClr val="accent1"/>
-                </a:effectRef>
-                <a:fontRef idx="minor">
-                  <a:schemeClr val="tx1"/>
-                </a:fontRef>
-              </p:style>
-              <p:txBody>
-                <a:bodyPr rtlCol="0" anchor="ctr"/>
-                <a:lstStyle/>
-                <a:p>
-                  <a:pPr algn="ctr"/>
-                  <a:endParaRPr lang="nb-NO"/>
-                </a:p>
-              </p:txBody>
-            </p:sp>
-            <p:sp>
-              <p:nvSpPr>
-                <p:cNvPr id="42" name="Bue 41"/>
-                <p:cNvSpPr/>
-                <p:nvPr/>
-              </p:nvSpPr>
-              <p:spPr>
-                <a:xfrm flipH="1" flipV="1">
-                  <a:off x="3845167" y="2086704"/>
-                  <a:ext cx="2473571" cy="937845"/>
-                </a:xfrm>
-                <a:prstGeom prst="arc">
-                  <a:avLst/>
-                </a:prstGeom>
-                <a:grpFill/>
-                <a:ln w="28575">
-                  <a:solidFill>
-                    <a:schemeClr val="bg2"/>
-                  </a:solidFill>
-                </a:ln>
-              </p:spPr>
-              <p:style>
-                <a:lnRef idx="1">
-                  <a:schemeClr val="accent1"/>
-                </a:lnRef>
-                <a:fillRef idx="0">
-                  <a:schemeClr val="accent1"/>
-                </a:fillRef>
-                <a:effectRef idx="0">
-                  <a:schemeClr val="accent1"/>
-                </a:effectRef>
-                <a:fontRef idx="minor">
-                  <a:schemeClr val="tx1"/>
-                </a:fontRef>
-              </p:style>
-              <p:txBody>
-                <a:bodyPr rtlCol="0" anchor="ctr"/>
-                <a:lstStyle/>
-                <a:p>
-                  <a:pPr algn="ctr"/>
-                  <a:endParaRPr lang="nb-NO"/>
-                </a:p>
-              </p:txBody>
-            </p:sp>
-          </p:grpSp>
-          <p:sp>
-            <p:nvSpPr>
-              <p:cNvPr id="35" name="Ellipse 34"/>
-              <p:cNvSpPr/>
-              <p:nvPr/>
-            </p:nvSpPr>
-            <p:spPr>
-              <a:xfrm flipH="1">
-                <a:off x="5162972" y="3524600"/>
-                <a:ext cx="630655" cy="252262"/>
-              </a:xfrm>
-              <a:prstGeom prst="ellipse">
-                <a:avLst/>
-              </a:prstGeom>
-              <a:solidFill>
-                <a:srgbClr val="00A14A"/>
-              </a:solidFill>
-              <a:ln w="28575">
-                <a:solidFill>
-                  <a:schemeClr val="bg2"/>
-                </a:solidFill>
-              </a:ln>
-            </p:spPr>
-            <p:style>
-              <a:lnRef idx="2">
-                <a:schemeClr val="accent1">
-                  <a:shade val="50000"/>
-                </a:schemeClr>
-              </a:lnRef>
-              <a:fillRef idx="1">
-                <a:schemeClr val="accent1"/>
-              </a:fillRef>
-              <a:effectRef idx="0">
-                <a:schemeClr val="accent1"/>
-              </a:effectRef>
-              <a:fontRef idx="minor">
-                <a:schemeClr val="lt1"/>
-              </a:fontRef>
-            </p:style>
-            <p:txBody>
-              <a:bodyPr rtlCol="0" anchor="ctr"/>
-              <a:lstStyle/>
-              <a:p>
-                <a:pPr algn="ctr"/>
-                <a:endParaRPr lang="nb-NO"/>
-              </a:p>
-            </p:txBody>
-          </p:sp>
-          <p:cxnSp>
-            <p:nvCxnSpPr>
-              <p:cNvPr id="36" name="Rett linje 35"/>
-              <p:cNvCxnSpPr>
-                <a:stCxn id="35" idx="6"/>
-              </p:cNvCxnSpPr>
-              <p:nvPr/>
-            </p:nvCxnSpPr>
-            <p:spPr>
-              <a:xfrm flipH="1">
-                <a:off x="5162972" y="3650731"/>
-                <a:ext cx="0" cy="539210"/>
-              </a:xfrm>
-              <a:prstGeom prst="line">
-                <a:avLst/>
-              </a:prstGeom>
-              <a:solidFill>
-                <a:srgbClr val="FF0000"/>
-              </a:solidFill>
-              <a:ln w="28575">
-                <a:solidFill>
-                  <a:schemeClr val="bg2"/>
-                </a:solidFill>
-              </a:ln>
-            </p:spPr>
-            <p:style>
-              <a:lnRef idx="1">
-                <a:schemeClr val="accent1"/>
-              </a:lnRef>
-              <a:fillRef idx="0">
-                <a:schemeClr val="accent1"/>
-              </a:fillRef>
-              <a:effectRef idx="0">
-                <a:schemeClr val="accent1"/>
-              </a:effectRef>
-              <a:fontRef idx="minor">
-                <a:schemeClr val="tx1"/>
-              </a:fontRef>
-            </p:style>
-          </p:cxnSp>
-          <p:cxnSp>
-            <p:nvCxnSpPr>
-              <p:cNvPr id="37" name="Rett linje 36"/>
-              <p:cNvCxnSpPr/>
-              <p:nvPr/>
-            </p:nvCxnSpPr>
-            <p:spPr>
-              <a:xfrm flipH="1">
-                <a:off x="5793627" y="3650731"/>
-                <a:ext cx="0" cy="539210"/>
-              </a:xfrm>
-              <a:prstGeom prst="line">
-                <a:avLst/>
-              </a:prstGeom>
-              <a:solidFill>
-                <a:srgbClr val="FF0000"/>
-              </a:solidFill>
-              <a:ln w="28575">
-                <a:solidFill>
-                  <a:schemeClr val="bg2"/>
-                </a:solidFill>
-              </a:ln>
-            </p:spPr>
-            <p:style>
-              <a:lnRef idx="1">
-                <a:schemeClr val="accent1"/>
-              </a:lnRef>
-              <a:fillRef idx="0">
-                <a:schemeClr val="accent1"/>
-              </a:fillRef>
-              <a:effectRef idx="0">
-                <a:schemeClr val="accent1"/>
-              </a:effectRef>
-              <a:fontRef idx="minor">
-                <a:schemeClr val="tx1"/>
-              </a:fontRef>
-            </p:style>
-          </p:cxnSp>
-          <p:grpSp>
-            <p:nvGrpSpPr>
-              <p:cNvPr id="38" name="Gruppe 37"/>
-              <p:cNvGrpSpPr/>
-              <p:nvPr/>
-            </p:nvGrpSpPr>
-            <p:grpSpPr>
-              <a:xfrm flipH="1">
-                <a:off x="5162972" y="3704335"/>
-                <a:ext cx="630655" cy="252263"/>
-                <a:chOff x="3845167" y="2086704"/>
-                <a:chExt cx="2473571" cy="937849"/>
-              </a:xfrm>
-              <a:solidFill>
-                <a:srgbClr val="00A14A"/>
-              </a:solidFill>
-            </p:grpSpPr>
-            <p:sp>
-              <p:nvSpPr>
-                <p:cNvPr id="39" name="Bue 38"/>
-                <p:cNvSpPr/>
-                <p:nvPr/>
-              </p:nvSpPr>
-              <p:spPr>
-                <a:xfrm flipV="1">
-                  <a:off x="3845167" y="2086708"/>
-                  <a:ext cx="2473571" cy="937845"/>
-                </a:xfrm>
-                <a:prstGeom prst="arc">
-                  <a:avLst/>
-                </a:prstGeom>
-                <a:grpFill/>
-                <a:ln w="28575">
-                  <a:solidFill>
-                    <a:schemeClr val="bg2"/>
-                  </a:solidFill>
-                </a:ln>
-              </p:spPr>
-              <p:style>
-                <a:lnRef idx="1">
-                  <a:schemeClr val="accent1"/>
-                </a:lnRef>
-                <a:fillRef idx="0">
-                  <a:schemeClr val="accent1"/>
-                </a:fillRef>
-                <a:effectRef idx="0">
-                  <a:schemeClr val="accent1"/>
-                </a:effectRef>
-                <a:fontRef idx="minor">
-                  <a:schemeClr val="tx1"/>
-                </a:fontRef>
-              </p:style>
-              <p:txBody>
-                <a:bodyPr rtlCol="0" anchor="ctr"/>
-                <a:lstStyle/>
-                <a:p>
-                  <a:pPr algn="ctr"/>
-                  <a:endParaRPr lang="nb-NO"/>
-                </a:p>
-              </p:txBody>
-            </p:sp>
-            <p:sp>
-              <p:nvSpPr>
-                <p:cNvPr id="40" name="Bue 39"/>
-                <p:cNvSpPr/>
-                <p:nvPr/>
-              </p:nvSpPr>
-              <p:spPr>
-                <a:xfrm flipH="1" flipV="1">
-                  <a:off x="3845167" y="2086704"/>
-                  <a:ext cx="2473571" cy="937845"/>
-                </a:xfrm>
-                <a:prstGeom prst="arc">
-                  <a:avLst/>
-                </a:prstGeom>
-                <a:grpFill/>
-                <a:ln w="28575">
-                  <a:solidFill>
-                    <a:schemeClr val="bg2"/>
-                  </a:solidFill>
-                </a:ln>
-              </p:spPr>
-              <p:style>
-                <a:lnRef idx="1">
-                  <a:schemeClr val="accent1"/>
-                </a:lnRef>
-                <a:fillRef idx="0">
-                  <a:schemeClr val="accent1"/>
-                </a:fillRef>
-                <a:effectRef idx="0">
-                  <a:schemeClr val="accent1"/>
-                </a:effectRef>
-                <a:fontRef idx="minor">
-                  <a:schemeClr val="tx1"/>
-                </a:fontRef>
-              </p:style>
-              <p:txBody>
-                <a:bodyPr rtlCol="0" anchor="ctr"/>
-                <a:lstStyle/>
-                <a:p>
-                  <a:pPr algn="ctr"/>
-                  <a:endParaRPr lang="nb-NO"/>
-                </a:p>
-              </p:txBody>
-            </p:sp>
-          </p:grpSp>
-        </p:grpSp>
         <p:sp>
           <p:nvSpPr>
             <p:cNvPr id="45" name="TekstSylinder 44"/>
@@ -13410,7 +11914,7 @@
           </p:nvSpPr>
           <p:spPr>
             <a:xfrm>
-              <a:off x="4334256" y="2374713"/>
+              <a:off x="4332252" y="2416775"/>
               <a:ext cx="2292096" cy="461665"/>
             </a:xfrm>
             <a:prstGeom prst="rect">
@@ -13447,19 +11951,1200 @@
             </a:p>
           </p:txBody>
         </p:sp>
+        <p:grpSp>
+          <p:nvGrpSpPr>
+            <p:cNvPr id="91" name="Gruppe 90"/>
+            <p:cNvGrpSpPr/>
+            <p:nvPr/>
+          </p:nvGrpSpPr>
+          <p:grpSpPr>
+            <a:xfrm>
+              <a:off x="4924474" y="2966645"/>
+              <a:ext cx="1107653" cy="1237785"/>
+              <a:chOff x="4924473" y="2966645"/>
+              <a:chExt cx="1107653" cy="1237785"/>
+            </a:xfrm>
+          </p:grpSpPr>
+          <p:sp>
+            <p:nvSpPr>
+              <p:cNvPr id="17" name="Trapes 16"/>
+              <p:cNvSpPr/>
+              <p:nvPr/>
+            </p:nvSpPr>
+            <p:spPr>
+              <a:xfrm>
+                <a:off x="5173810" y="3295705"/>
+                <a:ext cx="605641" cy="702367"/>
+              </a:xfrm>
+              <a:prstGeom prst="trapezoid">
+                <a:avLst>
+                  <a:gd name="adj" fmla="val 9924"/>
+                </a:avLst>
+              </a:prstGeom>
+              <a:solidFill>
+                <a:schemeClr val="bg1"/>
+              </a:solidFill>
+            </p:spPr>
+            <p:style>
+              <a:lnRef idx="2">
+                <a:schemeClr val="accent1">
+                  <a:shade val="50000"/>
+                </a:schemeClr>
+              </a:lnRef>
+              <a:fillRef idx="1">
+                <a:schemeClr val="accent1"/>
+              </a:fillRef>
+              <a:effectRef idx="0">
+                <a:schemeClr val="accent1"/>
+              </a:effectRef>
+              <a:fontRef idx="minor">
+                <a:schemeClr val="lt1"/>
+              </a:fontRef>
+            </p:style>
+            <p:txBody>
+              <a:bodyPr rtlCol="0" anchor="ctr"/>
+              <a:lstStyle/>
+              <a:p>
+                <a:pPr algn="ctr"/>
+                <a:endParaRPr lang="nb-NO"/>
+              </a:p>
+            </p:txBody>
+          </p:sp>
+          <p:cxnSp>
+            <p:nvCxnSpPr>
+              <p:cNvPr id="46" name="Rett linje 45"/>
+              <p:cNvCxnSpPr/>
+              <p:nvPr/>
+            </p:nvCxnSpPr>
+            <p:spPr>
+              <a:xfrm flipV="1">
+                <a:off x="5227797" y="3295706"/>
+                <a:ext cx="495140" cy="0"/>
+              </a:xfrm>
+              <a:prstGeom prst="line">
+                <a:avLst/>
+              </a:prstGeom>
+              <a:ln>
+                <a:solidFill>
+                  <a:srgbClr val="979EA6"/>
+                </a:solidFill>
+              </a:ln>
+            </p:spPr>
+            <p:style>
+              <a:lnRef idx="1">
+                <a:schemeClr val="accent1"/>
+              </a:lnRef>
+              <a:fillRef idx="0">
+                <a:schemeClr val="accent1"/>
+              </a:fillRef>
+              <a:effectRef idx="0">
+                <a:schemeClr val="accent1"/>
+              </a:effectRef>
+              <a:fontRef idx="minor">
+                <a:schemeClr val="tx1"/>
+              </a:fontRef>
+            </p:style>
+          </p:cxnSp>
+          <p:cxnSp>
+            <p:nvCxnSpPr>
+              <p:cNvPr id="58" name="Rett linje 57"/>
+              <p:cNvCxnSpPr/>
+              <p:nvPr/>
+            </p:nvCxnSpPr>
+            <p:spPr>
+              <a:xfrm flipV="1">
+                <a:off x="5175073" y="3998073"/>
+                <a:ext cx="600587" cy="0"/>
+              </a:xfrm>
+              <a:prstGeom prst="line">
+                <a:avLst/>
+              </a:prstGeom>
+              <a:ln>
+                <a:solidFill>
+                  <a:srgbClr val="979EA6"/>
+                </a:solidFill>
+              </a:ln>
+            </p:spPr>
+            <p:style>
+              <a:lnRef idx="1">
+                <a:schemeClr val="accent1"/>
+              </a:lnRef>
+              <a:fillRef idx="0">
+                <a:schemeClr val="accent1"/>
+              </a:fillRef>
+              <a:effectRef idx="0">
+                <a:schemeClr val="accent1"/>
+              </a:effectRef>
+              <a:fontRef idx="minor">
+                <a:schemeClr val="tx1"/>
+              </a:fontRef>
+            </p:style>
+          </p:cxnSp>
+          <p:sp>
+            <p:nvSpPr>
+              <p:cNvPr id="57" name="Avrundet rektangel 56"/>
+              <p:cNvSpPr/>
+              <p:nvPr/>
+            </p:nvSpPr>
+            <p:spPr>
+              <a:xfrm>
+                <a:off x="5099600" y="4077764"/>
+                <a:ext cx="748779" cy="126666"/>
+              </a:xfrm>
+              <a:prstGeom prst="roundRect">
+                <a:avLst/>
+              </a:prstGeom>
+              <a:solidFill>
+                <a:schemeClr val="bg1"/>
+              </a:solidFill>
+              <a:ln w="19050">
+                <a:solidFill>
+                  <a:schemeClr val="tx1">
+                    <a:lumMod val="65000"/>
+                    <a:lumOff val="35000"/>
+                  </a:schemeClr>
+                </a:solidFill>
+              </a:ln>
+            </p:spPr>
+            <p:style>
+              <a:lnRef idx="2">
+                <a:schemeClr val="accent1">
+                  <a:shade val="50000"/>
+                </a:schemeClr>
+              </a:lnRef>
+              <a:fillRef idx="1">
+                <a:schemeClr val="accent1"/>
+              </a:fillRef>
+              <a:effectRef idx="0">
+                <a:schemeClr val="accent1"/>
+              </a:effectRef>
+              <a:fontRef idx="minor">
+                <a:schemeClr val="lt1"/>
+              </a:fontRef>
+            </p:style>
+            <p:txBody>
+              <a:bodyPr rtlCol="0" anchor="ctr"/>
+              <a:lstStyle/>
+              <a:p>
+                <a:pPr algn="ctr"/>
+                <a:endParaRPr lang="nb-NO"/>
+              </a:p>
+            </p:txBody>
+          </p:sp>
+          <p:sp>
+            <p:nvSpPr>
+              <p:cNvPr id="61" name="Avrundet rektangel 60"/>
+              <p:cNvSpPr/>
+              <p:nvPr/>
+            </p:nvSpPr>
+            <p:spPr>
+              <a:xfrm>
+                <a:off x="5173810" y="2966646"/>
+                <a:ext cx="601851" cy="231678"/>
+              </a:xfrm>
+              <a:prstGeom prst="roundRect">
+                <a:avLst/>
+              </a:prstGeom>
+              <a:solidFill>
+                <a:schemeClr val="bg1"/>
+              </a:solidFill>
+              <a:ln w="19050">
+                <a:solidFill>
+                  <a:schemeClr val="tx1">
+                    <a:lumMod val="65000"/>
+                    <a:lumOff val="35000"/>
+                  </a:schemeClr>
+                </a:solidFill>
+              </a:ln>
+            </p:spPr>
+            <p:style>
+              <a:lnRef idx="2">
+                <a:schemeClr val="accent1">
+                  <a:shade val="50000"/>
+                </a:schemeClr>
+              </a:lnRef>
+              <a:fillRef idx="1">
+                <a:schemeClr val="accent1"/>
+              </a:fillRef>
+              <a:effectRef idx="0">
+                <a:schemeClr val="accent1"/>
+              </a:effectRef>
+              <a:fontRef idx="minor">
+                <a:schemeClr val="lt1"/>
+              </a:fontRef>
+            </p:style>
+            <p:txBody>
+              <a:bodyPr rtlCol="0" anchor="ctr"/>
+              <a:lstStyle/>
+              <a:p>
+                <a:pPr algn="ctr"/>
+                <a:endParaRPr lang="nb-NO"/>
+              </a:p>
+            </p:txBody>
+          </p:sp>
+          <p:sp>
+            <p:nvSpPr>
+              <p:cNvPr id="31" name="Rektangel 30"/>
+              <p:cNvSpPr/>
+              <p:nvPr/>
+            </p:nvSpPr>
+            <p:spPr>
+              <a:xfrm>
+                <a:off x="5681303" y="2966646"/>
+                <a:ext cx="94357" cy="150058"/>
+              </a:xfrm>
+              <a:prstGeom prst="rect">
+                <a:avLst/>
+              </a:prstGeom>
+              <a:solidFill>
+                <a:schemeClr val="bg1"/>
+              </a:solidFill>
+              <a:ln w="19050">
+                <a:solidFill>
+                  <a:schemeClr val="tx1">
+                    <a:lumMod val="65000"/>
+                    <a:lumOff val="35000"/>
+                  </a:schemeClr>
+                </a:solidFill>
+              </a:ln>
+            </p:spPr>
+            <p:style>
+              <a:lnRef idx="2">
+                <a:schemeClr val="accent1">
+                  <a:shade val="50000"/>
+                </a:schemeClr>
+              </a:lnRef>
+              <a:fillRef idx="1">
+                <a:schemeClr val="accent1"/>
+              </a:fillRef>
+              <a:effectRef idx="0">
+                <a:schemeClr val="accent1"/>
+              </a:effectRef>
+              <a:fontRef idx="minor">
+                <a:schemeClr val="lt1"/>
+              </a:fontRef>
+            </p:style>
+            <p:txBody>
+              <a:bodyPr rtlCol="0" anchor="ctr"/>
+              <a:lstStyle/>
+              <a:p>
+                <a:pPr algn="ctr"/>
+                <a:endParaRPr lang="nb-NO"/>
+              </a:p>
+            </p:txBody>
+          </p:sp>
+          <p:sp>
+            <p:nvSpPr>
+              <p:cNvPr id="62" name="Rektangel 61"/>
+              <p:cNvSpPr/>
+              <p:nvPr/>
+            </p:nvSpPr>
+            <p:spPr>
+              <a:xfrm>
+                <a:off x="5173810" y="2966646"/>
+                <a:ext cx="91656" cy="150058"/>
+              </a:xfrm>
+              <a:prstGeom prst="rect">
+                <a:avLst/>
+              </a:prstGeom>
+              <a:solidFill>
+                <a:schemeClr val="bg1"/>
+              </a:solidFill>
+              <a:ln w="19050">
+                <a:solidFill>
+                  <a:schemeClr val="tx1">
+                    <a:lumMod val="65000"/>
+                    <a:lumOff val="35000"/>
+                  </a:schemeClr>
+                </a:solidFill>
+              </a:ln>
+            </p:spPr>
+            <p:style>
+              <a:lnRef idx="2">
+                <a:schemeClr val="accent1">
+                  <a:shade val="50000"/>
+                </a:schemeClr>
+              </a:lnRef>
+              <a:fillRef idx="1">
+                <a:schemeClr val="accent1"/>
+              </a:fillRef>
+              <a:effectRef idx="0">
+                <a:schemeClr val="accent1"/>
+              </a:effectRef>
+              <a:fontRef idx="minor">
+                <a:schemeClr val="lt1"/>
+              </a:fontRef>
+            </p:style>
+            <p:txBody>
+              <a:bodyPr rtlCol="0" anchor="ctr"/>
+              <a:lstStyle/>
+              <a:p>
+                <a:pPr algn="ctr"/>
+                <a:endParaRPr lang="nb-NO"/>
+              </a:p>
+            </p:txBody>
+          </p:sp>
+          <p:grpSp>
+            <p:nvGrpSpPr>
+              <p:cNvPr id="54" name="Gruppe 53"/>
+              <p:cNvGrpSpPr/>
+              <p:nvPr/>
+            </p:nvGrpSpPr>
+            <p:grpSpPr>
+              <a:xfrm>
+                <a:off x="4924473" y="3271832"/>
+                <a:ext cx="401696" cy="704399"/>
+                <a:chOff x="7477568" y="3728864"/>
+                <a:chExt cx="807607" cy="1416189"/>
+              </a:xfrm>
+            </p:grpSpPr>
+            <p:sp>
+              <p:nvSpPr>
+                <p:cNvPr id="70" name="Frihåndsform 69"/>
+                <p:cNvSpPr/>
+                <p:nvPr/>
+              </p:nvSpPr>
+              <p:spPr>
+                <a:xfrm rot="1502173">
+                  <a:off x="7783624" y="3820772"/>
+                  <a:ext cx="501551" cy="1324281"/>
+                </a:xfrm>
+                <a:custGeom>
+                  <a:avLst/>
+                  <a:gdLst>
+                    <a:gd name="connsiteX0" fmla="*/ 0 w 501551"/>
+                    <a:gd name="connsiteY0" fmla="*/ 0 h 1324281"/>
+                    <a:gd name="connsiteX1" fmla="*/ 501551 w 501551"/>
+                    <a:gd name="connsiteY1" fmla="*/ 1324281 h 1324281"/>
+                    <a:gd name="connsiteX2" fmla="*/ 0 w 501551"/>
+                    <a:gd name="connsiteY2" fmla="*/ 1324281 h 1324281"/>
+                    <a:gd name="connsiteX3" fmla="*/ 0 w 501551"/>
+                    <a:gd name="connsiteY3" fmla="*/ 0 h 1324281"/>
+                  </a:gdLst>
+                  <a:ahLst/>
+                  <a:cxnLst>
+                    <a:cxn ang="0">
+                      <a:pos x="connsiteX0" y="connsiteY0"/>
+                    </a:cxn>
+                    <a:cxn ang="0">
+                      <a:pos x="connsiteX1" y="connsiteY1"/>
+                    </a:cxn>
+                    <a:cxn ang="0">
+                      <a:pos x="connsiteX2" y="connsiteY2"/>
+                    </a:cxn>
+                    <a:cxn ang="0">
+                      <a:pos x="connsiteX3" y="connsiteY3"/>
+                    </a:cxn>
+                  </a:cxnLst>
+                  <a:rect l="l" t="t" r="r" b="b"/>
+                  <a:pathLst>
+                    <a:path w="501551" h="1324281">
+                      <a:moveTo>
+                        <a:pt x="0" y="0"/>
+                      </a:moveTo>
+                      <a:cubicBezTo>
+                        <a:pt x="276998" y="0"/>
+                        <a:pt x="501550" y="592901"/>
+                        <a:pt x="501551" y="1324281"/>
+                      </a:cubicBezTo>
+                      <a:lnTo>
+                        <a:pt x="0" y="1324281"/>
+                      </a:lnTo>
+                      <a:lnTo>
+                        <a:pt x="0" y="0"/>
+                      </a:lnTo>
+                      <a:close/>
+                    </a:path>
+                  </a:pathLst>
+                </a:custGeom>
+                <a:solidFill>
+                  <a:srgbClr val="133E4D"/>
+                </a:solidFill>
+                <a:ln w="19050">
+                  <a:solidFill>
+                    <a:schemeClr val="tx1">
+                      <a:lumMod val="65000"/>
+                      <a:lumOff val="35000"/>
+                    </a:schemeClr>
+                  </a:solidFill>
+                </a:ln>
+              </p:spPr>
+              <p:style>
+                <a:lnRef idx="1">
+                  <a:schemeClr val="accent1"/>
+                </a:lnRef>
+                <a:fillRef idx="0">
+                  <a:schemeClr val="accent1"/>
+                </a:fillRef>
+                <a:effectRef idx="0">
+                  <a:schemeClr val="accent1"/>
+                </a:effectRef>
+                <a:fontRef idx="minor">
+                  <a:schemeClr val="tx1"/>
+                </a:fontRef>
+              </p:style>
+              <p:txBody>
+                <a:bodyPr wrap="square" rtlCol="0" anchor="ctr">
+                  <a:noAutofit/>
+                </a:bodyPr>
+                <a:lstStyle/>
+                <a:p>
+                  <a:pPr algn="ctr"/>
+                  <a:endParaRPr lang="nb-NO"/>
+                </a:p>
+              </p:txBody>
+            </p:sp>
+            <p:sp>
+              <p:nvSpPr>
+                <p:cNvPr id="47" name="Rektangel 46"/>
+                <p:cNvSpPr/>
+                <p:nvPr/>
+              </p:nvSpPr>
+              <p:spPr>
+                <a:xfrm rot="1500000">
+                  <a:off x="7477568" y="5054780"/>
+                  <a:ext cx="510463" cy="45719"/>
+                </a:xfrm>
+                <a:prstGeom prst="rect">
+                  <a:avLst/>
+                </a:prstGeom>
+                <a:solidFill>
+                  <a:srgbClr val="133E4D"/>
+                </a:solidFill>
+                <a:ln>
+                  <a:solidFill>
+                    <a:srgbClr val="133E4D"/>
+                  </a:solidFill>
+                </a:ln>
+              </p:spPr>
+              <p:style>
+                <a:lnRef idx="2">
+                  <a:schemeClr val="accent1">
+                    <a:shade val="50000"/>
+                  </a:schemeClr>
+                </a:lnRef>
+                <a:fillRef idx="1">
+                  <a:schemeClr val="accent1"/>
+                </a:fillRef>
+                <a:effectRef idx="0">
+                  <a:schemeClr val="accent1"/>
+                </a:effectRef>
+                <a:fontRef idx="minor">
+                  <a:schemeClr val="lt1"/>
+                </a:fontRef>
+              </p:style>
+              <p:txBody>
+                <a:bodyPr rtlCol="0" anchor="ctr"/>
+                <a:lstStyle/>
+                <a:p>
+                  <a:pPr algn="ctr"/>
+                  <a:endParaRPr lang="nb-NO"/>
+                </a:p>
+              </p:txBody>
+            </p:sp>
+            <p:sp>
+              <p:nvSpPr>
+                <p:cNvPr id="72" name="Rektangel 71"/>
+                <p:cNvSpPr/>
+                <p:nvPr/>
+              </p:nvSpPr>
+              <p:spPr>
+                <a:xfrm rot="1500000">
+                  <a:off x="7775779" y="3728864"/>
+                  <a:ext cx="45719" cy="1311665"/>
+                </a:xfrm>
+                <a:prstGeom prst="rect">
+                  <a:avLst/>
+                </a:prstGeom>
+                <a:solidFill>
+                  <a:srgbClr val="133E4D"/>
+                </a:solidFill>
+                <a:ln>
+                  <a:solidFill>
+                    <a:srgbClr val="133E4D"/>
+                  </a:solidFill>
+                </a:ln>
+              </p:spPr>
+              <p:style>
+                <a:lnRef idx="2">
+                  <a:schemeClr val="accent1">
+                    <a:shade val="50000"/>
+                  </a:schemeClr>
+                </a:lnRef>
+                <a:fillRef idx="1">
+                  <a:schemeClr val="accent1"/>
+                </a:fillRef>
+                <a:effectRef idx="0">
+                  <a:schemeClr val="accent1"/>
+                </a:effectRef>
+                <a:fontRef idx="minor">
+                  <a:schemeClr val="lt1"/>
+                </a:fontRef>
+              </p:style>
+              <p:txBody>
+                <a:bodyPr rtlCol="0" anchor="ctr"/>
+                <a:lstStyle/>
+                <a:p>
+                  <a:pPr algn="ctr"/>
+                  <a:endParaRPr lang="nb-NO"/>
+                </a:p>
+              </p:txBody>
+            </p:sp>
+          </p:grpSp>
+          <p:grpSp>
+            <p:nvGrpSpPr>
+              <p:cNvPr id="77" name="Gruppe 76"/>
+              <p:cNvGrpSpPr/>
+              <p:nvPr/>
+            </p:nvGrpSpPr>
+            <p:grpSpPr>
+              <a:xfrm flipH="1">
+                <a:off x="5630430" y="3271832"/>
+                <a:ext cx="401696" cy="704399"/>
+                <a:chOff x="7477568" y="3728864"/>
+                <a:chExt cx="807607" cy="1416189"/>
+              </a:xfrm>
+            </p:grpSpPr>
+            <p:sp>
+              <p:nvSpPr>
+                <p:cNvPr id="78" name="Frihåndsform 77"/>
+                <p:cNvSpPr/>
+                <p:nvPr/>
+              </p:nvSpPr>
+              <p:spPr>
+                <a:xfrm rot="1502173">
+                  <a:off x="7783624" y="3820772"/>
+                  <a:ext cx="501551" cy="1324281"/>
+                </a:xfrm>
+                <a:custGeom>
+                  <a:avLst/>
+                  <a:gdLst>
+                    <a:gd name="connsiteX0" fmla="*/ 0 w 501551"/>
+                    <a:gd name="connsiteY0" fmla="*/ 0 h 1324281"/>
+                    <a:gd name="connsiteX1" fmla="*/ 501551 w 501551"/>
+                    <a:gd name="connsiteY1" fmla="*/ 1324281 h 1324281"/>
+                    <a:gd name="connsiteX2" fmla="*/ 0 w 501551"/>
+                    <a:gd name="connsiteY2" fmla="*/ 1324281 h 1324281"/>
+                    <a:gd name="connsiteX3" fmla="*/ 0 w 501551"/>
+                    <a:gd name="connsiteY3" fmla="*/ 0 h 1324281"/>
+                  </a:gdLst>
+                  <a:ahLst/>
+                  <a:cxnLst>
+                    <a:cxn ang="0">
+                      <a:pos x="connsiteX0" y="connsiteY0"/>
+                    </a:cxn>
+                    <a:cxn ang="0">
+                      <a:pos x="connsiteX1" y="connsiteY1"/>
+                    </a:cxn>
+                    <a:cxn ang="0">
+                      <a:pos x="connsiteX2" y="connsiteY2"/>
+                    </a:cxn>
+                    <a:cxn ang="0">
+                      <a:pos x="connsiteX3" y="connsiteY3"/>
+                    </a:cxn>
+                  </a:cxnLst>
+                  <a:rect l="l" t="t" r="r" b="b"/>
+                  <a:pathLst>
+                    <a:path w="501551" h="1324281">
+                      <a:moveTo>
+                        <a:pt x="0" y="0"/>
+                      </a:moveTo>
+                      <a:cubicBezTo>
+                        <a:pt x="276998" y="0"/>
+                        <a:pt x="501550" y="592901"/>
+                        <a:pt x="501551" y="1324281"/>
+                      </a:cubicBezTo>
+                      <a:lnTo>
+                        <a:pt x="0" y="1324281"/>
+                      </a:lnTo>
+                      <a:lnTo>
+                        <a:pt x="0" y="0"/>
+                      </a:lnTo>
+                      <a:close/>
+                    </a:path>
+                  </a:pathLst>
+                </a:custGeom>
+                <a:solidFill>
+                  <a:srgbClr val="133E4D"/>
+                </a:solidFill>
+                <a:ln w="19050">
+                  <a:solidFill>
+                    <a:schemeClr val="tx1">
+                      <a:lumMod val="65000"/>
+                      <a:lumOff val="35000"/>
+                    </a:schemeClr>
+                  </a:solidFill>
+                </a:ln>
+              </p:spPr>
+              <p:style>
+                <a:lnRef idx="1">
+                  <a:schemeClr val="accent1"/>
+                </a:lnRef>
+                <a:fillRef idx="0">
+                  <a:schemeClr val="accent1"/>
+                </a:fillRef>
+                <a:effectRef idx="0">
+                  <a:schemeClr val="accent1"/>
+                </a:effectRef>
+                <a:fontRef idx="minor">
+                  <a:schemeClr val="tx1"/>
+                </a:fontRef>
+              </p:style>
+              <p:txBody>
+                <a:bodyPr wrap="square" rtlCol="0" anchor="ctr">
+                  <a:noAutofit/>
+                </a:bodyPr>
+                <a:lstStyle/>
+                <a:p>
+                  <a:pPr algn="ctr"/>
+                  <a:endParaRPr lang="nb-NO"/>
+                </a:p>
+              </p:txBody>
+            </p:sp>
+            <p:sp>
+              <p:nvSpPr>
+                <p:cNvPr id="79" name="Rektangel 78"/>
+                <p:cNvSpPr/>
+                <p:nvPr/>
+              </p:nvSpPr>
+              <p:spPr>
+                <a:xfrm rot="1500000">
+                  <a:off x="7477568" y="5054780"/>
+                  <a:ext cx="510463" cy="45719"/>
+                </a:xfrm>
+                <a:prstGeom prst="rect">
+                  <a:avLst/>
+                </a:prstGeom>
+                <a:solidFill>
+                  <a:srgbClr val="133E4D"/>
+                </a:solidFill>
+                <a:ln>
+                  <a:solidFill>
+                    <a:srgbClr val="133E4D"/>
+                  </a:solidFill>
+                </a:ln>
+              </p:spPr>
+              <p:style>
+                <a:lnRef idx="2">
+                  <a:schemeClr val="accent1">
+                    <a:shade val="50000"/>
+                  </a:schemeClr>
+                </a:lnRef>
+                <a:fillRef idx="1">
+                  <a:schemeClr val="accent1"/>
+                </a:fillRef>
+                <a:effectRef idx="0">
+                  <a:schemeClr val="accent1"/>
+                </a:effectRef>
+                <a:fontRef idx="minor">
+                  <a:schemeClr val="lt1"/>
+                </a:fontRef>
+              </p:style>
+              <p:txBody>
+                <a:bodyPr rtlCol="0" anchor="ctr"/>
+                <a:lstStyle/>
+                <a:p>
+                  <a:pPr algn="ctr"/>
+                  <a:endParaRPr lang="nb-NO"/>
+                </a:p>
+              </p:txBody>
+            </p:sp>
+            <p:sp>
+              <p:nvSpPr>
+                <p:cNvPr id="80" name="Rektangel 79"/>
+                <p:cNvSpPr/>
+                <p:nvPr/>
+              </p:nvSpPr>
+              <p:spPr>
+                <a:xfrm rot="1500000">
+                  <a:off x="7775779" y="3728864"/>
+                  <a:ext cx="45719" cy="1311665"/>
+                </a:xfrm>
+                <a:prstGeom prst="rect">
+                  <a:avLst/>
+                </a:prstGeom>
+                <a:solidFill>
+                  <a:srgbClr val="133E4D"/>
+                </a:solidFill>
+                <a:ln>
+                  <a:solidFill>
+                    <a:srgbClr val="133E4D"/>
+                  </a:solidFill>
+                </a:ln>
+              </p:spPr>
+              <p:style>
+                <a:lnRef idx="2">
+                  <a:schemeClr val="accent1">
+                    <a:shade val="50000"/>
+                  </a:schemeClr>
+                </a:lnRef>
+                <a:fillRef idx="1">
+                  <a:schemeClr val="accent1"/>
+                </a:fillRef>
+                <a:effectRef idx="0">
+                  <a:schemeClr val="accent1"/>
+                </a:effectRef>
+                <a:fontRef idx="minor">
+                  <a:schemeClr val="lt1"/>
+                </a:fontRef>
+              </p:style>
+              <p:txBody>
+                <a:bodyPr rtlCol="0" anchor="ctr"/>
+                <a:lstStyle/>
+                <a:p>
+                  <a:pPr algn="ctr"/>
+                  <a:endParaRPr lang="nb-NO"/>
+                </a:p>
+              </p:txBody>
+            </p:sp>
+          </p:grpSp>
+          <p:sp>
+            <p:nvSpPr>
+              <p:cNvPr id="59" name="Avrundet rektangel 58"/>
+              <p:cNvSpPr/>
+              <p:nvPr/>
+            </p:nvSpPr>
+            <p:spPr>
+              <a:xfrm>
+                <a:off x="5152292" y="3979900"/>
+                <a:ext cx="643395" cy="97864"/>
+              </a:xfrm>
+              <a:prstGeom prst="roundRect">
+                <a:avLst/>
+              </a:prstGeom>
+              <a:solidFill>
+                <a:schemeClr val="bg1"/>
+              </a:solidFill>
+              <a:ln w="19050">
+                <a:solidFill>
+                  <a:schemeClr val="tx1">
+                    <a:lumMod val="65000"/>
+                    <a:lumOff val="35000"/>
+                  </a:schemeClr>
+                </a:solidFill>
+              </a:ln>
+            </p:spPr>
+            <p:style>
+              <a:lnRef idx="2">
+                <a:schemeClr val="accent1">
+                  <a:shade val="50000"/>
+                </a:schemeClr>
+              </a:lnRef>
+              <a:fillRef idx="1">
+                <a:schemeClr val="accent1"/>
+              </a:fillRef>
+              <a:effectRef idx="0">
+                <a:schemeClr val="accent1"/>
+              </a:effectRef>
+              <a:fontRef idx="minor">
+                <a:schemeClr val="lt1"/>
+              </a:fontRef>
+            </p:style>
+            <p:txBody>
+              <a:bodyPr rtlCol="0" anchor="ctr"/>
+              <a:lstStyle/>
+              <a:p>
+                <a:pPr algn="ctr"/>
+                <a:endParaRPr lang="nb-NO"/>
+              </a:p>
+            </p:txBody>
+          </p:sp>
+          <p:sp>
+            <p:nvSpPr>
+              <p:cNvPr id="60" name="Avrundet rektangel 59"/>
+              <p:cNvSpPr/>
+              <p:nvPr/>
+            </p:nvSpPr>
+            <p:spPr>
+              <a:xfrm>
+                <a:off x="5195729" y="3197842"/>
+                <a:ext cx="556519" cy="97862"/>
+              </a:xfrm>
+              <a:prstGeom prst="roundRect">
+                <a:avLst/>
+              </a:prstGeom>
+              <a:solidFill>
+                <a:schemeClr val="bg1"/>
+              </a:solidFill>
+              <a:ln w="19050">
+                <a:solidFill>
+                  <a:schemeClr val="tx1">
+                    <a:lumMod val="65000"/>
+                    <a:lumOff val="35000"/>
+                  </a:schemeClr>
+                </a:solidFill>
+              </a:ln>
+            </p:spPr>
+            <p:style>
+              <a:lnRef idx="2">
+                <a:schemeClr val="accent1">
+                  <a:shade val="50000"/>
+                </a:schemeClr>
+              </a:lnRef>
+              <a:fillRef idx="1">
+                <a:schemeClr val="accent1"/>
+              </a:fillRef>
+              <a:effectRef idx="0">
+                <a:schemeClr val="accent1"/>
+              </a:effectRef>
+              <a:fontRef idx="minor">
+                <a:schemeClr val="lt1"/>
+              </a:fontRef>
+            </p:style>
+            <p:txBody>
+              <a:bodyPr rtlCol="0" anchor="ctr"/>
+              <a:lstStyle/>
+              <a:p>
+                <a:pPr algn="ctr"/>
+                <a:endParaRPr lang="nb-NO"/>
+              </a:p>
+            </p:txBody>
+          </p:sp>
+          <p:sp>
+            <p:nvSpPr>
+              <p:cNvPr id="63" name="Rektangel 62"/>
+              <p:cNvSpPr/>
+              <p:nvPr/>
+            </p:nvSpPr>
+            <p:spPr>
+              <a:xfrm>
+                <a:off x="5591227" y="2966646"/>
+                <a:ext cx="90491" cy="150058"/>
+              </a:xfrm>
+              <a:prstGeom prst="rect">
+                <a:avLst/>
+              </a:prstGeom>
+              <a:solidFill>
+                <a:srgbClr val="133E4D"/>
+              </a:solidFill>
+              <a:ln w="19050">
+                <a:solidFill>
+                  <a:schemeClr val="tx1">
+                    <a:lumMod val="65000"/>
+                    <a:lumOff val="35000"/>
+                  </a:schemeClr>
+                </a:solidFill>
+              </a:ln>
+            </p:spPr>
+            <p:style>
+              <a:lnRef idx="2">
+                <a:schemeClr val="accent1">
+                  <a:shade val="50000"/>
+                </a:schemeClr>
+              </a:lnRef>
+              <a:fillRef idx="1">
+                <a:schemeClr val="accent1"/>
+              </a:fillRef>
+              <a:effectRef idx="0">
+                <a:schemeClr val="accent1"/>
+              </a:effectRef>
+              <a:fontRef idx="minor">
+                <a:schemeClr val="lt1"/>
+              </a:fontRef>
+            </p:style>
+            <p:txBody>
+              <a:bodyPr rtlCol="0" anchor="ctr"/>
+              <a:lstStyle/>
+              <a:p>
+                <a:pPr algn="ctr"/>
+                <a:endParaRPr lang="nb-NO"/>
+              </a:p>
+            </p:txBody>
+          </p:sp>
+          <p:sp>
+            <p:nvSpPr>
+              <p:cNvPr id="81" name="Rektangel 80"/>
+              <p:cNvSpPr/>
+              <p:nvPr/>
+            </p:nvSpPr>
+            <p:spPr>
+              <a:xfrm>
+                <a:off x="5610162" y="2966645"/>
+                <a:ext cx="53404" cy="45719"/>
+              </a:xfrm>
+              <a:prstGeom prst="rect">
+                <a:avLst/>
+              </a:prstGeom>
+              <a:solidFill>
+                <a:srgbClr val="133E4D"/>
+              </a:solidFill>
+              <a:ln w="19050">
+                <a:solidFill>
+                  <a:srgbClr val="133E4D"/>
+                </a:solidFill>
+              </a:ln>
+            </p:spPr>
+            <p:style>
+              <a:lnRef idx="2">
+                <a:schemeClr val="accent1">
+                  <a:shade val="50000"/>
+                </a:schemeClr>
+              </a:lnRef>
+              <a:fillRef idx="1">
+                <a:schemeClr val="accent1"/>
+              </a:fillRef>
+              <a:effectRef idx="0">
+                <a:schemeClr val="accent1"/>
+              </a:effectRef>
+              <a:fontRef idx="minor">
+                <a:schemeClr val="lt1"/>
+              </a:fontRef>
+            </p:style>
+            <p:txBody>
+              <a:bodyPr rtlCol="0" anchor="ctr"/>
+              <a:lstStyle/>
+              <a:p>
+                <a:pPr algn="ctr"/>
+                <a:endParaRPr lang="nb-NO"/>
+              </a:p>
+            </p:txBody>
+          </p:sp>
+          <p:sp>
+            <p:nvSpPr>
+              <p:cNvPr id="84" name="Rektangel 83"/>
+              <p:cNvSpPr/>
+              <p:nvPr/>
+            </p:nvSpPr>
+            <p:spPr>
+              <a:xfrm>
+                <a:off x="5268950" y="2966646"/>
+                <a:ext cx="90491" cy="150058"/>
+              </a:xfrm>
+              <a:prstGeom prst="rect">
+                <a:avLst/>
+              </a:prstGeom>
+              <a:solidFill>
+                <a:srgbClr val="133E4D"/>
+              </a:solidFill>
+              <a:ln w="19050">
+                <a:solidFill>
+                  <a:schemeClr val="tx1">
+                    <a:lumMod val="65000"/>
+                    <a:lumOff val="35000"/>
+                  </a:schemeClr>
+                </a:solidFill>
+              </a:ln>
+            </p:spPr>
+            <p:style>
+              <a:lnRef idx="2">
+                <a:schemeClr val="accent1">
+                  <a:shade val="50000"/>
+                </a:schemeClr>
+              </a:lnRef>
+              <a:fillRef idx="1">
+                <a:schemeClr val="accent1"/>
+              </a:fillRef>
+              <a:effectRef idx="0">
+                <a:schemeClr val="accent1"/>
+              </a:effectRef>
+              <a:fontRef idx="minor">
+                <a:schemeClr val="lt1"/>
+              </a:fontRef>
+            </p:style>
+            <p:txBody>
+              <a:bodyPr rtlCol="0" anchor="ctr"/>
+              <a:lstStyle/>
+              <a:p>
+                <a:pPr algn="ctr"/>
+                <a:endParaRPr lang="nb-NO"/>
+              </a:p>
+            </p:txBody>
+          </p:sp>
+          <p:sp>
+            <p:nvSpPr>
+              <p:cNvPr id="85" name="Rektangel 84"/>
+              <p:cNvSpPr/>
+              <p:nvPr/>
+            </p:nvSpPr>
+            <p:spPr>
+              <a:xfrm>
+                <a:off x="5288280" y="2966645"/>
+                <a:ext cx="51999" cy="45719"/>
+              </a:xfrm>
+              <a:prstGeom prst="rect">
+                <a:avLst/>
+              </a:prstGeom>
+              <a:solidFill>
+                <a:srgbClr val="133E4D"/>
+              </a:solidFill>
+              <a:ln w="19050">
+                <a:solidFill>
+                  <a:srgbClr val="133E4D"/>
+                </a:solidFill>
+              </a:ln>
+            </p:spPr>
+            <p:style>
+              <a:lnRef idx="2">
+                <a:schemeClr val="accent1">
+                  <a:shade val="50000"/>
+                </a:schemeClr>
+              </a:lnRef>
+              <a:fillRef idx="1">
+                <a:schemeClr val="accent1"/>
+              </a:fillRef>
+              <a:effectRef idx="0">
+                <a:schemeClr val="accent1"/>
+              </a:effectRef>
+              <a:fontRef idx="minor">
+                <a:schemeClr val="lt1"/>
+              </a:fontRef>
+            </p:style>
+            <p:txBody>
+              <a:bodyPr rtlCol="0" anchor="ctr"/>
+              <a:lstStyle/>
+              <a:p>
+                <a:pPr algn="ctr"/>
+                <a:endParaRPr lang="nb-NO"/>
+              </a:p>
+            </p:txBody>
+          </p:sp>
+          <p:sp>
+            <p:nvSpPr>
+              <p:cNvPr id="88" name="Rektangel 87"/>
+              <p:cNvSpPr/>
+              <p:nvPr/>
+            </p:nvSpPr>
+            <p:spPr>
+              <a:xfrm>
+                <a:off x="5702598" y="3101584"/>
+                <a:ext cx="54311" cy="45719"/>
+              </a:xfrm>
+              <a:prstGeom prst="rect">
+                <a:avLst/>
+              </a:prstGeom>
+              <a:solidFill>
+                <a:schemeClr val="bg1"/>
+              </a:solidFill>
+              <a:ln w="19050">
+                <a:solidFill>
+                  <a:schemeClr val="bg1"/>
+                </a:solidFill>
+              </a:ln>
+            </p:spPr>
+            <p:style>
+              <a:lnRef idx="2">
+                <a:schemeClr val="accent1">
+                  <a:shade val="50000"/>
+                </a:schemeClr>
+              </a:lnRef>
+              <a:fillRef idx="1">
+                <a:schemeClr val="accent1"/>
+              </a:fillRef>
+              <a:effectRef idx="0">
+                <a:schemeClr val="accent1"/>
+              </a:effectRef>
+              <a:fontRef idx="minor">
+                <a:schemeClr val="lt1"/>
+              </a:fontRef>
+            </p:style>
+            <p:txBody>
+              <a:bodyPr rtlCol="0" anchor="ctr"/>
+              <a:lstStyle/>
+              <a:p>
+                <a:pPr algn="ctr"/>
+                <a:endParaRPr lang="nb-NO"/>
+              </a:p>
+            </p:txBody>
+          </p:sp>
+          <p:sp>
+            <p:nvSpPr>
+              <p:cNvPr id="89" name="Rektangel 88"/>
+              <p:cNvSpPr/>
+              <p:nvPr/>
+            </p:nvSpPr>
+            <p:spPr>
+              <a:xfrm>
+                <a:off x="5193029" y="3097558"/>
+                <a:ext cx="52727" cy="45719"/>
+              </a:xfrm>
+              <a:prstGeom prst="rect">
+                <a:avLst/>
+              </a:prstGeom>
+              <a:solidFill>
+                <a:schemeClr val="bg1"/>
+              </a:solidFill>
+              <a:ln w="19050">
+                <a:solidFill>
+                  <a:schemeClr val="bg1"/>
+                </a:solidFill>
+              </a:ln>
+            </p:spPr>
+            <p:style>
+              <a:lnRef idx="2">
+                <a:schemeClr val="accent1">
+                  <a:shade val="50000"/>
+                </a:schemeClr>
+              </a:lnRef>
+              <a:fillRef idx="1">
+                <a:schemeClr val="accent1"/>
+              </a:fillRef>
+              <a:effectRef idx="0">
+                <a:schemeClr val="accent1"/>
+              </a:effectRef>
+              <a:fontRef idx="minor">
+                <a:schemeClr val="lt1"/>
+              </a:fontRef>
+            </p:style>
+            <p:txBody>
+              <a:bodyPr rtlCol="0" anchor="ctr"/>
+              <a:lstStyle/>
+              <a:p>
+                <a:pPr algn="ctr"/>
+                <a:endParaRPr lang="nb-NO"/>
+              </a:p>
+            </p:txBody>
+          </p:sp>
+        </p:grpSp>
       </p:grpSp>
+    </p:spTree>
+    <p:extLst>
+      <p:ext uri="{BB962C8B-B14F-4D97-AF65-F5344CB8AC3E}">
+        <p14:creationId xmlns:p14="http://schemas.microsoft.com/office/powerpoint/2010/main" val="3364746252"/>
+      </p:ext>
+    </p:extLst>
+  </p:cSld>
+  <p:clrMapOvr>
+    <a:masterClrMapping/>
+  </p:clrMapOvr>
+  <p:timing>
+    <p:tnLst>
+      <p:par>
+        <p:cTn id="1" dur="indefinite" restart="never" nodeType="tmRoot"/>
+      </p:par>
+    </p:tnLst>
+  </p:timing>
+</p:sld>
+</file>
+
+<file path=ppt/slides/slide6.xml><?xml version="1.0" encoding="utf-8"?>
+<p:sld xmlns:a="http://schemas.openxmlformats.org/drawingml/2006/main" xmlns:r="http://schemas.openxmlformats.org/officeDocument/2006/relationships" xmlns:p="http://schemas.openxmlformats.org/presentationml/2006/main">
+  <p:cSld>
+    <p:spTree>
+      <p:nvGrpSpPr>
+        <p:cNvPr id="1" name=""/>
+        <p:cNvGrpSpPr/>
+        <p:nvPr/>
+      </p:nvGrpSpPr>
+      <p:grpSpPr>
+        <a:xfrm>
+          <a:off x="0" y="0"/>
+          <a:ext cx="0" cy="0"/>
+          <a:chOff x="0" y="0"/>
+          <a:chExt cx="0" cy="0"/>
+        </a:xfrm>
+      </p:grpSpPr>
       <p:sp>
         <p:nvSpPr>
-          <p:cNvPr id="3" name="Avrundet rektangel 2"/>
+          <p:cNvPr id="19" name="Rektangel 18"/>
           <p:cNvSpPr/>
           <p:nvPr/>
         </p:nvSpPr>
         <p:spPr>
           <a:xfrm>
-            <a:off x="7861610" y="2955073"/>
-            <a:ext cx="1505414" cy="254661"/>
+            <a:off x="8117299" y="-1028013"/>
+            <a:ext cx="2548328" cy="2191801"/>
           </a:xfrm>
-          <a:prstGeom prst="roundRect">
+          <a:prstGeom prst="rect">
             <a:avLst/>
           </a:prstGeom>
         </p:spPr>
@@ -13488,448 +13173,6 @@
           </a:p>
         </p:txBody>
       </p:sp>
-      <p:sp>
-        <p:nvSpPr>
-          <p:cNvPr id="48" name="Avrundet rektangel 47"/>
-          <p:cNvSpPr/>
-          <p:nvPr/>
-        </p:nvSpPr>
-        <p:spPr>
-          <a:xfrm>
-            <a:off x="7967546" y="2758319"/>
-            <a:ext cx="1293541" cy="196754"/>
-          </a:xfrm>
-          <a:prstGeom prst="roundRect">
-            <a:avLst/>
-          </a:prstGeom>
-        </p:spPr>
-        <p:style>
-          <a:lnRef idx="2">
-            <a:schemeClr val="accent1">
-              <a:shade val="50000"/>
-            </a:schemeClr>
-          </a:lnRef>
-          <a:fillRef idx="1">
-            <a:schemeClr val="accent1"/>
-          </a:fillRef>
-          <a:effectRef idx="0">
-            <a:schemeClr val="accent1"/>
-          </a:effectRef>
-          <a:fontRef idx="minor">
-            <a:schemeClr val="lt1"/>
-          </a:fontRef>
-        </p:style>
-        <p:txBody>
-          <a:bodyPr rtlCol="0" anchor="ctr"/>
-          <a:lstStyle/>
-          <a:p>
-            <a:pPr algn="ctr"/>
-            <a:endParaRPr lang="nb-NO"/>
-          </a:p>
-        </p:txBody>
-      </p:sp>
-      <p:sp>
-        <p:nvSpPr>
-          <p:cNvPr id="49" name="Avrundet rektangel 48"/>
-          <p:cNvSpPr/>
-          <p:nvPr/>
-        </p:nvSpPr>
-        <p:spPr>
-          <a:xfrm>
-            <a:off x="7967546" y="1185997"/>
-            <a:ext cx="1293541" cy="196754"/>
-          </a:xfrm>
-          <a:prstGeom prst="roundRect">
-            <a:avLst/>
-          </a:prstGeom>
-        </p:spPr>
-        <p:style>
-          <a:lnRef idx="2">
-            <a:schemeClr val="accent1">
-              <a:shade val="50000"/>
-            </a:schemeClr>
-          </a:lnRef>
-          <a:fillRef idx="1">
-            <a:schemeClr val="accent1"/>
-          </a:fillRef>
-          <a:effectRef idx="0">
-            <a:schemeClr val="accent1"/>
-          </a:effectRef>
-          <a:fontRef idx="minor">
-            <a:schemeClr val="lt1"/>
-          </a:fontRef>
-        </p:style>
-        <p:txBody>
-          <a:bodyPr rtlCol="0" anchor="ctr"/>
-          <a:lstStyle/>
-          <a:p>
-            <a:pPr algn="ctr"/>
-            <a:endParaRPr lang="nb-NO"/>
-          </a:p>
-        </p:txBody>
-      </p:sp>
-      <p:sp>
-        <p:nvSpPr>
-          <p:cNvPr id="55" name="Bue 54"/>
-          <p:cNvSpPr/>
-          <p:nvPr/>
-        </p:nvSpPr>
-        <p:spPr>
-          <a:xfrm rot="1502173">
-            <a:off x="7025425" y="1220214"/>
-            <a:ext cx="1003100" cy="2648561"/>
-          </a:xfrm>
-          <a:prstGeom prst="arc">
-            <a:avLst/>
-          </a:prstGeom>
-        </p:spPr>
-        <p:style>
-          <a:lnRef idx="1">
-            <a:schemeClr val="accent1"/>
-          </a:lnRef>
-          <a:fillRef idx="0">
-            <a:schemeClr val="accent1"/>
-          </a:fillRef>
-          <a:effectRef idx="0">
-            <a:schemeClr val="accent1"/>
-          </a:effectRef>
-          <a:fontRef idx="minor">
-            <a:schemeClr val="tx1"/>
-          </a:fontRef>
-        </p:style>
-        <p:txBody>
-          <a:bodyPr rtlCol="0" anchor="ctr"/>
-          <a:lstStyle/>
-          <a:p>
-            <a:pPr algn="ctr"/>
-            <a:endParaRPr lang="nb-NO"/>
-          </a:p>
-        </p:txBody>
-      </p:sp>
-      <p:sp>
-        <p:nvSpPr>
-          <p:cNvPr id="56" name="Bue 55"/>
-          <p:cNvSpPr/>
-          <p:nvPr/>
-        </p:nvSpPr>
-        <p:spPr>
-          <a:xfrm rot="20097827" flipH="1">
-            <a:off x="9141749" y="1220213"/>
-            <a:ext cx="1003100" cy="2648561"/>
-          </a:xfrm>
-          <a:prstGeom prst="arc">
-            <a:avLst/>
-          </a:prstGeom>
-        </p:spPr>
-        <p:style>
-          <a:lnRef idx="1">
-            <a:schemeClr val="accent1"/>
-          </a:lnRef>
-          <a:fillRef idx="0">
-            <a:schemeClr val="accent1"/>
-          </a:fillRef>
-          <a:effectRef idx="0">
-            <a:schemeClr val="accent1"/>
-          </a:effectRef>
-          <a:fontRef idx="minor">
-            <a:schemeClr val="tx1"/>
-          </a:fontRef>
-        </p:style>
-        <p:txBody>
-          <a:bodyPr rtlCol="0" anchor="ctr"/>
-          <a:lstStyle/>
-          <a:p>
-            <a:pPr algn="ctr"/>
-            <a:endParaRPr lang="nb-NO"/>
-          </a:p>
-        </p:txBody>
-      </p:sp>
-      <p:sp>
-        <p:nvSpPr>
-          <p:cNvPr id="71" name="Frihåndsform 70"/>
-          <p:cNvSpPr/>
-          <p:nvPr/>
-        </p:nvSpPr>
-        <p:spPr>
-          <a:xfrm rot="1502173">
-            <a:off x="8726205" y="3923147"/>
-            <a:ext cx="1065617" cy="1234565"/>
-          </a:xfrm>
-          <a:custGeom>
-            <a:avLst/>
-            <a:gdLst>
-              <a:gd name="connsiteX0" fmla="*/ 50084 w 1065617"/>
-              <a:gd name="connsiteY0" fmla="*/ 0 h 1234565"/>
-              <a:gd name="connsiteX1" fmla="*/ 1065617 w 1065617"/>
-              <a:gd name="connsiteY1" fmla="*/ 849948 h 1234565"/>
-              <a:gd name="connsiteX2" fmla="*/ 743714 w 1065617"/>
-              <a:gd name="connsiteY2" fmla="*/ 1234565 h 1234565"/>
-              <a:gd name="connsiteX3" fmla="*/ 50084 w 1065617"/>
-              <a:gd name="connsiteY3" fmla="*/ 0 h 1234565"/>
-            </a:gdLst>
-            <a:ahLst/>
-            <a:cxnLst>
-              <a:cxn ang="0">
-                <a:pos x="connsiteX0" y="connsiteY0"/>
-              </a:cxn>
-              <a:cxn ang="0">
-                <a:pos x="connsiteX1" y="connsiteY1"/>
-              </a:cxn>
-              <a:cxn ang="0">
-                <a:pos x="connsiteX2" y="connsiteY2"/>
-              </a:cxn>
-              <a:cxn ang="0">
-                <a:pos x="connsiteX3" y="connsiteY3"/>
-              </a:cxn>
-            </a:cxnLst>
-            <a:rect l="l" t="t" r="r" b="b"/>
-            <a:pathLst>
-              <a:path w="1065617" h="1234565">
-                <a:moveTo>
-                  <a:pt x="50084" y="0"/>
-                </a:moveTo>
-                <a:lnTo>
-                  <a:pt x="1065617" y="849948"/>
-                </a:lnTo>
-                <a:lnTo>
-                  <a:pt x="743714" y="1234565"/>
-                </a:lnTo>
-                <a:cubicBezTo>
-                  <a:pt x="182850" y="765152"/>
-                  <a:pt x="-127699" y="212417"/>
-                  <a:pt x="50084" y="0"/>
-                </a:cubicBezTo>
-                <a:close/>
-              </a:path>
-            </a:pathLst>
-          </a:custGeom>
-          <a:solidFill>
-            <a:srgbClr val="133E4D"/>
-          </a:solidFill>
-          <a:ln>
-            <a:solidFill>
-              <a:srgbClr val="133E4D"/>
-            </a:solidFill>
-          </a:ln>
-        </p:spPr>
-        <p:style>
-          <a:lnRef idx="1">
-            <a:schemeClr val="accent1"/>
-          </a:lnRef>
-          <a:fillRef idx="0">
-            <a:schemeClr val="accent1"/>
-          </a:fillRef>
-          <a:effectRef idx="0">
-            <a:schemeClr val="accent1"/>
-          </a:effectRef>
-          <a:fontRef idx="minor">
-            <a:schemeClr val="tx1"/>
-          </a:fontRef>
-        </p:style>
-        <p:txBody>
-          <a:bodyPr wrap="square" rtlCol="0" anchor="ctr">
-            <a:noAutofit/>
-          </a:bodyPr>
-          <a:lstStyle/>
-          <a:p>
-            <a:pPr algn="ctr"/>
-            <a:endParaRPr lang="nb-NO"/>
-          </a:p>
-        </p:txBody>
-      </p:sp>
-      <p:sp>
-        <p:nvSpPr>
-          <p:cNvPr id="70" name="Frihåndsform 69"/>
-          <p:cNvSpPr/>
-          <p:nvPr/>
-        </p:nvSpPr>
-        <p:spPr>
-          <a:xfrm rot="1502173">
-            <a:off x="7783624" y="3820774"/>
-            <a:ext cx="501551" cy="1324281"/>
-          </a:xfrm>
-          <a:custGeom>
-            <a:avLst/>
-            <a:gdLst>
-              <a:gd name="connsiteX0" fmla="*/ 0 w 501551"/>
-              <a:gd name="connsiteY0" fmla="*/ 0 h 1324281"/>
-              <a:gd name="connsiteX1" fmla="*/ 501551 w 501551"/>
-              <a:gd name="connsiteY1" fmla="*/ 1324281 h 1324281"/>
-              <a:gd name="connsiteX2" fmla="*/ 0 w 501551"/>
-              <a:gd name="connsiteY2" fmla="*/ 1324281 h 1324281"/>
-              <a:gd name="connsiteX3" fmla="*/ 0 w 501551"/>
-              <a:gd name="connsiteY3" fmla="*/ 0 h 1324281"/>
-            </a:gdLst>
-            <a:ahLst/>
-            <a:cxnLst>
-              <a:cxn ang="0">
-                <a:pos x="connsiteX0" y="connsiteY0"/>
-              </a:cxn>
-              <a:cxn ang="0">
-                <a:pos x="connsiteX1" y="connsiteY1"/>
-              </a:cxn>
-              <a:cxn ang="0">
-                <a:pos x="connsiteX2" y="connsiteY2"/>
-              </a:cxn>
-              <a:cxn ang="0">
-                <a:pos x="connsiteX3" y="connsiteY3"/>
-              </a:cxn>
-            </a:cxnLst>
-            <a:rect l="l" t="t" r="r" b="b"/>
-            <a:pathLst>
-              <a:path w="501551" h="1324281">
-                <a:moveTo>
-                  <a:pt x="0" y="0"/>
-                </a:moveTo>
-                <a:cubicBezTo>
-                  <a:pt x="276998" y="0"/>
-                  <a:pt x="501550" y="592901"/>
-                  <a:pt x="501551" y="1324281"/>
-                </a:cubicBezTo>
-                <a:lnTo>
-                  <a:pt x="0" y="1324281"/>
-                </a:lnTo>
-                <a:lnTo>
-                  <a:pt x="0" y="0"/>
-                </a:lnTo>
-                <a:close/>
-              </a:path>
-            </a:pathLst>
-          </a:custGeom>
-          <a:solidFill>
-            <a:srgbClr val="133E4D"/>
-          </a:solidFill>
-          <a:ln>
-            <a:solidFill>
-              <a:srgbClr val="133E4D"/>
-            </a:solidFill>
-          </a:ln>
-        </p:spPr>
-        <p:style>
-          <a:lnRef idx="1">
-            <a:schemeClr val="accent1"/>
-          </a:lnRef>
-          <a:fillRef idx="0">
-            <a:schemeClr val="accent1"/>
-          </a:fillRef>
-          <a:effectRef idx="0">
-            <a:schemeClr val="accent1"/>
-          </a:effectRef>
-          <a:fontRef idx="minor">
-            <a:schemeClr val="tx1"/>
-          </a:fontRef>
-        </p:style>
-        <p:txBody>
-          <a:bodyPr wrap="square" rtlCol="0" anchor="ctr">
-            <a:noAutofit/>
-          </a:bodyPr>
-          <a:lstStyle/>
-          <a:p>
-            <a:pPr algn="ctr"/>
-            <a:endParaRPr lang="nb-NO"/>
-          </a:p>
-        </p:txBody>
-      </p:sp>
-      <p:cxnSp>
-        <p:nvCxnSpPr>
-          <p:cNvPr id="46" name="Rett linje 45"/>
-          <p:cNvCxnSpPr/>
-          <p:nvPr/>
-        </p:nvCxnSpPr>
-        <p:spPr>
-          <a:xfrm flipV="1">
-            <a:off x="8087398" y="3776862"/>
-            <a:ext cx="995476" cy="1"/>
-          </a:xfrm>
-          <a:prstGeom prst="line">
-            <a:avLst/>
-          </a:prstGeom>
-          <a:ln>
-            <a:solidFill>
-              <a:srgbClr val="979EA6"/>
-            </a:solidFill>
-          </a:ln>
-        </p:spPr>
-        <p:style>
-          <a:lnRef idx="1">
-            <a:schemeClr val="accent1"/>
-          </a:lnRef>
-          <a:fillRef idx="0">
-            <a:schemeClr val="accent1"/>
-          </a:fillRef>
-          <a:effectRef idx="0">
-            <a:schemeClr val="accent1"/>
-          </a:effectRef>
-          <a:fontRef idx="minor">
-            <a:schemeClr val="tx1"/>
-          </a:fontRef>
-        </p:style>
-      </p:cxnSp>
-      <p:cxnSp>
-        <p:nvCxnSpPr>
-          <p:cNvPr id="58" name="Rett linje 57"/>
-          <p:cNvCxnSpPr/>
-          <p:nvPr/>
-        </p:nvCxnSpPr>
-        <p:spPr>
-          <a:xfrm flipV="1">
-            <a:off x="7981398" y="5188965"/>
-            <a:ext cx="1207476" cy="1"/>
-          </a:xfrm>
-          <a:prstGeom prst="line">
-            <a:avLst/>
-          </a:prstGeom>
-          <a:ln>
-            <a:solidFill>
-              <a:srgbClr val="979EA6"/>
-            </a:solidFill>
-          </a:ln>
-        </p:spPr>
-        <p:style>
-          <a:lnRef idx="1">
-            <a:schemeClr val="accent1"/>
-          </a:lnRef>
-          <a:fillRef idx="0">
-            <a:schemeClr val="accent1"/>
-          </a:fillRef>
-          <a:effectRef idx="0">
-            <a:schemeClr val="accent1"/>
-          </a:effectRef>
-          <a:fontRef idx="minor">
-            <a:schemeClr val="tx1"/>
-          </a:fontRef>
-        </p:style>
-      </p:cxnSp>
-    </p:spTree>
-    <p:extLst>
-      <p:ext uri="{BB962C8B-B14F-4D97-AF65-F5344CB8AC3E}">
-        <p14:creationId xmlns:p14="http://schemas.microsoft.com/office/powerpoint/2010/main" val="3364746252"/>
-      </p:ext>
-    </p:extLst>
-  </p:cSld>
-  <p:clrMapOvr>
-    <a:masterClrMapping/>
-  </p:clrMapOvr>
-</p:sld>
-</file>
-
-<file path=ppt/slides/slide6.xml><?xml version="1.0" encoding="utf-8"?>
-<p:sld xmlns:a="http://schemas.openxmlformats.org/drawingml/2006/main" xmlns:r="http://schemas.openxmlformats.org/officeDocument/2006/relationships" xmlns:p="http://schemas.openxmlformats.org/presentationml/2006/main">
-  <p:cSld>
-    <p:spTree>
-      <p:nvGrpSpPr>
-        <p:cNvPr id="1" name=""/>
-        <p:cNvGrpSpPr/>
-        <p:nvPr/>
-      </p:nvGrpSpPr>
-      <p:grpSpPr>
-        <a:xfrm>
-          <a:off x="0" y="0"/>
-          <a:ext cx="0" cy="0"/>
-          <a:chOff x="0" y="0"/>
-          <a:chExt cx="0" cy="0"/>
-        </a:xfrm>
-      </p:grpSpPr>
       <p:sp>
         <p:nvSpPr>
           <p:cNvPr id="2" name="Hexagon 35">
@@ -14637,202 +13880,6 @@
               </a:solidFill>
               <a:latin typeface="Trebuchet MS" panose="020B0603020202020204" pitchFamily="34" charset="0"/>
             </a:endParaRPr>
-          </a:p>
-        </p:txBody>
-      </p:sp>
-      <p:sp>
-        <p:nvSpPr>
-          <p:cNvPr id="3" name="Avrundet rektangel 2"/>
-          <p:cNvSpPr/>
-          <p:nvPr/>
-        </p:nvSpPr>
-        <p:spPr>
-          <a:xfrm>
-            <a:off x="7861610" y="2955073"/>
-            <a:ext cx="1505414" cy="254661"/>
-          </a:xfrm>
-          <a:prstGeom prst="roundRect">
-            <a:avLst/>
-          </a:prstGeom>
-        </p:spPr>
-        <p:style>
-          <a:lnRef idx="2">
-            <a:schemeClr val="accent1">
-              <a:shade val="50000"/>
-            </a:schemeClr>
-          </a:lnRef>
-          <a:fillRef idx="1">
-            <a:schemeClr val="accent1"/>
-          </a:fillRef>
-          <a:effectRef idx="0">
-            <a:schemeClr val="accent1"/>
-          </a:effectRef>
-          <a:fontRef idx="minor">
-            <a:schemeClr val="lt1"/>
-          </a:fontRef>
-        </p:style>
-        <p:txBody>
-          <a:bodyPr rtlCol="0" anchor="ctr"/>
-          <a:lstStyle/>
-          <a:p>
-            <a:pPr algn="ctr"/>
-            <a:endParaRPr lang="nb-NO"/>
-          </a:p>
-        </p:txBody>
-      </p:sp>
-      <p:sp>
-        <p:nvSpPr>
-          <p:cNvPr id="48" name="Avrundet rektangel 47"/>
-          <p:cNvSpPr/>
-          <p:nvPr/>
-        </p:nvSpPr>
-        <p:spPr>
-          <a:xfrm>
-            <a:off x="7967546" y="2758319"/>
-            <a:ext cx="1293541" cy="196754"/>
-          </a:xfrm>
-          <a:prstGeom prst="roundRect">
-            <a:avLst/>
-          </a:prstGeom>
-        </p:spPr>
-        <p:style>
-          <a:lnRef idx="2">
-            <a:schemeClr val="accent1">
-              <a:shade val="50000"/>
-            </a:schemeClr>
-          </a:lnRef>
-          <a:fillRef idx="1">
-            <a:schemeClr val="accent1"/>
-          </a:fillRef>
-          <a:effectRef idx="0">
-            <a:schemeClr val="accent1"/>
-          </a:effectRef>
-          <a:fontRef idx="minor">
-            <a:schemeClr val="lt1"/>
-          </a:fontRef>
-        </p:style>
-        <p:txBody>
-          <a:bodyPr rtlCol="0" anchor="ctr"/>
-          <a:lstStyle/>
-          <a:p>
-            <a:pPr algn="ctr"/>
-            <a:endParaRPr lang="nb-NO"/>
-          </a:p>
-        </p:txBody>
-      </p:sp>
-      <p:sp>
-        <p:nvSpPr>
-          <p:cNvPr id="49" name="Avrundet rektangel 48"/>
-          <p:cNvSpPr/>
-          <p:nvPr/>
-        </p:nvSpPr>
-        <p:spPr>
-          <a:xfrm>
-            <a:off x="7967546" y="1185997"/>
-            <a:ext cx="1293541" cy="196754"/>
-          </a:xfrm>
-          <a:prstGeom prst="roundRect">
-            <a:avLst/>
-          </a:prstGeom>
-        </p:spPr>
-        <p:style>
-          <a:lnRef idx="2">
-            <a:schemeClr val="accent1">
-              <a:shade val="50000"/>
-            </a:schemeClr>
-          </a:lnRef>
-          <a:fillRef idx="1">
-            <a:schemeClr val="accent1"/>
-          </a:fillRef>
-          <a:effectRef idx="0">
-            <a:schemeClr val="accent1"/>
-          </a:effectRef>
-          <a:fontRef idx="minor">
-            <a:schemeClr val="lt1"/>
-          </a:fontRef>
-        </p:style>
-        <p:txBody>
-          <a:bodyPr rtlCol="0" anchor="ctr"/>
-          <a:lstStyle/>
-          <a:p>
-            <a:pPr algn="ctr"/>
-            <a:endParaRPr lang="nb-NO"/>
-          </a:p>
-        </p:txBody>
-      </p:sp>
-      <p:sp>
-        <p:nvSpPr>
-          <p:cNvPr id="31" name="Bue 30"/>
-          <p:cNvSpPr/>
-          <p:nvPr/>
-        </p:nvSpPr>
-        <p:spPr>
-          <a:xfrm rot="1502173">
-            <a:off x="7025425" y="1220214"/>
-            <a:ext cx="1003100" cy="2648561"/>
-          </a:xfrm>
-          <a:prstGeom prst="arc">
-            <a:avLst/>
-          </a:prstGeom>
-        </p:spPr>
-        <p:style>
-          <a:lnRef idx="1">
-            <a:schemeClr val="accent1"/>
-          </a:lnRef>
-          <a:fillRef idx="0">
-            <a:schemeClr val="accent1"/>
-          </a:fillRef>
-          <a:effectRef idx="0">
-            <a:schemeClr val="accent1"/>
-          </a:effectRef>
-          <a:fontRef idx="minor">
-            <a:schemeClr val="tx1"/>
-          </a:fontRef>
-        </p:style>
-        <p:txBody>
-          <a:bodyPr rtlCol="0" anchor="ctr"/>
-          <a:lstStyle/>
-          <a:p>
-            <a:pPr algn="ctr"/>
-            <a:endParaRPr lang="nb-NO"/>
-          </a:p>
-        </p:txBody>
-      </p:sp>
-      <p:sp>
-        <p:nvSpPr>
-          <p:cNvPr id="54" name="Bue 53"/>
-          <p:cNvSpPr/>
-          <p:nvPr/>
-        </p:nvSpPr>
-        <p:spPr>
-          <a:xfrm rot="20097827" flipH="1">
-            <a:off x="9141749" y="1220213"/>
-            <a:ext cx="1003100" cy="2648561"/>
-          </a:xfrm>
-          <a:prstGeom prst="arc">
-            <a:avLst/>
-          </a:prstGeom>
-        </p:spPr>
-        <p:style>
-          <a:lnRef idx="1">
-            <a:schemeClr val="accent1"/>
-          </a:lnRef>
-          <a:fillRef idx="0">
-            <a:schemeClr val="accent1"/>
-          </a:fillRef>
-          <a:effectRef idx="0">
-            <a:schemeClr val="accent1"/>
-          </a:effectRef>
-          <a:fontRef idx="minor">
-            <a:schemeClr val="tx1"/>
-          </a:fontRef>
-        </p:style>
-        <p:txBody>
-          <a:bodyPr rtlCol="0" anchor="ctr"/>
-          <a:lstStyle/>
-          <a:p>
-            <a:pPr algn="ctr"/>
-            <a:endParaRPr lang="nb-NO"/>
           </a:p>
         </p:txBody>
       </p:sp>
@@ -16006,6 +15053,764 @@
           </p:style>
         </p:cxnSp>
       </p:grpSp>
+      <p:sp>
+        <p:nvSpPr>
+          <p:cNvPr id="18" name="Ellipse 17"/>
+          <p:cNvSpPr/>
+          <p:nvPr/>
+        </p:nvSpPr>
+        <p:spPr>
+          <a:xfrm>
+            <a:off x="9022166" y="1762144"/>
+            <a:ext cx="262042" cy="267824"/>
+          </a:xfrm>
+          <a:prstGeom prst="ellipse">
+            <a:avLst/>
+          </a:prstGeom>
+          <a:solidFill>
+            <a:schemeClr val="bg1"/>
+          </a:solidFill>
+          <a:ln>
+            <a:solidFill>
+              <a:schemeClr val="tx1">
+                <a:lumMod val="65000"/>
+                <a:lumOff val="35000"/>
+              </a:schemeClr>
+            </a:solidFill>
+          </a:ln>
+        </p:spPr>
+        <p:style>
+          <a:lnRef idx="2">
+            <a:schemeClr val="accent1">
+              <a:shade val="50000"/>
+            </a:schemeClr>
+          </a:lnRef>
+          <a:fillRef idx="1">
+            <a:schemeClr val="accent1"/>
+          </a:fillRef>
+          <a:effectRef idx="0">
+            <a:schemeClr val="accent1"/>
+          </a:effectRef>
+          <a:fontRef idx="minor">
+            <a:schemeClr val="lt1"/>
+          </a:fontRef>
+        </p:style>
+        <p:txBody>
+          <a:bodyPr rtlCol="0" anchor="ctr"/>
+          <a:lstStyle/>
+          <a:p>
+            <a:pPr algn="ctr"/>
+            <a:endParaRPr lang="nb-NO"/>
+          </a:p>
+        </p:txBody>
+      </p:sp>
+      <p:cxnSp>
+        <p:nvCxnSpPr>
+          <p:cNvPr id="39" name="Rett linje 38"/>
+          <p:cNvCxnSpPr>
+            <a:stCxn id="18" idx="4"/>
+            <a:endCxn id="18" idx="0"/>
+          </p:cNvCxnSpPr>
+          <p:nvPr/>
+        </p:nvCxnSpPr>
+        <p:spPr>
+          <a:xfrm flipV="1">
+            <a:off x="9153187" y="1762144"/>
+            <a:ext cx="0" cy="36000"/>
+          </a:xfrm>
+          <a:prstGeom prst="line">
+            <a:avLst/>
+          </a:prstGeom>
+          <a:ln w="12700">
+            <a:solidFill>
+              <a:schemeClr val="tx1">
+                <a:lumMod val="65000"/>
+                <a:lumOff val="35000"/>
+              </a:schemeClr>
+            </a:solidFill>
+          </a:ln>
+        </p:spPr>
+        <p:style>
+          <a:lnRef idx="1">
+            <a:schemeClr val="accent1"/>
+          </a:lnRef>
+          <a:fillRef idx="0">
+            <a:schemeClr val="accent1"/>
+          </a:fillRef>
+          <a:effectRef idx="0">
+            <a:schemeClr val="accent1"/>
+          </a:effectRef>
+          <a:fontRef idx="minor">
+            <a:schemeClr val="tx1"/>
+          </a:fontRef>
+        </p:style>
+      </p:cxnSp>
+      <p:cxnSp>
+        <p:nvCxnSpPr>
+          <p:cNvPr id="106" name="Rett linje 105"/>
+          <p:cNvCxnSpPr/>
+          <p:nvPr/>
+        </p:nvCxnSpPr>
+        <p:spPr>
+          <a:xfrm flipV="1">
+            <a:off x="9162712" y="1993968"/>
+            <a:ext cx="0" cy="36000"/>
+          </a:xfrm>
+          <a:prstGeom prst="line">
+            <a:avLst/>
+          </a:prstGeom>
+          <a:ln w="12700">
+            <a:solidFill>
+              <a:schemeClr val="tx1">
+                <a:lumMod val="65000"/>
+                <a:lumOff val="35000"/>
+              </a:schemeClr>
+            </a:solidFill>
+          </a:ln>
+        </p:spPr>
+        <p:style>
+          <a:lnRef idx="1">
+            <a:schemeClr val="accent1"/>
+          </a:lnRef>
+          <a:fillRef idx="0">
+            <a:schemeClr val="accent1"/>
+          </a:fillRef>
+          <a:effectRef idx="0">
+            <a:schemeClr val="accent1"/>
+          </a:effectRef>
+          <a:fontRef idx="minor">
+            <a:schemeClr val="tx1"/>
+          </a:fontRef>
+        </p:style>
+      </p:cxnSp>
+      <p:cxnSp>
+        <p:nvCxnSpPr>
+          <p:cNvPr id="107" name="Rett linje 106"/>
+          <p:cNvCxnSpPr/>
+          <p:nvPr/>
+        </p:nvCxnSpPr>
+        <p:spPr>
+          <a:xfrm rot="5400000" flipV="1">
+            <a:off x="9266208" y="1879668"/>
+            <a:ext cx="0" cy="36000"/>
+          </a:xfrm>
+          <a:prstGeom prst="line">
+            <a:avLst/>
+          </a:prstGeom>
+          <a:ln w="12700">
+            <a:solidFill>
+              <a:schemeClr val="tx1">
+                <a:lumMod val="65000"/>
+                <a:lumOff val="35000"/>
+              </a:schemeClr>
+            </a:solidFill>
+          </a:ln>
+        </p:spPr>
+        <p:style>
+          <a:lnRef idx="1">
+            <a:schemeClr val="accent1"/>
+          </a:lnRef>
+          <a:fillRef idx="0">
+            <a:schemeClr val="accent1"/>
+          </a:fillRef>
+          <a:effectRef idx="0">
+            <a:schemeClr val="accent1"/>
+          </a:effectRef>
+          <a:fontRef idx="minor">
+            <a:schemeClr val="tx1"/>
+          </a:fontRef>
+        </p:style>
+      </p:cxnSp>
+      <p:cxnSp>
+        <p:nvCxnSpPr>
+          <p:cNvPr id="108" name="Rett linje 107"/>
+          <p:cNvCxnSpPr/>
+          <p:nvPr/>
+        </p:nvCxnSpPr>
+        <p:spPr>
+          <a:xfrm rot="5400000" flipV="1">
+            <a:off x="9044602" y="1879668"/>
+            <a:ext cx="0" cy="36000"/>
+          </a:xfrm>
+          <a:prstGeom prst="line">
+            <a:avLst/>
+          </a:prstGeom>
+          <a:ln w="12700">
+            <a:solidFill>
+              <a:schemeClr val="tx1">
+                <a:lumMod val="65000"/>
+                <a:lumOff val="35000"/>
+              </a:schemeClr>
+            </a:solidFill>
+          </a:ln>
+        </p:spPr>
+        <p:style>
+          <a:lnRef idx="1">
+            <a:schemeClr val="accent1"/>
+          </a:lnRef>
+          <a:fillRef idx="0">
+            <a:schemeClr val="accent1"/>
+          </a:fillRef>
+          <a:effectRef idx="0">
+            <a:schemeClr val="accent1"/>
+          </a:effectRef>
+          <a:fontRef idx="minor">
+            <a:schemeClr val="tx1"/>
+          </a:fontRef>
+        </p:style>
+      </p:cxnSp>
+      <p:cxnSp>
+        <p:nvCxnSpPr>
+          <p:cNvPr id="110" name="Rett linje 109"/>
+          <p:cNvCxnSpPr/>
+          <p:nvPr/>
+        </p:nvCxnSpPr>
+        <p:spPr>
+          <a:xfrm rot="1800000" flipV="1">
+            <a:off x="9203106" y="1780144"/>
+            <a:ext cx="0" cy="36000"/>
+          </a:xfrm>
+          <a:prstGeom prst="line">
+            <a:avLst/>
+          </a:prstGeom>
+          <a:ln w="12700">
+            <a:solidFill>
+              <a:schemeClr val="tx1">
+                <a:lumMod val="65000"/>
+                <a:lumOff val="35000"/>
+              </a:schemeClr>
+            </a:solidFill>
+          </a:ln>
+        </p:spPr>
+        <p:style>
+          <a:lnRef idx="1">
+            <a:schemeClr val="accent1"/>
+          </a:lnRef>
+          <a:fillRef idx="0">
+            <a:schemeClr val="accent1"/>
+          </a:fillRef>
+          <a:effectRef idx="0">
+            <a:schemeClr val="accent1"/>
+          </a:effectRef>
+          <a:fontRef idx="minor">
+            <a:schemeClr val="tx1"/>
+          </a:fontRef>
+        </p:style>
+      </p:cxnSp>
+      <p:cxnSp>
+        <p:nvCxnSpPr>
+          <p:cNvPr id="111" name="Rett linje 110"/>
+          <p:cNvCxnSpPr/>
+          <p:nvPr/>
+        </p:nvCxnSpPr>
+        <p:spPr>
+          <a:xfrm rot="1800000" flipV="1">
+            <a:off x="9108610" y="1978379"/>
+            <a:ext cx="0" cy="36000"/>
+          </a:xfrm>
+          <a:prstGeom prst="line">
+            <a:avLst/>
+          </a:prstGeom>
+          <a:ln w="12700">
+            <a:solidFill>
+              <a:schemeClr val="tx1">
+                <a:lumMod val="65000"/>
+                <a:lumOff val="35000"/>
+              </a:schemeClr>
+            </a:solidFill>
+          </a:ln>
+        </p:spPr>
+        <p:style>
+          <a:lnRef idx="1">
+            <a:schemeClr val="accent1"/>
+          </a:lnRef>
+          <a:fillRef idx="0">
+            <a:schemeClr val="accent1"/>
+          </a:fillRef>
+          <a:effectRef idx="0">
+            <a:schemeClr val="accent1"/>
+          </a:effectRef>
+          <a:fontRef idx="minor">
+            <a:schemeClr val="tx1"/>
+          </a:fontRef>
+        </p:style>
+      </p:cxnSp>
+      <p:cxnSp>
+        <p:nvCxnSpPr>
+          <p:cNvPr id="112" name="Rett linje 111"/>
+          <p:cNvCxnSpPr/>
+          <p:nvPr/>
+        </p:nvCxnSpPr>
+        <p:spPr>
+          <a:xfrm rot="3600000" flipV="1">
+            <a:off x="9060191" y="1942008"/>
+            <a:ext cx="0" cy="36000"/>
+          </a:xfrm>
+          <a:prstGeom prst="line">
+            <a:avLst/>
+          </a:prstGeom>
+          <a:ln w="12700">
+            <a:solidFill>
+              <a:schemeClr val="tx1">
+                <a:lumMod val="65000"/>
+                <a:lumOff val="35000"/>
+              </a:schemeClr>
+            </a:solidFill>
+          </a:ln>
+        </p:spPr>
+        <p:style>
+          <a:lnRef idx="1">
+            <a:schemeClr val="accent1"/>
+          </a:lnRef>
+          <a:fillRef idx="0">
+            <a:schemeClr val="accent1"/>
+          </a:fillRef>
+          <a:effectRef idx="0">
+            <a:schemeClr val="accent1"/>
+          </a:effectRef>
+          <a:fontRef idx="minor">
+            <a:schemeClr val="tx1"/>
+          </a:fontRef>
+        </p:style>
+      </p:cxnSp>
+      <p:cxnSp>
+        <p:nvCxnSpPr>
+          <p:cNvPr id="114" name="Rett linje 113"/>
+          <p:cNvCxnSpPr/>
+          <p:nvPr/>
+        </p:nvCxnSpPr>
+        <p:spPr>
+          <a:xfrm rot="3600000" flipV="1">
+            <a:off x="9248207" y="1814764"/>
+            <a:ext cx="0" cy="36000"/>
+          </a:xfrm>
+          <a:prstGeom prst="line">
+            <a:avLst/>
+          </a:prstGeom>
+          <a:ln w="12700">
+            <a:solidFill>
+              <a:schemeClr val="tx1">
+                <a:lumMod val="65000"/>
+                <a:lumOff val="35000"/>
+              </a:schemeClr>
+            </a:solidFill>
+          </a:ln>
+        </p:spPr>
+        <p:style>
+          <a:lnRef idx="1">
+            <a:schemeClr val="accent1"/>
+          </a:lnRef>
+          <a:fillRef idx="0">
+            <a:schemeClr val="accent1"/>
+          </a:fillRef>
+          <a:effectRef idx="0">
+            <a:schemeClr val="accent1"/>
+          </a:effectRef>
+          <a:fontRef idx="minor">
+            <a:schemeClr val="tx1"/>
+          </a:fontRef>
+        </p:style>
+      </p:cxnSp>
+      <p:cxnSp>
+        <p:nvCxnSpPr>
+          <p:cNvPr id="115" name="Rett linje 114"/>
+          <p:cNvCxnSpPr/>
+          <p:nvPr/>
+        </p:nvCxnSpPr>
+        <p:spPr>
+          <a:xfrm rot="7200000" flipV="1">
+            <a:off x="9057914" y="1823765"/>
+            <a:ext cx="0" cy="36000"/>
+          </a:xfrm>
+          <a:prstGeom prst="line">
+            <a:avLst/>
+          </a:prstGeom>
+          <a:ln w="12700">
+            <a:solidFill>
+              <a:schemeClr val="tx1">
+                <a:lumMod val="65000"/>
+                <a:lumOff val="35000"/>
+              </a:schemeClr>
+            </a:solidFill>
+          </a:ln>
+        </p:spPr>
+        <p:style>
+          <a:lnRef idx="1">
+            <a:schemeClr val="accent1"/>
+          </a:lnRef>
+          <a:fillRef idx="0">
+            <a:schemeClr val="accent1"/>
+          </a:fillRef>
+          <a:effectRef idx="0">
+            <a:schemeClr val="accent1"/>
+          </a:effectRef>
+          <a:fontRef idx="minor">
+            <a:schemeClr val="tx1"/>
+          </a:fontRef>
+        </p:style>
+      </p:cxnSp>
+      <p:cxnSp>
+        <p:nvCxnSpPr>
+          <p:cNvPr id="116" name="Rett linje 115"/>
+          <p:cNvCxnSpPr/>
+          <p:nvPr/>
+        </p:nvCxnSpPr>
+        <p:spPr>
+          <a:xfrm rot="7200000" flipV="1">
+            <a:off x="9248207" y="1933007"/>
+            <a:ext cx="0" cy="36000"/>
+          </a:xfrm>
+          <a:prstGeom prst="line">
+            <a:avLst/>
+          </a:prstGeom>
+          <a:ln w="12700">
+            <a:solidFill>
+              <a:schemeClr val="tx1">
+                <a:lumMod val="65000"/>
+                <a:lumOff val="35000"/>
+              </a:schemeClr>
+            </a:solidFill>
+          </a:ln>
+        </p:spPr>
+        <p:style>
+          <a:lnRef idx="1">
+            <a:schemeClr val="accent1"/>
+          </a:lnRef>
+          <a:fillRef idx="0">
+            <a:schemeClr val="accent1"/>
+          </a:fillRef>
+          <a:effectRef idx="0">
+            <a:schemeClr val="accent1"/>
+          </a:effectRef>
+          <a:fontRef idx="minor">
+            <a:schemeClr val="tx1"/>
+          </a:fontRef>
+        </p:style>
+      </p:cxnSp>
+      <p:cxnSp>
+        <p:nvCxnSpPr>
+          <p:cNvPr id="117" name="Rett linje 116"/>
+          <p:cNvCxnSpPr/>
+          <p:nvPr/>
+        </p:nvCxnSpPr>
+        <p:spPr>
+          <a:xfrm rot="9000000" flipV="1">
+            <a:off x="9090135" y="1780144"/>
+            <a:ext cx="0" cy="36000"/>
+          </a:xfrm>
+          <a:prstGeom prst="line">
+            <a:avLst/>
+          </a:prstGeom>
+          <a:ln w="12700">
+            <a:solidFill>
+              <a:schemeClr val="tx1">
+                <a:lumMod val="65000"/>
+                <a:lumOff val="35000"/>
+              </a:schemeClr>
+            </a:solidFill>
+          </a:ln>
+        </p:spPr>
+        <p:style>
+          <a:lnRef idx="1">
+            <a:schemeClr val="accent1"/>
+          </a:lnRef>
+          <a:fillRef idx="0">
+            <a:schemeClr val="accent1"/>
+          </a:fillRef>
+          <a:effectRef idx="0">
+            <a:schemeClr val="accent1"/>
+          </a:effectRef>
+          <a:fontRef idx="minor">
+            <a:schemeClr val="tx1"/>
+          </a:fontRef>
+        </p:style>
+      </p:cxnSp>
+      <p:cxnSp>
+        <p:nvCxnSpPr>
+          <p:cNvPr id="118" name="Rett linje 117"/>
+          <p:cNvCxnSpPr/>
+          <p:nvPr/>
+        </p:nvCxnSpPr>
+        <p:spPr>
+          <a:xfrm rot="9000000" flipV="1">
+            <a:off x="9223618" y="1971635"/>
+            <a:ext cx="0" cy="36000"/>
+          </a:xfrm>
+          <a:prstGeom prst="line">
+            <a:avLst/>
+          </a:prstGeom>
+          <a:ln w="12700">
+            <a:solidFill>
+              <a:schemeClr val="tx1">
+                <a:lumMod val="65000"/>
+                <a:lumOff val="35000"/>
+              </a:schemeClr>
+            </a:solidFill>
+          </a:ln>
+        </p:spPr>
+        <p:style>
+          <a:lnRef idx="1">
+            <a:schemeClr val="accent1"/>
+          </a:lnRef>
+          <a:fillRef idx="0">
+            <a:schemeClr val="accent1"/>
+          </a:fillRef>
+          <a:effectRef idx="0">
+            <a:schemeClr val="accent1"/>
+          </a:effectRef>
+          <a:fontRef idx="minor">
+            <a:schemeClr val="tx1"/>
+          </a:fontRef>
+        </p:style>
+      </p:cxnSp>
+      <p:cxnSp>
+        <p:nvCxnSpPr>
+          <p:cNvPr id="69" name="Rett pilkobling 68"/>
+          <p:cNvCxnSpPr/>
+          <p:nvPr/>
+        </p:nvCxnSpPr>
+        <p:spPr>
+          <a:xfrm flipV="1">
+            <a:off x="9459146" y="1393786"/>
+            <a:ext cx="72000" cy="116754"/>
+          </a:xfrm>
+          <a:prstGeom prst="straightConnector1">
+            <a:avLst/>
+          </a:prstGeom>
+          <a:ln w="15875">
+            <a:headEnd type="oval"/>
+            <a:tailEnd type="stealth"/>
+          </a:ln>
+        </p:spPr>
+        <p:style>
+          <a:lnRef idx="1">
+            <a:schemeClr val="accent1"/>
+          </a:lnRef>
+          <a:fillRef idx="0">
+            <a:schemeClr val="accent1"/>
+          </a:fillRef>
+          <a:effectRef idx="0">
+            <a:schemeClr val="accent1"/>
+          </a:effectRef>
+          <a:fontRef idx="minor">
+            <a:schemeClr val="tx1"/>
+          </a:fontRef>
+        </p:style>
+      </p:cxnSp>
+      <p:sp>
+        <p:nvSpPr>
+          <p:cNvPr id="121" name="Ellipse 120"/>
+          <p:cNvSpPr/>
+          <p:nvPr/>
+        </p:nvSpPr>
+        <p:spPr>
+          <a:xfrm>
+            <a:off x="9137405" y="1878056"/>
+            <a:ext cx="36000" cy="36000"/>
+          </a:xfrm>
+          <a:prstGeom prst="ellipse">
+            <a:avLst/>
+          </a:prstGeom>
+          <a:solidFill>
+            <a:schemeClr val="tx1"/>
+          </a:solidFill>
+          <a:ln w="3175">
+            <a:solidFill>
+              <a:schemeClr val="tx1"/>
+            </a:solidFill>
+          </a:ln>
+        </p:spPr>
+        <p:style>
+          <a:lnRef idx="2">
+            <a:schemeClr val="accent1">
+              <a:shade val="50000"/>
+            </a:schemeClr>
+          </a:lnRef>
+          <a:fillRef idx="1">
+            <a:schemeClr val="accent1"/>
+          </a:fillRef>
+          <a:effectRef idx="0">
+            <a:schemeClr val="accent1"/>
+          </a:effectRef>
+          <a:fontRef idx="minor">
+            <a:schemeClr val="lt1"/>
+          </a:fontRef>
+        </p:style>
+        <p:txBody>
+          <a:bodyPr rtlCol="0" anchor="ctr"/>
+          <a:lstStyle/>
+          <a:p>
+            <a:pPr algn="ctr"/>
+            <a:endParaRPr lang="nb-NO"/>
+          </a:p>
+        </p:txBody>
+      </p:sp>
+      <p:cxnSp>
+        <p:nvCxnSpPr>
+          <p:cNvPr id="122" name="Rett linje 121"/>
+          <p:cNvCxnSpPr/>
+          <p:nvPr/>
+        </p:nvCxnSpPr>
+        <p:spPr>
+          <a:xfrm rot="1800000" flipV="1">
+            <a:off x="9175835" y="1823180"/>
+            <a:ext cx="0" cy="72000"/>
+          </a:xfrm>
+          <a:prstGeom prst="line">
+            <a:avLst/>
+          </a:prstGeom>
+          <a:ln w="12700">
+            <a:solidFill>
+              <a:schemeClr val="tx1"/>
+            </a:solidFill>
+          </a:ln>
+        </p:spPr>
+        <p:style>
+          <a:lnRef idx="1">
+            <a:schemeClr val="accent1"/>
+          </a:lnRef>
+          <a:fillRef idx="0">
+            <a:schemeClr val="accent1"/>
+          </a:fillRef>
+          <a:effectRef idx="0">
+            <a:schemeClr val="accent1"/>
+          </a:effectRef>
+          <a:fontRef idx="minor">
+            <a:schemeClr val="tx1"/>
+          </a:fontRef>
+        </p:style>
+      </p:cxnSp>
+      <p:sp>
+        <p:nvSpPr>
+          <p:cNvPr id="123" name="Likebent trekant 122"/>
+          <p:cNvSpPr/>
+          <p:nvPr/>
+        </p:nvSpPr>
+        <p:spPr>
+          <a:xfrm rot="1800000">
+            <a:off x="9186637" y="1799245"/>
+            <a:ext cx="28800" cy="36000"/>
+          </a:xfrm>
+          <a:prstGeom prst="triangle">
+            <a:avLst/>
+          </a:prstGeom>
+          <a:solidFill>
+            <a:schemeClr val="tx1"/>
+          </a:solidFill>
+          <a:ln w="3175">
+            <a:solidFill>
+              <a:schemeClr val="tx1"/>
+            </a:solidFill>
+          </a:ln>
+        </p:spPr>
+        <p:style>
+          <a:lnRef idx="2">
+            <a:schemeClr val="accent1">
+              <a:shade val="50000"/>
+            </a:schemeClr>
+          </a:lnRef>
+          <a:fillRef idx="1">
+            <a:schemeClr val="accent1"/>
+          </a:fillRef>
+          <a:effectRef idx="0">
+            <a:schemeClr val="accent1"/>
+          </a:effectRef>
+          <a:fontRef idx="minor">
+            <a:schemeClr val="lt1"/>
+          </a:fontRef>
+        </p:style>
+        <p:txBody>
+          <a:bodyPr rtlCol="0" anchor="ctr"/>
+          <a:lstStyle/>
+          <a:p>
+            <a:pPr algn="ctr"/>
+            <a:endParaRPr lang="nb-NO"/>
+          </a:p>
+        </p:txBody>
+      </p:sp>
+      <p:cxnSp>
+        <p:nvCxnSpPr>
+          <p:cNvPr id="124" name="Rett linje 123"/>
+          <p:cNvCxnSpPr/>
+          <p:nvPr/>
+        </p:nvCxnSpPr>
+        <p:spPr>
+          <a:xfrm rot="5400000" flipV="1">
+            <a:off x="9186991" y="1882052"/>
+            <a:ext cx="0" cy="36000"/>
+          </a:xfrm>
+          <a:prstGeom prst="line">
+            <a:avLst/>
+          </a:prstGeom>
+          <a:ln w="12700">
+            <a:solidFill>
+              <a:schemeClr val="tx1"/>
+            </a:solidFill>
+          </a:ln>
+        </p:spPr>
+        <p:style>
+          <a:lnRef idx="1">
+            <a:schemeClr val="accent1"/>
+          </a:lnRef>
+          <a:fillRef idx="0">
+            <a:schemeClr val="accent1"/>
+          </a:fillRef>
+          <a:effectRef idx="0">
+            <a:schemeClr val="accent1"/>
+          </a:effectRef>
+          <a:fontRef idx="minor">
+            <a:schemeClr val="tx1"/>
+          </a:fontRef>
+        </p:style>
+      </p:cxnSp>
+      <p:sp>
+        <p:nvSpPr>
+          <p:cNvPr id="125" name="Likebent trekant 124"/>
+          <p:cNvSpPr/>
+          <p:nvPr/>
+        </p:nvSpPr>
+        <p:spPr>
+          <a:xfrm rot="5400000">
+            <a:off x="9207001" y="1877807"/>
+            <a:ext cx="36000" cy="36000"/>
+          </a:xfrm>
+          <a:prstGeom prst="triangle">
+            <a:avLst/>
+          </a:prstGeom>
+          <a:solidFill>
+            <a:schemeClr val="tx1"/>
+          </a:solidFill>
+          <a:ln w="3175">
+            <a:solidFill>
+              <a:schemeClr val="tx1"/>
+            </a:solidFill>
+          </a:ln>
+        </p:spPr>
+        <p:style>
+          <a:lnRef idx="2">
+            <a:schemeClr val="accent1">
+              <a:shade val="50000"/>
+            </a:schemeClr>
+          </a:lnRef>
+          <a:fillRef idx="1">
+            <a:schemeClr val="accent1"/>
+          </a:fillRef>
+          <a:effectRef idx="0">
+            <a:schemeClr val="accent1"/>
+          </a:effectRef>
+          <a:fontRef idx="minor">
+            <a:schemeClr val="lt1"/>
+          </a:fontRef>
+        </p:style>
+        <p:txBody>
+          <a:bodyPr rtlCol="0" anchor="ctr"/>
+          <a:lstStyle/>
+          <a:p>
+            <a:pPr algn="ctr"/>
+            <a:endParaRPr lang="nb-NO"/>
+          </a:p>
+        </p:txBody>
+      </p:sp>
     </p:spTree>
     <p:extLst>
       <p:ext uri="{BB962C8B-B14F-4D97-AF65-F5344CB8AC3E}">
@@ -16016,6 +15821,13 @@
   <p:clrMapOvr>
     <a:masterClrMapping/>
   </p:clrMapOvr>
+  <p:timing>
+    <p:tnLst>
+      <p:par>
+        <p:cTn id="1" dur="indefinite" restart="never" nodeType="tmRoot"/>
+      </p:par>
+    </p:tnLst>
+  </p:timing>
 </p:sld>
 </file>
 
@@ -16281,21 +16093,6 @@
 </file>
 
 <file path=customXml/item1.xml><?xml version="1.0" encoding="utf-8"?>
-<p:properties xmlns:p="http://schemas.microsoft.com/office/2006/metadata/properties" xmlns:xsi="http://www.w3.org/2001/XMLSchema-instance" xmlns:pc="http://schemas.microsoft.com/office/infopath/2007/PartnerControls">
-  <documentManagement/>
-</p:properties>
-</file>
-
-<file path=customXml/item2.xml><?xml version="1.0" encoding="utf-8"?>
-<?mso-contentType ?>
-<FormTemplates xmlns="http://schemas.microsoft.com/sharepoint/v3/contenttype/forms">
-  <Display>DocumentLibraryForm</Display>
-  <Edit>DocumentLibraryForm</Edit>
-  <New>DocumentLibraryForm</New>
-</FormTemplates>
-</file>
-
-<file path=customXml/item3.xml><?xml version="1.0" encoding="utf-8"?>
 <ct:contentTypeSchema xmlns:ct="http://schemas.microsoft.com/office/2006/metadata/contentType" xmlns:ma="http://schemas.microsoft.com/office/2006/metadata/properties/metaAttributes" ct:_="" ma:_="" ma:contentTypeName="Dokument" ma:contentTypeID="0x0101004E8DCD7061C9614189F6D0F57B1C8645" ma:contentTypeVersion="9" ma:contentTypeDescription="Opprett et nytt dokument." ma:contentTypeScope="" ma:versionID="d59b8845ebd1283ad3bf6a548e8d2471">
   <xsd:schema xmlns:xsd="http://www.w3.org/2001/XMLSchema" xmlns:xs="http://www.w3.org/2001/XMLSchema" xmlns:p="http://schemas.microsoft.com/office/2006/metadata/properties" xmlns:ns3="077b9b9c-7f67-45a8-98b7-b654137cbace" targetNamespace="http://schemas.microsoft.com/office/2006/metadata/properties" ma:root="true" ma:fieldsID="972a228023c3d388b754ae5803fd6dc7" ns3:_="">
     <xsd:import namespace="077b9b9c-7f67-45a8-98b7-b654137cbace"/>
@@ -16473,31 +16270,22 @@
 </ct:contentTypeSchema>
 </file>
 
-<file path=customXml/itemProps1.xml><?xml version="1.0" encoding="utf-8"?>
-<ds:datastoreItem xmlns:ds="http://schemas.openxmlformats.org/officeDocument/2006/customXml" ds:itemID="{7DEC415D-4AD5-4872-9DD1-7B94914CAE4D}">
-  <ds:schemaRefs>
-    <ds:schemaRef ds:uri="http://purl.org/dc/elements/1.1/"/>
-    <ds:schemaRef ds:uri="http://schemas.microsoft.com/office/2006/metadata/properties"/>
-    <ds:schemaRef ds:uri="http://schemas.microsoft.com/office/2006/documentManagement/types"/>
-    <ds:schemaRef ds:uri="http://schemas.openxmlformats.org/package/2006/metadata/core-properties"/>
-    <ds:schemaRef ds:uri="077b9b9c-7f67-45a8-98b7-b654137cbace"/>
-    <ds:schemaRef ds:uri="http://purl.org/dc/dcmitype/"/>
-    <ds:schemaRef ds:uri="http://schemas.microsoft.com/office/infopath/2007/PartnerControls"/>
-    <ds:schemaRef ds:uri="http://www.w3.org/XML/1998/namespace"/>
-    <ds:schemaRef ds:uri="http://purl.org/dc/terms/"/>
-  </ds:schemaRefs>
-</ds:datastoreItem>
+<file path=customXml/item2.xml><?xml version="1.0" encoding="utf-8"?>
+<?mso-contentType ?>
+<FormTemplates xmlns="http://schemas.microsoft.com/sharepoint/v3/contenttype/forms">
+  <Display>DocumentLibraryForm</Display>
+  <Edit>DocumentLibraryForm</Edit>
+  <New>DocumentLibraryForm</New>
+</FormTemplates>
 </file>
 
-<file path=customXml/itemProps2.xml><?xml version="1.0" encoding="utf-8"?>
-<ds:datastoreItem xmlns:ds="http://schemas.openxmlformats.org/officeDocument/2006/customXml" ds:itemID="{4BE7E9B0-0351-4956-BF80-844462B099ED}">
-  <ds:schemaRefs>
-    <ds:schemaRef ds:uri="http://schemas.microsoft.com/sharepoint/v3/contenttype/forms"/>
-  </ds:schemaRefs>
-</ds:datastoreItem>
+<file path=customXml/item3.xml><?xml version="1.0" encoding="utf-8"?>
+<p:properties xmlns:p="http://schemas.microsoft.com/office/2006/metadata/properties" xmlns:xsi="http://www.w3.org/2001/XMLSchema-instance" xmlns:pc="http://schemas.microsoft.com/office/infopath/2007/PartnerControls">
+  <documentManagement/>
+</p:properties>
 </file>
 
-<file path=customXml/itemProps3.xml><?xml version="1.0" encoding="utf-8"?>
+<file path=customXml/itemProps1.xml><?xml version="1.0" encoding="utf-8"?>
 <ds:datastoreItem xmlns:ds="http://schemas.openxmlformats.org/officeDocument/2006/customXml" ds:itemID="{A3A0C07D-31B7-4057-9C9C-1ED42245A98F}">
   <ds:schemaRefs>
     <ds:schemaRef ds:uri="http://schemas.microsoft.com/office/2006/metadata/contentType"/>
@@ -16513,4 +16301,28 @@
     <ds:schemaRef ds:uri="http://schemas.microsoft.com/internal/obd"/>
   </ds:schemaRefs>
 </ds:datastoreItem>
+</file>
+
+<file path=customXml/itemProps2.xml><?xml version="1.0" encoding="utf-8"?>
+<ds:datastoreItem xmlns:ds="http://schemas.openxmlformats.org/officeDocument/2006/customXml" ds:itemID="{4BE7E9B0-0351-4956-BF80-844462B099ED}">
+  <ds:schemaRefs>
+    <ds:schemaRef ds:uri="http://schemas.microsoft.com/sharepoint/v3/contenttype/forms"/>
+  </ds:schemaRefs>
+</ds:datastoreItem>
+</file>
+
+<file path=customXml/itemProps3.xml><?xml version="1.0" encoding="utf-8"?>
+<ds:datastoreItem xmlns:ds="http://schemas.openxmlformats.org/officeDocument/2006/customXml" ds:itemID="{7DEC415D-4AD5-4872-9DD1-7B94914CAE4D}">
+  <ds:schemaRefs>
+    <ds:schemaRef ds:uri="http://purl.org/dc/elements/1.1/"/>
+    <ds:schemaRef ds:uri="http://schemas.microsoft.com/office/2006/metadata/properties"/>
+    <ds:schemaRef ds:uri="http://schemas.microsoft.com/office/2006/documentManagement/types"/>
+    <ds:schemaRef ds:uri="http://schemas.openxmlformats.org/package/2006/metadata/core-properties"/>
+    <ds:schemaRef ds:uri="077b9b9c-7f67-45a8-98b7-b654137cbace"/>
+    <ds:schemaRef ds:uri="http://purl.org/dc/dcmitype/"/>
+    <ds:schemaRef ds:uri="http://schemas.microsoft.com/office/infopath/2007/PartnerControls"/>
+    <ds:schemaRef ds:uri="http://www.w3.org/XML/1998/namespace"/>
+    <ds:schemaRef ds:uri="http://purl.org/dc/terms/"/>
+  </ds:schemaRefs>
+</ds:datastoreItem>
 </file>
</xml_diff>

<commit_message>
feat: Updated logo for NVIcheckmate
</commit_message>
<xml_diff>
--- a/data-raw/logos.pptx
+++ b/data-raw/logos.pptx
@@ -259,7 +259,7 @@
           <a:p>
             <a:fld id="{09605B3F-6133-425E-A10B-41F9F06FCAC6}" type="datetimeFigureOut">
               <a:rPr lang="nb-NO" smtClean="0"/>
-              <a:t>18.05.2022</a:t>
+              <a:t>06.06.2022</a:t>
             </a:fld>
             <a:endParaRPr lang="nb-NO"/>
           </a:p>
@@ -429,7 +429,7 @@
           <a:p>
             <a:fld id="{09605B3F-6133-425E-A10B-41F9F06FCAC6}" type="datetimeFigureOut">
               <a:rPr lang="nb-NO" smtClean="0"/>
-              <a:t>18.05.2022</a:t>
+              <a:t>06.06.2022</a:t>
             </a:fld>
             <a:endParaRPr lang="nb-NO"/>
           </a:p>
@@ -609,7 +609,7 @@
           <a:p>
             <a:fld id="{09605B3F-6133-425E-A10B-41F9F06FCAC6}" type="datetimeFigureOut">
               <a:rPr lang="nb-NO" smtClean="0"/>
-              <a:t>18.05.2022</a:t>
+              <a:t>06.06.2022</a:t>
             </a:fld>
             <a:endParaRPr lang="nb-NO"/>
           </a:p>
@@ -779,7 +779,7 @@
           <a:p>
             <a:fld id="{09605B3F-6133-425E-A10B-41F9F06FCAC6}" type="datetimeFigureOut">
               <a:rPr lang="nb-NO" smtClean="0"/>
-              <a:t>18.05.2022</a:t>
+              <a:t>06.06.2022</a:t>
             </a:fld>
             <a:endParaRPr lang="nb-NO"/>
           </a:p>
@@ -1025,7 +1025,7 @@
           <a:p>
             <a:fld id="{09605B3F-6133-425E-A10B-41F9F06FCAC6}" type="datetimeFigureOut">
               <a:rPr lang="nb-NO" smtClean="0"/>
-              <a:t>18.05.2022</a:t>
+              <a:t>06.06.2022</a:t>
             </a:fld>
             <a:endParaRPr lang="nb-NO"/>
           </a:p>
@@ -1257,7 +1257,7 @@
           <a:p>
             <a:fld id="{09605B3F-6133-425E-A10B-41F9F06FCAC6}" type="datetimeFigureOut">
               <a:rPr lang="nb-NO" smtClean="0"/>
-              <a:t>18.05.2022</a:t>
+              <a:t>06.06.2022</a:t>
             </a:fld>
             <a:endParaRPr lang="nb-NO"/>
           </a:p>
@@ -1624,7 +1624,7 @@
           <a:p>
             <a:fld id="{09605B3F-6133-425E-A10B-41F9F06FCAC6}" type="datetimeFigureOut">
               <a:rPr lang="nb-NO" smtClean="0"/>
-              <a:t>18.05.2022</a:t>
+              <a:t>06.06.2022</a:t>
             </a:fld>
             <a:endParaRPr lang="nb-NO"/>
           </a:p>
@@ -1742,7 +1742,7 @@
           <a:p>
             <a:fld id="{09605B3F-6133-425E-A10B-41F9F06FCAC6}" type="datetimeFigureOut">
               <a:rPr lang="nb-NO" smtClean="0"/>
-              <a:t>18.05.2022</a:t>
+              <a:t>06.06.2022</a:t>
             </a:fld>
             <a:endParaRPr lang="nb-NO"/>
           </a:p>
@@ -1837,7 +1837,7 @@
           <a:p>
             <a:fld id="{09605B3F-6133-425E-A10B-41F9F06FCAC6}" type="datetimeFigureOut">
               <a:rPr lang="nb-NO" smtClean="0"/>
-              <a:t>18.05.2022</a:t>
+              <a:t>06.06.2022</a:t>
             </a:fld>
             <a:endParaRPr lang="nb-NO"/>
           </a:p>
@@ -2114,7 +2114,7 @@
           <a:p>
             <a:fld id="{09605B3F-6133-425E-A10B-41F9F06FCAC6}" type="datetimeFigureOut">
               <a:rPr lang="nb-NO" smtClean="0"/>
-              <a:t>18.05.2022</a:t>
+              <a:t>06.06.2022</a:t>
             </a:fld>
             <a:endParaRPr lang="nb-NO"/>
           </a:p>
@@ -2367,7 +2367,7 @@
           <a:p>
             <a:fld id="{09605B3F-6133-425E-A10B-41F9F06FCAC6}" type="datetimeFigureOut">
               <a:rPr lang="nb-NO" smtClean="0"/>
-              <a:t>18.05.2022</a:t>
+              <a:t>06.06.2022</a:t>
             </a:fld>
             <a:endParaRPr lang="nb-NO"/>
           </a:p>
@@ -2580,7 +2580,7 @@
           <a:p>
             <a:fld id="{09605B3F-6133-425E-A10B-41F9F06FCAC6}" type="datetimeFigureOut">
               <a:rPr lang="nb-NO" smtClean="0"/>
-              <a:t>18.05.2022</a:t>
+              <a:t>06.06.2022</a:t>
             </a:fld>
             <a:endParaRPr lang="nb-NO"/>
           </a:p>
@@ -11832,7 +11832,7 @@
       </p:grpSpPr>
       <p:grpSp>
         <p:nvGrpSpPr>
-          <p:cNvPr id="92" name="Gruppe 91"/>
+          <p:cNvPr id="3" name="Gruppe 2"/>
           <p:cNvGrpSpPr/>
           <p:nvPr/>
         </p:nvGrpSpPr>
@@ -11840,7 +11840,7 @@
           <a:xfrm>
             <a:off x="4735200" y="2244483"/>
             <a:ext cx="2721600" cy="2369033"/>
-            <a:chOff x="4117500" y="2122800"/>
+            <a:chOff x="4735200" y="2244483"/>
             <a:chExt cx="2721600" cy="2369033"/>
           </a:xfrm>
         </p:grpSpPr>
@@ -11860,7 +11860,7 @@
           </p:nvSpPr>
           <p:spPr>
             <a:xfrm rot="1800000">
-              <a:off x="4117500" y="2122800"/>
+              <a:off x="4735200" y="2244483"/>
               <a:ext cx="2721600" cy="2369033"/>
             </a:xfrm>
             <a:prstGeom prst="hexagon">
@@ -11914,8 +11914,8 @@
           </p:nvSpPr>
           <p:spPr>
             <a:xfrm>
-              <a:off x="4332252" y="2416775"/>
-              <a:ext cx="2292096" cy="461665"/>
+              <a:off x="4949952" y="2677802"/>
+              <a:ext cx="2292096" cy="492443"/>
             </a:xfrm>
             <a:prstGeom prst="rect">
               <a:avLst/>
@@ -11930,7 +11930,7 @@
             <a:p>
               <a:pPr algn="ctr"/>
               <a:r>
-                <a:rPr lang="nb-NO" sz="2400" dirty="0" err="1" smtClean="0">
+                <a:rPr lang="nb-NO" sz="2600" dirty="0" err="1" smtClean="0">
                   <a:solidFill>
                     <a:schemeClr val="bg2">
                       <a:lumMod val="90000"/>
@@ -11940,7 +11940,7 @@
                 </a:rPr>
                 <a:t>NVIcheckmate</a:t>
               </a:r>
-              <a:endParaRPr lang="nb-NO" sz="2400" dirty="0">
+              <a:endParaRPr lang="nb-NO" sz="2600" dirty="0">
                 <a:solidFill>
                   <a:schemeClr val="bg2">
                     <a:lumMod val="90000"/>
@@ -11959,8 +11959,8 @@
           </p:nvGrpSpPr>
           <p:grpSpPr>
             <a:xfrm>
-              <a:off x="4924474" y="2966645"/>
-              <a:ext cx="1107653" cy="1237785"/>
+              <a:off x="5618790" y="3282528"/>
+              <a:ext cx="954420" cy="1066550"/>
               <a:chOff x="4924473" y="2966645"/>
               <a:chExt cx="1107653" cy="1237785"/>
             </a:xfrm>
@@ -13141,7 +13141,7 @@
         </p:nvSpPr>
         <p:spPr>
           <a:xfrm>
-            <a:off x="8117299" y="-1028013"/>
+            <a:off x="8309363" y="2230614"/>
             <a:ext cx="2548328" cy="2191801"/>
           </a:xfrm>
           <a:prstGeom prst="rect">
@@ -15563,40 +15563,6 @@
           </a:fontRef>
         </p:style>
       </p:cxnSp>
-      <p:cxnSp>
-        <p:nvCxnSpPr>
-          <p:cNvPr id="69" name="Rett pilkobling 68"/>
-          <p:cNvCxnSpPr/>
-          <p:nvPr/>
-        </p:nvCxnSpPr>
-        <p:spPr>
-          <a:xfrm flipV="1">
-            <a:off x="9459146" y="1393786"/>
-            <a:ext cx="72000" cy="116754"/>
-          </a:xfrm>
-          <a:prstGeom prst="straightConnector1">
-            <a:avLst/>
-          </a:prstGeom>
-          <a:ln w="15875">
-            <a:headEnd type="oval"/>
-            <a:tailEnd type="stealth"/>
-          </a:ln>
-        </p:spPr>
-        <p:style>
-          <a:lnRef idx="1">
-            <a:schemeClr val="accent1"/>
-          </a:lnRef>
-          <a:fillRef idx="0">
-            <a:schemeClr val="accent1"/>
-          </a:fillRef>
-          <a:effectRef idx="0">
-            <a:schemeClr val="accent1"/>
-          </a:effectRef>
-          <a:fontRef idx="minor">
-            <a:schemeClr val="tx1"/>
-          </a:fontRef>
-        </p:style>
-      </p:cxnSp>
       <p:sp>
         <p:nvSpPr>
           <p:cNvPr id="121" name="Ellipse 120"/>
@@ -16093,6 +16059,21 @@
 </file>
 
 <file path=customXml/item1.xml><?xml version="1.0" encoding="utf-8"?>
+<p:properties xmlns:p="http://schemas.microsoft.com/office/2006/metadata/properties" xmlns:xsi="http://www.w3.org/2001/XMLSchema-instance" xmlns:pc="http://schemas.microsoft.com/office/infopath/2007/PartnerControls">
+  <documentManagement/>
+</p:properties>
+</file>
+
+<file path=customXml/item2.xml><?xml version="1.0" encoding="utf-8"?>
+<?mso-contentType ?>
+<FormTemplates xmlns="http://schemas.microsoft.com/sharepoint/v3/contenttype/forms">
+  <Display>DocumentLibraryForm</Display>
+  <Edit>DocumentLibraryForm</Edit>
+  <New>DocumentLibraryForm</New>
+</FormTemplates>
+</file>
+
+<file path=customXml/item3.xml><?xml version="1.0" encoding="utf-8"?>
 <ct:contentTypeSchema xmlns:ct="http://schemas.microsoft.com/office/2006/metadata/contentType" xmlns:ma="http://schemas.microsoft.com/office/2006/metadata/properties/metaAttributes" ct:_="" ma:_="" ma:contentTypeName="Dokument" ma:contentTypeID="0x0101004E8DCD7061C9614189F6D0F57B1C8645" ma:contentTypeVersion="9" ma:contentTypeDescription="Opprett et nytt dokument." ma:contentTypeScope="" ma:versionID="d59b8845ebd1283ad3bf6a548e8d2471">
   <xsd:schema xmlns:xsd="http://www.w3.org/2001/XMLSchema" xmlns:xs="http://www.w3.org/2001/XMLSchema" xmlns:p="http://schemas.microsoft.com/office/2006/metadata/properties" xmlns:ns3="077b9b9c-7f67-45a8-98b7-b654137cbace" targetNamespace="http://schemas.microsoft.com/office/2006/metadata/properties" ma:root="true" ma:fieldsID="972a228023c3d388b754ae5803fd6dc7" ns3:_="">
     <xsd:import namespace="077b9b9c-7f67-45a8-98b7-b654137cbace"/>
@@ -16270,22 +16251,31 @@
 </ct:contentTypeSchema>
 </file>
 
-<file path=customXml/item2.xml><?xml version="1.0" encoding="utf-8"?>
-<?mso-contentType ?>
-<FormTemplates xmlns="http://schemas.microsoft.com/sharepoint/v3/contenttype/forms">
-  <Display>DocumentLibraryForm</Display>
-  <Edit>DocumentLibraryForm</Edit>
-  <New>DocumentLibraryForm</New>
-</FormTemplates>
+<file path=customXml/itemProps1.xml><?xml version="1.0" encoding="utf-8"?>
+<ds:datastoreItem xmlns:ds="http://schemas.openxmlformats.org/officeDocument/2006/customXml" ds:itemID="{7DEC415D-4AD5-4872-9DD1-7B94914CAE4D}">
+  <ds:schemaRefs>
+    <ds:schemaRef ds:uri="http://purl.org/dc/elements/1.1/"/>
+    <ds:schemaRef ds:uri="http://schemas.microsoft.com/office/2006/metadata/properties"/>
+    <ds:schemaRef ds:uri="http://schemas.microsoft.com/office/2006/documentManagement/types"/>
+    <ds:schemaRef ds:uri="http://schemas.openxmlformats.org/package/2006/metadata/core-properties"/>
+    <ds:schemaRef ds:uri="077b9b9c-7f67-45a8-98b7-b654137cbace"/>
+    <ds:schemaRef ds:uri="http://purl.org/dc/dcmitype/"/>
+    <ds:schemaRef ds:uri="http://schemas.microsoft.com/office/infopath/2007/PartnerControls"/>
+    <ds:schemaRef ds:uri="http://www.w3.org/XML/1998/namespace"/>
+    <ds:schemaRef ds:uri="http://purl.org/dc/terms/"/>
+  </ds:schemaRefs>
+</ds:datastoreItem>
 </file>
 
-<file path=customXml/item3.xml><?xml version="1.0" encoding="utf-8"?>
-<p:properties xmlns:p="http://schemas.microsoft.com/office/2006/metadata/properties" xmlns:xsi="http://www.w3.org/2001/XMLSchema-instance" xmlns:pc="http://schemas.microsoft.com/office/infopath/2007/PartnerControls">
-  <documentManagement/>
-</p:properties>
+<file path=customXml/itemProps2.xml><?xml version="1.0" encoding="utf-8"?>
+<ds:datastoreItem xmlns:ds="http://schemas.openxmlformats.org/officeDocument/2006/customXml" ds:itemID="{4BE7E9B0-0351-4956-BF80-844462B099ED}">
+  <ds:schemaRefs>
+    <ds:schemaRef ds:uri="http://schemas.microsoft.com/sharepoint/v3/contenttype/forms"/>
+  </ds:schemaRefs>
+</ds:datastoreItem>
 </file>
 
-<file path=customXml/itemProps1.xml><?xml version="1.0" encoding="utf-8"?>
+<file path=customXml/itemProps3.xml><?xml version="1.0" encoding="utf-8"?>
 <ds:datastoreItem xmlns:ds="http://schemas.openxmlformats.org/officeDocument/2006/customXml" ds:itemID="{A3A0C07D-31B7-4057-9C9C-1ED42245A98F}">
   <ds:schemaRefs>
     <ds:schemaRef ds:uri="http://schemas.microsoft.com/office/2006/metadata/contentType"/>
@@ -16301,28 +16291,4 @@
     <ds:schemaRef ds:uri="http://schemas.microsoft.com/internal/obd"/>
   </ds:schemaRefs>
 </ds:datastoreItem>
-</file>
-
-<file path=customXml/itemProps2.xml><?xml version="1.0" encoding="utf-8"?>
-<ds:datastoreItem xmlns:ds="http://schemas.openxmlformats.org/officeDocument/2006/customXml" ds:itemID="{4BE7E9B0-0351-4956-BF80-844462B099ED}">
-  <ds:schemaRefs>
-    <ds:schemaRef ds:uri="http://schemas.microsoft.com/sharepoint/v3/contenttype/forms"/>
-  </ds:schemaRefs>
-</ds:datastoreItem>
-</file>
-
-<file path=customXml/itemProps3.xml><?xml version="1.0" encoding="utf-8"?>
-<ds:datastoreItem xmlns:ds="http://schemas.openxmlformats.org/officeDocument/2006/customXml" ds:itemID="{7DEC415D-4AD5-4872-9DD1-7B94914CAE4D}">
-  <ds:schemaRefs>
-    <ds:schemaRef ds:uri="http://purl.org/dc/elements/1.1/"/>
-    <ds:schemaRef ds:uri="http://schemas.microsoft.com/office/2006/metadata/properties"/>
-    <ds:schemaRef ds:uri="http://schemas.microsoft.com/office/2006/documentManagement/types"/>
-    <ds:schemaRef ds:uri="http://schemas.openxmlformats.org/package/2006/metadata/core-properties"/>
-    <ds:schemaRef ds:uri="077b9b9c-7f67-45a8-98b7-b654137cbace"/>
-    <ds:schemaRef ds:uri="http://purl.org/dc/dcmitype/"/>
-    <ds:schemaRef ds:uri="http://schemas.microsoft.com/office/infopath/2007/PartnerControls"/>
-    <ds:schemaRef ds:uri="http://www.w3.org/XML/1998/namespace"/>
-    <ds:schemaRef ds:uri="http://purl.org/dc/terms/"/>
-  </ds:schemaRefs>
-</ds:datastoreItem>
 </file>
</xml_diff>

<commit_message>
feat: created logos Finished OKplan_logo.
</commit_message>
<xml_diff>
--- a/data-raw/logos.pptx
+++ b/data-raw/logos.pptx
@@ -269,7 +269,7 @@
           <a:p>
             <a:fld id="{09605B3F-6133-425E-A10B-41F9F06FCAC6}" type="datetimeFigureOut">
               <a:rPr lang="nb-NO" smtClean="0"/>
-              <a:t>13.09.2023</a:t>
+              <a:t>14.09.2023</a:t>
             </a:fld>
             <a:endParaRPr lang="nb-NO"/>
           </a:p>
@@ -439,7 +439,7 @@
           <a:p>
             <a:fld id="{09605B3F-6133-425E-A10B-41F9F06FCAC6}" type="datetimeFigureOut">
               <a:rPr lang="nb-NO" smtClean="0"/>
-              <a:t>13.09.2023</a:t>
+              <a:t>14.09.2023</a:t>
             </a:fld>
             <a:endParaRPr lang="nb-NO"/>
           </a:p>
@@ -619,7 +619,7 @@
           <a:p>
             <a:fld id="{09605B3F-6133-425E-A10B-41F9F06FCAC6}" type="datetimeFigureOut">
               <a:rPr lang="nb-NO" smtClean="0"/>
-              <a:t>13.09.2023</a:t>
+              <a:t>14.09.2023</a:t>
             </a:fld>
             <a:endParaRPr lang="nb-NO"/>
           </a:p>
@@ -789,7 +789,7 @@
           <a:p>
             <a:fld id="{09605B3F-6133-425E-A10B-41F9F06FCAC6}" type="datetimeFigureOut">
               <a:rPr lang="nb-NO" smtClean="0"/>
-              <a:t>13.09.2023</a:t>
+              <a:t>14.09.2023</a:t>
             </a:fld>
             <a:endParaRPr lang="nb-NO"/>
           </a:p>
@@ -1035,7 +1035,7 @@
           <a:p>
             <a:fld id="{09605B3F-6133-425E-A10B-41F9F06FCAC6}" type="datetimeFigureOut">
               <a:rPr lang="nb-NO" smtClean="0"/>
-              <a:t>13.09.2023</a:t>
+              <a:t>14.09.2023</a:t>
             </a:fld>
             <a:endParaRPr lang="nb-NO"/>
           </a:p>
@@ -1267,7 +1267,7 @@
           <a:p>
             <a:fld id="{09605B3F-6133-425E-A10B-41F9F06FCAC6}" type="datetimeFigureOut">
               <a:rPr lang="nb-NO" smtClean="0"/>
-              <a:t>13.09.2023</a:t>
+              <a:t>14.09.2023</a:t>
             </a:fld>
             <a:endParaRPr lang="nb-NO"/>
           </a:p>
@@ -1634,7 +1634,7 @@
           <a:p>
             <a:fld id="{09605B3F-6133-425E-A10B-41F9F06FCAC6}" type="datetimeFigureOut">
               <a:rPr lang="nb-NO" smtClean="0"/>
-              <a:t>13.09.2023</a:t>
+              <a:t>14.09.2023</a:t>
             </a:fld>
             <a:endParaRPr lang="nb-NO"/>
           </a:p>
@@ -1752,7 +1752,7 @@
           <a:p>
             <a:fld id="{09605B3F-6133-425E-A10B-41F9F06FCAC6}" type="datetimeFigureOut">
               <a:rPr lang="nb-NO" smtClean="0"/>
-              <a:t>13.09.2023</a:t>
+              <a:t>14.09.2023</a:t>
             </a:fld>
             <a:endParaRPr lang="nb-NO"/>
           </a:p>
@@ -1847,7 +1847,7 @@
           <a:p>
             <a:fld id="{09605B3F-6133-425E-A10B-41F9F06FCAC6}" type="datetimeFigureOut">
               <a:rPr lang="nb-NO" smtClean="0"/>
-              <a:t>13.09.2023</a:t>
+              <a:t>14.09.2023</a:t>
             </a:fld>
             <a:endParaRPr lang="nb-NO"/>
           </a:p>
@@ -2124,7 +2124,7 @@
           <a:p>
             <a:fld id="{09605B3F-6133-425E-A10B-41F9F06FCAC6}" type="datetimeFigureOut">
               <a:rPr lang="nb-NO" smtClean="0"/>
-              <a:t>13.09.2023</a:t>
+              <a:t>14.09.2023</a:t>
             </a:fld>
             <a:endParaRPr lang="nb-NO"/>
           </a:p>
@@ -2377,7 +2377,7 @@
           <a:p>
             <a:fld id="{09605B3F-6133-425E-A10B-41F9F06FCAC6}" type="datetimeFigureOut">
               <a:rPr lang="nb-NO" smtClean="0"/>
-              <a:t>13.09.2023</a:t>
+              <a:t>14.09.2023</a:t>
             </a:fld>
             <a:endParaRPr lang="nb-NO"/>
           </a:p>
@@ -2590,7 +2590,7 @@
           <a:p>
             <a:fld id="{09605B3F-6133-425E-A10B-41F9F06FCAC6}" type="datetimeFigureOut">
               <a:rPr lang="nb-NO" smtClean="0"/>
-              <a:t>13.09.2023</a:t>
+              <a:t>14.09.2023</a:t>
             </a:fld>
             <a:endParaRPr lang="nb-NO"/>
           </a:p>
@@ -6705,196 +6705,39 @@
           <a:chExt cx="0" cy="0"/>
         </a:xfrm>
       </p:grpSpPr>
-      <p:sp>
-        <p:nvSpPr>
-          <p:cNvPr id="2" name="Hexagon 35">
-            <a:extLst>
-              <a:ext uri="{FF2B5EF4-FFF2-40B4-BE49-F238E27FC236}">
-                <a16:creationId xmlns:a16="http://schemas.microsoft.com/office/drawing/2014/main" id="{90E46B38-1301-774F-8904-FFF8966BD8C2}"/>
-              </a:ext>
-            </a:extLst>
-          </p:cNvPr>
-          <p:cNvSpPr>
-            <a:spLocks noChangeAspect="1"/>
-          </p:cNvSpPr>
-          <p:nvPr/>
-        </p:nvSpPr>
-        <p:spPr>
-          <a:xfrm rot="1800000">
-            <a:off x="4735200" y="2244483"/>
-            <a:ext cx="2721600" cy="2369033"/>
-          </a:xfrm>
-          <a:prstGeom prst="hexagon">
-            <a:avLst>
-              <a:gd name="adj" fmla="val 28372"/>
-              <a:gd name="vf" fmla="val 115470"/>
-            </a:avLst>
-          </a:prstGeom>
-          <a:solidFill>
-            <a:srgbClr val="133E4D"/>
-          </a:solidFill>
-          <a:ln w="69850">
-            <a:solidFill>
-              <a:schemeClr val="tx1">
-                <a:lumMod val="85000"/>
-                <a:lumOff val="15000"/>
-              </a:schemeClr>
-            </a:solidFill>
-          </a:ln>
-        </p:spPr>
-        <p:style>
-          <a:lnRef idx="2">
-            <a:schemeClr val="accent1">
-              <a:shade val="50000"/>
-            </a:schemeClr>
-          </a:lnRef>
-          <a:fillRef idx="1">
-            <a:schemeClr val="accent1"/>
-          </a:fillRef>
-          <a:effectRef idx="0">
-            <a:schemeClr val="accent1"/>
-          </a:effectRef>
-          <a:fontRef idx="minor">
-            <a:schemeClr val="lt1"/>
-          </a:fontRef>
-        </p:style>
-        <p:txBody>
-          <a:bodyPr rtlCol="0" anchor="ctr"/>
-          <a:lstStyle/>
-          <a:p>
-            <a:pPr algn="ctr"/>
-            <a:endParaRPr lang="en-US" dirty="0"/>
-          </a:p>
-        </p:txBody>
-      </p:sp>
-      <p:sp>
-        <p:nvSpPr>
-          <p:cNvPr id="45" name="TekstSylinder 44"/>
-          <p:cNvSpPr txBox="1"/>
-          <p:nvPr/>
-        </p:nvSpPr>
-        <p:spPr>
-          <a:xfrm>
-            <a:off x="4951956" y="2496396"/>
-            <a:ext cx="2292096" cy="461665"/>
-          </a:xfrm>
-          <a:prstGeom prst="rect">
-            <a:avLst/>
-          </a:prstGeom>
-          <a:noFill/>
-        </p:spPr>
-        <p:txBody>
-          <a:bodyPr wrap="square" rtlCol="0">
-            <a:spAutoFit/>
-          </a:bodyPr>
-          <a:lstStyle/>
-          <a:p>
-            <a:pPr algn="ctr"/>
-            <a:r>
-              <a:rPr lang="nb-NO" sz="2400" dirty="0" err="1" smtClean="0">
-                <a:solidFill>
-                  <a:schemeClr val="bg2">
-                    <a:lumMod val="90000"/>
-                  </a:schemeClr>
-                </a:solidFill>
-                <a:latin typeface="Trebuchet MS" panose="020B0603020202020204" pitchFamily="34" charset="0"/>
-              </a:rPr>
-              <a:t>OKplan</a:t>
-            </a:r>
-            <a:endParaRPr lang="nb-NO" sz="2400" dirty="0">
-              <a:solidFill>
-                <a:schemeClr val="bg2">
-                  <a:lumMod val="90000"/>
-                </a:schemeClr>
-              </a:solidFill>
-              <a:latin typeface="Trebuchet MS" panose="020B0603020202020204" pitchFamily="34" charset="0"/>
-            </a:endParaRPr>
-          </a:p>
-        </p:txBody>
-      </p:sp>
-      <p:sp>
-        <p:nvSpPr>
-          <p:cNvPr id="4" name="Ellipse 3"/>
-          <p:cNvSpPr/>
-          <p:nvPr/>
-        </p:nvSpPr>
-        <p:spPr>
-          <a:xfrm>
-            <a:off x="5848287" y="3048675"/>
-            <a:ext cx="963184" cy="979195"/>
-          </a:xfrm>
-          <a:prstGeom prst="ellipse">
-            <a:avLst/>
-          </a:prstGeom>
-          <a:solidFill>
-            <a:schemeClr val="bg1"/>
-          </a:solidFill>
-          <a:ln w="63500">
-            <a:solidFill>
-              <a:srgbClr val="979EA6"/>
-            </a:solidFill>
-          </a:ln>
-        </p:spPr>
-        <p:style>
-          <a:lnRef idx="2">
-            <a:schemeClr val="accent1">
-              <a:shade val="50000"/>
-            </a:schemeClr>
-          </a:lnRef>
-          <a:fillRef idx="1">
-            <a:schemeClr val="accent1"/>
-          </a:fillRef>
-          <a:effectRef idx="0">
-            <a:schemeClr val="accent1"/>
-          </a:effectRef>
-          <a:fontRef idx="minor">
-            <a:schemeClr val="lt1"/>
-          </a:fontRef>
-        </p:style>
-        <p:txBody>
-          <a:bodyPr rtlCol="0" anchor="ctr"/>
-          <a:lstStyle/>
-          <a:p>
-            <a:pPr algn="ctr"/>
-            <a:endParaRPr lang="nb-NO"/>
-          </a:p>
-        </p:txBody>
-      </p:sp>
       <p:grpSp>
         <p:nvGrpSpPr>
-          <p:cNvPr id="19" name="Gruppe 18"/>
+          <p:cNvPr id="66" name="Gruppe 65"/>
           <p:cNvGrpSpPr/>
           <p:nvPr/>
         </p:nvGrpSpPr>
         <p:grpSpPr>
           <a:xfrm>
-            <a:off x="5185762" y="3693166"/>
-            <a:ext cx="712256" cy="316256"/>
-            <a:chOff x="5301656" y="3687070"/>
-            <a:chExt cx="712256" cy="316256"/>
+            <a:off x="9089589" y="739638"/>
+            <a:ext cx="369454" cy="381685"/>
+            <a:chOff x="8851039" y="1298908"/>
+            <a:chExt cx="369454" cy="381685"/>
           </a:xfrm>
         </p:grpSpPr>
         <p:sp>
           <p:nvSpPr>
-            <p:cNvPr id="6" name="Avrundet rektangel 5"/>
+            <p:cNvPr id="11" name="Sekskant 10"/>
             <p:cNvSpPr/>
             <p:nvPr/>
           </p:nvSpPr>
           <p:spPr>
-            <a:xfrm rot="20040000">
-              <a:off x="5832438" y="3687070"/>
-              <a:ext cx="181474" cy="150982"/>
+            <a:xfrm>
+              <a:off x="8918300" y="1388722"/>
+              <a:ext cx="228600" cy="197069"/>
             </a:xfrm>
-            <a:prstGeom prst="roundRect">
+            <a:prstGeom prst="hexagon">
               <a:avLst/>
             </a:prstGeom>
             <a:solidFill>
-              <a:srgbClr val="979EA6"/>
+              <a:srgbClr val="00A14A"/>
             </a:solidFill>
             <a:ln>
-              <a:solidFill>
-                <a:srgbClr val="979EA6"/>
-              </a:solidFill>
+              <a:noFill/>
             </a:ln>
           </p:spPr>
           <p:style>
@@ -6924,24 +6767,22 @@
         </p:sp>
         <p:sp>
           <p:nvSpPr>
-            <p:cNvPr id="3" name="Avrundet rektangel 2"/>
+            <p:cNvPr id="12" name="Ellipse 11"/>
             <p:cNvSpPr/>
             <p:nvPr/>
           </p:nvSpPr>
           <p:spPr>
-            <a:xfrm rot="20040000">
-              <a:off x="5301656" y="3808774"/>
-              <a:ext cx="654646" cy="194552"/>
+            <a:xfrm>
+              <a:off x="8896849" y="1345928"/>
+              <a:ext cx="271502" cy="282657"/>
             </a:xfrm>
-            <a:prstGeom prst="roundRect">
+            <a:prstGeom prst="ellipse">
               <a:avLst/>
             </a:prstGeom>
-            <a:solidFill>
-              <a:srgbClr val="7C858E"/>
-            </a:solidFill>
-            <a:ln w="28575">
+            <a:noFill/>
+            <a:ln>
               <a:solidFill>
-                <a:srgbClr val="979EA6"/>
+                <a:srgbClr val="00A14A"/>
               </a:solidFill>
             </a:ln>
           </p:spPr>
@@ -6970,120 +6811,900 @@
             </a:p>
           </p:txBody>
         </p:sp>
+        <p:cxnSp>
+          <p:nvCxnSpPr>
+            <p:cNvPr id="25" name="Rett linje 24"/>
+            <p:cNvCxnSpPr/>
+            <p:nvPr/>
+          </p:nvCxnSpPr>
+          <p:spPr>
+            <a:xfrm>
+              <a:off x="9034412" y="1636485"/>
+              <a:ext cx="0" cy="44108"/>
+            </a:xfrm>
+            <a:prstGeom prst="line">
+              <a:avLst/>
+            </a:prstGeom>
+            <a:ln w="12700">
+              <a:solidFill>
+                <a:srgbClr val="00A14A"/>
+              </a:solidFill>
+              <a:tailEnd type="diamond" w="sm" len="sm"/>
+            </a:ln>
+          </p:spPr>
+          <p:style>
+            <a:lnRef idx="1">
+              <a:schemeClr val="accent1"/>
+            </a:lnRef>
+            <a:fillRef idx="0">
+              <a:schemeClr val="accent1"/>
+            </a:fillRef>
+            <a:effectRef idx="0">
+              <a:schemeClr val="accent1"/>
+            </a:effectRef>
+            <a:fontRef idx="minor">
+              <a:schemeClr val="tx1"/>
+            </a:fontRef>
+          </p:style>
+        </p:cxnSp>
+        <p:cxnSp>
+          <p:nvCxnSpPr>
+            <p:cNvPr id="24" name="Rett linje 23"/>
+            <p:cNvCxnSpPr/>
+            <p:nvPr/>
+          </p:nvCxnSpPr>
+          <p:spPr>
+            <a:xfrm flipH="1">
+              <a:off x="8851039" y="1491465"/>
+              <a:ext cx="44108" cy="0"/>
+            </a:xfrm>
+            <a:prstGeom prst="line">
+              <a:avLst/>
+            </a:prstGeom>
+            <a:ln w="12700">
+              <a:solidFill>
+                <a:srgbClr val="00A14A"/>
+              </a:solidFill>
+              <a:tailEnd type="diamond" w="sm" len="sm"/>
+            </a:ln>
+          </p:spPr>
+          <p:style>
+            <a:lnRef idx="1">
+              <a:schemeClr val="accent1"/>
+            </a:lnRef>
+            <a:fillRef idx="0">
+              <a:schemeClr val="accent1"/>
+            </a:fillRef>
+            <a:effectRef idx="0">
+              <a:schemeClr val="accent1"/>
+            </a:effectRef>
+            <a:fontRef idx="minor">
+              <a:schemeClr val="tx1"/>
+            </a:fontRef>
+          </p:style>
+        </p:cxnSp>
+        <p:cxnSp>
+          <p:nvCxnSpPr>
+            <p:cNvPr id="26" name="Rett linje 25"/>
+            <p:cNvCxnSpPr/>
+            <p:nvPr/>
+          </p:nvCxnSpPr>
+          <p:spPr>
+            <a:xfrm flipH="1">
+              <a:off x="9077471" y="1306865"/>
+              <a:ext cx="11416" cy="42606"/>
+            </a:xfrm>
+            <a:prstGeom prst="line">
+              <a:avLst/>
+            </a:prstGeom>
+            <a:ln w="12700">
+              <a:solidFill>
+                <a:srgbClr val="00A14A"/>
+              </a:solidFill>
+              <a:headEnd type="diamond" w="sm" len="sm"/>
+              <a:tailEnd type="none" w="sm" len="sm"/>
+            </a:ln>
+          </p:spPr>
+          <p:style>
+            <a:lnRef idx="1">
+              <a:schemeClr val="accent1"/>
+            </a:lnRef>
+            <a:fillRef idx="0">
+              <a:schemeClr val="accent1"/>
+            </a:fillRef>
+            <a:effectRef idx="0">
+              <a:schemeClr val="accent1"/>
+            </a:effectRef>
+            <a:fontRef idx="minor">
+              <a:schemeClr val="tx1"/>
+            </a:fontRef>
+          </p:style>
+        </p:cxnSp>
+        <p:cxnSp>
+          <p:nvCxnSpPr>
+            <p:cNvPr id="27" name="Rett linje 26"/>
+            <p:cNvCxnSpPr/>
+            <p:nvPr/>
+          </p:nvCxnSpPr>
+          <p:spPr>
+            <a:xfrm flipH="1" flipV="1">
+              <a:off x="8899902" y="1355792"/>
+              <a:ext cx="31190" cy="31190"/>
+            </a:xfrm>
+            <a:prstGeom prst="line">
+              <a:avLst/>
+            </a:prstGeom>
+            <a:ln w="12700">
+              <a:solidFill>
+                <a:srgbClr val="00A14A"/>
+              </a:solidFill>
+              <a:tailEnd type="diamond" w="sm" len="sm"/>
+            </a:ln>
+          </p:spPr>
+          <p:style>
+            <a:lnRef idx="1">
+              <a:schemeClr val="accent1"/>
+            </a:lnRef>
+            <a:fillRef idx="0">
+              <a:schemeClr val="accent1"/>
+            </a:fillRef>
+            <a:effectRef idx="0">
+              <a:schemeClr val="accent1"/>
+            </a:effectRef>
+            <a:fontRef idx="minor">
+              <a:schemeClr val="tx1"/>
+            </a:fontRef>
+          </p:style>
+        </p:cxnSp>
+        <p:cxnSp>
+          <p:nvCxnSpPr>
+            <p:cNvPr id="28" name="Rett linje 27"/>
+            <p:cNvCxnSpPr/>
+            <p:nvPr/>
+          </p:nvCxnSpPr>
+          <p:spPr>
+            <a:xfrm flipH="1">
+              <a:off x="9176385" y="1487655"/>
+              <a:ext cx="44108" cy="0"/>
+            </a:xfrm>
+            <a:prstGeom prst="line">
+              <a:avLst/>
+            </a:prstGeom>
+            <a:ln w="12700">
+              <a:solidFill>
+                <a:srgbClr val="00A14A"/>
+              </a:solidFill>
+              <a:headEnd type="diamond" w="sm" len="sm"/>
+              <a:tailEnd type="none" w="sm" len="sm"/>
+            </a:ln>
+          </p:spPr>
+          <p:style>
+            <a:lnRef idx="1">
+              <a:schemeClr val="accent1"/>
+            </a:lnRef>
+            <a:fillRef idx="0">
+              <a:schemeClr val="accent1"/>
+            </a:fillRef>
+            <a:effectRef idx="0">
+              <a:schemeClr val="accent1"/>
+            </a:effectRef>
+            <a:fontRef idx="minor">
+              <a:schemeClr val="tx1"/>
+            </a:fontRef>
+          </p:style>
+        </p:cxnSp>
+        <p:cxnSp>
+          <p:nvCxnSpPr>
+            <p:cNvPr id="29" name="Rett linje 28"/>
+            <p:cNvCxnSpPr/>
+            <p:nvPr/>
+          </p:nvCxnSpPr>
+          <p:spPr>
+            <a:xfrm flipH="1">
+              <a:off x="8904517" y="1589418"/>
+              <a:ext cx="31190" cy="31190"/>
+            </a:xfrm>
+            <a:prstGeom prst="line">
+              <a:avLst/>
+            </a:prstGeom>
+            <a:ln w="12700">
+              <a:solidFill>
+                <a:srgbClr val="00A14A"/>
+              </a:solidFill>
+              <a:tailEnd type="diamond" w="sm" len="sm"/>
+            </a:ln>
+          </p:spPr>
+          <p:style>
+            <a:lnRef idx="1">
+              <a:schemeClr val="accent1"/>
+            </a:lnRef>
+            <a:fillRef idx="0">
+              <a:schemeClr val="accent1"/>
+            </a:fillRef>
+            <a:effectRef idx="0">
+              <a:schemeClr val="accent1"/>
+            </a:effectRef>
+            <a:fontRef idx="minor">
+              <a:schemeClr val="tx1"/>
+            </a:fontRef>
+          </p:style>
+        </p:cxnSp>
+        <p:cxnSp>
+          <p:nvCxnSpPr>
+            <p:cNvPr id="30" name="Rett linje 29"/>
+            <p:cNvCxnSpPr/>
+            <p:nvPr/>
+          </p:nvCxnSpPr>
+          <p:spPr>
+            <a:xfrm flipH="1">
+              <a:off x="9171053" y="1437687"/>
+              <a:ext cx="42606" cy="11416"/>
+            </a:xfrm>
+            <a:prstGeom prst="line">
+              <a:avLst/>
+            </a:prstGeom>
+            <a:ln w="12700">
+              <a:solidFill>
+                <a:srgbClr val="00A14A"/>
+              </a:solidFill>
+              <a:headEnd type="diamond" w="sm" len="sm"/>
+              <a:tailEnd type="none" w="sm" len="sm"/>
+            </a:ln>
+          </p:spPr>
+          <p:style>
+            <a:lnRef idx="1">
+              <a:schemeClr val="accent1"/>
+            </a:lnRef>
+            <a:fillRef idx="0">
+              <a:schemeClr val="accent1"/>
+            </a:fillRef>
+            <a:effectRef idx="0">
+              <a:schemeClr val="accent1"/>
+            </a:effectRef>
+            <a:fontRef idx="minor">
+              <a:schemeClr val="tx1"/>
+            </a:fontRef>
+          </p:style>
+        </p:cxnSp>
+        <p:cxnSp>
+          <p:nvCxnSpPr>
+            <p:cNvPr id="31" name="Rett linje 30"/>
+            <p:cNvCxnSpPr/>
+            <p:nvPr/>
+          </p:nvCxnSpPr>
+          <p:spPr>
+            <a:xfrm flipH="1" flipV="1">
+              <a:off x="9140252" y="1583703"/>
+              <a:ext cx="31190" cy="31190"/>
+            </a:xfrm>
+            <a:prstGeom prst="line">
+              <a:avLst/>
+            </a:prstGeom>
+            <a:ln w="12700">
+              <a:solidFill>
+                <a:srgbClr val="00A14A"/>
+              </a:solidFill>
+              <a:headEnd type="diamond" w="sm" len="sm"/>
+              <a:tailEnd type="none" w="sm" len="sm"/>
+            </a:ln>
+          </p:spPr>
+          <p:style>
+            <a:lnRef idx="1">
+              <a:schemeClr val="accent1"/>
+            </a:lnRef>
+            <a:fillRef idx="0">
+              <a:schemeClr val="accent1"/>
+            </a:fillRef>
+            <a:effectRef idx="0">
+              <a:schemeClr val="accent1"/>
+            </a:effectRef>
+            <a:fontRef idx="minor">
+              <a:schemeClr val="tx1"/>
+            </a:fontRef>
+          </p:style>
+        </p:cxnSp>
+        <p:cxnSp>
+          <p:nvCxnSpPr>
+            <p:cNvPr id="32" name="Rett linje 31"/>
+            <p:cNvCxnSpPr/>
+            <p:nvPr/>
+          </p:nvCxnSpPr>
+          <p:spPr>
+            <a:xfrm>
+              <a:off x="9160699" y="1553162"/>
+              <a:ext cx="38198" cy="22054"/>
+            </a:xfrm>
+            <a:prstGeom prst="line">
+              <a:avLst/>
+            </a:prstGeom>
+            <a:ln w="12700">
+              <a:solidFill>
+                <a:srgbClr val="00A14A"/>
+              </a:solidFill>
+              <a:tailEnd type="diamond" w="sm" len="sm"/>
+            </a:ln>
+          </p:spPr>
+          <p:style>
+            <a:lnRef idx="1">
+              <a:schemeClr val="accent1"/>
+            </a:lnRef>
+            <a:fillRef idx="0">
+              <a:schemeClr val="accent1"/>
+            </a:fillRef>
+            <a:effectRef idx="0">
+              <a:schemeClr val="accent1"/>
+            </a:effectRef>
+            <a:fontRef idx="minor">
+              <a:schemeClr val="tx1"/>
+            </a:fontRef>
+          </p:style>
+        </p:cxnSp>
+        <p:cxnSp>
+          <p:nvCxnSpPr>
+            <p:cNvPr id="33" name="Rett linje 32"/>
+            <p:cNvCxnSpPr/>
+            <p:nvPr/>
+          </p:nvCxnSpPr>
+          <p:spPr>
+            <a:xfrm flipH="1">
+              <a:off x="9138072" y="1358490"/>
+              <a:ext cx="39768" cy="39768"/>
+            </a:xfrm>
+            <a:prstGeom prst="line">
+              <a:avLst/>
+            </a:prstGeom>
+            <a:ln w="12700">
+              <a:solidFill>
+                <a:srgbClr val="00A14A"/>
+              </a:solidFill>
+              <a:headEnd type="diamond" w="sm" len="sm"/>
+              <a:tailEnd type="none" w="sm" len="sm"/>
+            </a:ln>
+          </p:spPr>
+          <p:style>
+            <a:lnRef idx="1">
+              <a:schemeClr val="accent1"/>
+            </a:lnRef>
+            <a:fillRef idx="0">
+              <a:schemeClr val="accent1"/>
+            </a:fillRef>
+            <a:effectRef idx="0">
+              <a:schemeClr val="accent1"/>
+            </a:effectRef>
+            <a:fontRef idx="minor">
+              <a:schemeClr val="tx1"/>
+            </a:fontRef>
+          </p:style>
+        </p:cxnSp>
+        <p:cxnSp>
+          <p:nvCxnSpPr>
+            <p:cNvPr id="34" name="Rett linje 33"/>
+            <p:cNvCxnSpPr/>
+            <p:nvPr/>
+          </p:nvCxnSpPr>
+          <p:spPr>
+            <a:xfrm flipH="1">
+              <a:off x="8944155" y="1615506"/>
+              <a:ext cx="22054" cy="38198"/>
+            </a:xfrm>
+            <a:prstGeom prst="line">
+              <a:avLst/>
+            </a:prstGeom>
+            <a:ln w="12700">
+              <a:solidFill>
+                <a:srgbClr val="00A14A"/>
+              </a:solidFill>
+              <a:tailEnd type="diamond" w="sm" len="sm"/>
+            </a:ln>
+          </p:spPr>
+          <p:style>
+            <a:lnRef idx="1">
+              <a:schemeClr val="accent1"/>
+            </a:lnRef>
+            <a:fillRef idx="0">
+              <a:schemeClr val="accent1"/>
+            </a:fillRef>
+            <a:effectRef idx="0">
+              <a:schemeClr val="accent1"/>
+            </a:effectRef>
+            <a:fontRef idx="minor">
+              <a:schemeClr val="tx1"/>
+            </a:fontRef>
+          </p:style>
+        </p:cxnSp>
+        <p:cxnSp>
+          <p:nvCxnSpPr>
+            <p:cNvPr id="35" name="Rett linje 34"/>
+            <p:cNvCxnSpPr/>
+            <p:nvPr/>
+          </p:nvCxnSpPr>
+          <p:spPr>
+            <a:xfrm flipH="1">
+              <a:off x="8987690" y="1631162"/>
+              <a:ext cx="11416" cy="42606"/>
+            </a:xfrm>
+            <a:prstGeom prst="line">
+              <a:avLst/>
+            </a:prstGeom>
+            <a:ln w="12700">
+              <a:solidFill>
+                <a:srgbClr val="00A14A"/>
+              </a:solidFill>
+              <a:tailEnd type="diamond" w="sm" len="sm"/>
+            </a:ln>
+          </p:spPr>
+          <p:style>
+            <a:lnRef idx="1">
+              <a:schemeClr val="accent1"/>
+            </a:lnRef>
+            <a:fillRef idx="0">
+              <a:schemeClr val="accent1"/>
+            </a:fillRef>
+            <a:effectRef idx="0">
+              <a:schemeClr val="accent1"/>
+            </a:effectRef>
+            <a:fontRef idx="minor">
+              <a:schemeClr val="tx1"/>
+            </a:fontRef>
+          </p:style>
+        </p:cxnSp>
+        <p:cxnSp>
+          <p:nvCxnSpPr>
+            <p:cNvPr id="36" name="Rett linje 35"/>
+            <p:cNvCxnSpPr/>
+            <p:nvPr/>
+          </p:nvCxnSpPr>
+          <p:spPr>
+            <a:xfrm>
+              <a:off x="9172254" y="1520579"/>
+              <a:ext cx="42606" cy="11416"/>
+            </a:xfrm>
+            <a:prstGeom prst="line">
+              <a:avLst/>
+            </a:prstGeom>
+            <a:ln w="12700">
+              <a:solidFill>
+                <a:srgbClr val="00A14A"/>
+              </a:solidFill>
+              <a:tailEnd type="diamond" w="sm" len="sm"/>
+            </a:ln>
+          </p:spPr>
+          <p:style>
+            <a:lnRef idx="1">
+              <a:schemeClr val="accent1"/>
+            </a:lnRef>
+            <a:fillRef idx="0">
+              <a:schemeClr val="accent1"/>
+            </a:fillRef>
+            <a:effectRef idx="0">
+              <a:schemeClr val="accent1"/>
+            </a:effectRef>
+            <a:fontRef idx="minor">
+              <a:schemeClr val="tx1"/>
+            </a:fontRef>
+          </p:style>
+        </p:cxnSp>
+        <p:cxnSp>
+          <p:nvCxnSpPr>
+            <p:cNvPr id="37" name="Rett linje 36"/>
+            <p:cNvCxnSpPr/>
+            <p:nvPr/>
+          </p:nvCxnSpPr>
+          <p:spPr>
+            <a:xfrm flipH="1">
+              <a:off x="9109036" y="1325950"/>
+              <a:ext cx="27131" cy="42715"/>
+            </a:xfrm>
+            <a:prstGeom prst="line">
+              <a:avLst/>
+            </a:prstGeom>
+            <a:ln w="12700">
+              <a:solidFill>
+                <a:srgbClr val="00A14A"/>
+              </a:solidFill>
+              <a:headEnd type="diamond" w="sm" len="sm"/>
+              <a:tailEnd type="none" w="sm" len="sm"/>
+            </a:ln>
+          </p:spPr>
+          <p:style>
+            <a:lnRef idx="1">
+              <a:schemeClr val="accent1"/>
+            </a:lnRef>
+            <a:fillRef idx="0">
+              <a:schemeClr val="accent1"/>
+            </a:fillRef>
+            <a:effectRef idx="0">
+              <a:schemeClr val="accent1"/>
+            </a:effectRef>
+            <a:fontRef idx="minor">
+              <a:schemeClr val="tx1"/>
+            </a:fontRef>
+          </p:style>
+        </p:cxnSp>
+        <p:cxnSp>
+          <p:nvCxnSpPr>
+            <p:cNvPr id="38" name="Rett linje 37"/>
+            <p:cNvCxnSpPr/>
+            <p:nvPr/>
+          </p:nvCxnSpPr>
+          <p:spPr>
+            <a:xfrm>
+              <a:off x="8869284" y="1395983"/>
+              <a:ext cx="38198" cy="22054"/>
+            </a:xfrm>
+            <a:prstGeom prst="line">
+              <a:avLst/>
+            </a:prstGeom>
+            <a:ln w="12700">
+              <a:solidFill>
+                <a:srgbClr val="00A14A"/>
+              </a:solidFill>
+              <a:headEnd type="diamond" w="sm" len="sm"/>
+              <a:tailEnd type="none" w="sm" len="sm"/>
+            </a:ln>
+          </p:spPr>
+          <p:style>
+            <a:lnRef idx="1">
+              <a:schemeClr val="accent1"/>
+            </a:lnRef>
+            <a:fillRef idx="0">
+              <a:schemeClr val="accent1"/>
+            </a:fillRef>
+            <a:effectRef idx="0">
+              <a:schemeClr val="accent1"/>
+            </a:effectRef>
+            <a:fontRef idx="minor">
+              <a:schemeClr val="tx1"/>
+            </a:fontRef>
+          </p:style>
+        </p:cxnSp>
+        <p:cxnSp>
+          <p:nvCxnSpPr>
+            <p:cNvPr id="39" name="Rett linje 38"/>
+            <p:cNvCxnSpPr/>
+            <p:nvPr/>
+          </p:nvCxnSpPr>
+          <p:spPr>
+            <a:xfrm>
+              <a:off x="8854700" y="1442423"/>
+              <a:ext cx="42606" cy="11416"/>
+            </a:xfrm>
+            <a:prstGeom prst="line">
+              <a:avLst/>
+            </a:prstGeom>
+            <a:ln w="12700">
+              <a:solidFill>
+                <a:srgbClr val="00A14A"/>
+              </a:solidFill>
+              <a:headEnd type="diamond" w="sm" len="sm"/>
+              <a:tailEnd type="none" w="sm" len="sm"/>
+            </a:ln>
+          </p:spPr>
+          <p:style>
+            <a:lnRef idx="1">
+              <a:schemeClr val="accent1"/>
+            </a:lnRef>
+            <a:fillRef idx="0">
+              <a:schemeClr val="accent1"/>
+            </a:fillRef>
+            <a:effectRef idx="0">
+              <a:schemeClr val="accent1"/>
+            </a:effectRef>
+            <a:fontRef idx="minor">
+              <a:schemeClr val="tx1"/>
+            </a:fontRef>
+          </p:style>
+        </p:cxnSp>
+        <p:cxnSp>
+          <p:nvCxnSpPr>
+            <p:cNvPr id="40" name="Rett linje 39"/>
+            <p:cNvCxnSpPr/>
+            <p:nvPr/>
+          </p:nvCxnSpPr>
+          <p:spPr>
+            <a:xfrm flipH="1">
+              <a:off x="9161492" y="1397889"/>
+              <a:ext cx="38198" cy="22054"/>
+            </a:xfrm>
+            <a:prstGeom prst="line">
+              <a:avLst/>
+            </a:prstGeom>
+            <a:ln w="12700">
+              <a:solidFill>
+                <a:srgbClr val="00A14A"/>
+              </a:solidFill>
+              <a:headEnd type="diamond" w="sm" len="sm"/>
+              <a:tailEnd type="none" w="sm" len="sm"/>
+            </a:ln>
+          </p:spPr>
+          <p:style>
+            <a:lnRef idx="1">
+              <a:schemeClr val="accent1"/>
+            </a:lnRef>
+            <a:fillRef idx="0">
+              <a:schemeClr val="accent1"/>
+            </a:fillRef>
+            <a:effectRef idx="0">
+              <a:schemeClr val="accent1"/>
+            </a:effectRef>
+            <a:fontRef idx="minor">
+              <a:schemeClr val="tx1"/>
+            </a:fontRef>
+          </p:style>
+        </p:cxnSp>
+        <p:cxnSp>
+          <p:nvCxnSpPr>
+            <p:cNvPr id="42" name="Rett linje 41"/>
+            <p:cNvCxnSpPr/>
+            <p:nvPr/>
+          </p:nvCxnSpPr>
+          <p:spPr>
+            <a:xfrm flipH="1">
+              <a:off x="8873489" y="1565277"/>
+              <a:ext cx="38198" cy="22054"/>
+            </a:xfrm>
+            <a:prstGeom prst="line">
+              <a:avLst/>
+            </a:prstGeom>
+            <a:ln w="12700">
+              <a:solidFill>
+                <a:srgbClr val="00A14A"/>
+              </a:solidFill>
+              <a:tailEnd type="diamond" w="sm" len="sm"/>
+            </a:ln>
+          </p:spPr>
+          <p:style>
+            <a:lnRef idx="1">
+              <a:schemeClr val="accent1"/>
+            </a:lnRef>
+            <a:fillRef idx="0">
+              <a:schemeClr val="accent1"/>
+            </a:fillRef>
+            <a:effectRef idx="0">
+              <a:schemeClr val="accent1"/>
+            </a:effectRef>
+            <a:fontRef idx="minor">
+              <a:schemeClr val="tx1"/>
+            </a:fontRef>
+          </p:style>
+        </p:cxnSp>
+        <p:cxnSp>
+          <p:nvCxnSpPr>
+            <p:cNvPr id="44" name="Rett linje 43"/>
+            <p:cNvCxnSpPr/>
+            <p:nvPr/>
+          </p:nvCxnSpPr>
+          <p:spPr>
+            <a:xfrm flipH="1">
+              <a:off x="8854699" y="1532002"/>
+              <a:ext cx="42606" cy="11416"/>
+            </a:xfrm>
+            <a:prstGeom prst="line">
+              <a:avLst/>
+            </a:prstGeom>
+            <a:ln w="12700">
+              <a:solidFill>
+                <a:srgbClr val="00A14A"/>
+              </a:solidFill>
+              <a:tailEnd type="diamond" w="sm" len="sm"/>
+            </a:ln>
+          </p:spPr>
+          <p:style>
+            <a:lnRef idx="1">
+              <a:schemeClr val="accent1"/>
+            </a:lnRef>
+            <a:fillRef idx="0">
+              <a:schemeClr val="accent1"/>
+            </a:fillRef>
+            <a:effectRef idx="0">
+              <a:schemeClr val="accent1"/>
+            </a:effectRef>
+            <a:fontRef idx="minor">
+              <a:schemeClr val="tx1"/>
+            </a:fontRef>
+          </p:style>
+        </p:cxnSp>
+        <p:cxnSp>
+          <p:nvCxnSpPr>
+            <p:cNvPr id="41" name="Rett linje 40"/>
+            <p:cNvCxnSpPr/>
+            <p:nvPr/>
+          </p:nvCxnSpPr>
+          <p:spPr>
+            <a:xfrm>
+              <a:off x="9074240" y="1628427"/>
+              <a:ext cx="11416" cy="42606"/>
+            </a:xfrm>
+            <a:prstGeom prst="line">
+              <a:avLst/>
+            </a:prstGeom>
+            <a:ln w="12700">
+              <a:solidFill>
+                <a:srgbClr val="00A14A"/>
+              </a:solidFill>
+              <a:tailEnd type="diamond" w="sm" len="sm"/>
+            </a:ln>
+          </p:spPr>
+          <p:style>
+            <a:lnRef idx="1">
+              <a:schemeClr val="accent1"/>
+            </a:lnRef>
+            <a:fillRef idx="0">
+              <a:schemeClr val="accent1"/>
+            </a:fillRef>
+            <a:effectRef idx="0">
+              <a:schemeClr val="accent1"/>
+            </a:effectRef>
+            <a:fontRef idx="minor">
+              <a:schemeClr val="tx1"/>
+            </a:fontRef>
+          </p:style>
+        </p:cxnSp>
+        <p:cxnSp>
+          <p:nvCxnSpPr>
+            <p:cNvPr id="43" name="Rett linje 42"/>
+            <p:cNvCxnSpPr/>
+            <p:nvPr/>
+          </p:nvCxnSpPr>
+          <p:spPr>
+            <a:xfrm>
+              <a:off x="8938260" y="1327785"/>
+              <a:ext cx="19189" cy="35750"/>
+            </a:xfrm>
+            <a:prstGeom prst="line">
+              <a:avLst/>
+            </a:prstGeom>
+            <a:ln w="12700">
+              <a:solidFill>
+                <a:srgbClr val="00A14A"/>
+              </a:solidFill>
+              <a:headEnd type="diamond" w="sm" len="sm"/>
+              <a:tailEnd type="none" w="sm" len="sm"/>
+            </a:ln>
+          </p:spPr>
+          <p:style>
+            <a:lnRef idx="1">
+              <a:schemeClr val="accent1"/>
+            </a:lnRef>
+            <a:fillRef idx="0">
+              <a:schemeClr val="accent1"/>
+            </a:fillRef>
+            <a:effectRef idx="0">
+              <a:schemeClr val="accent1"/>
+            </a:effectRef>
+            <a:fontRef idx="minor">
+              <a:schemeClr val="tx1"/>
+            </a:fontRef>
+          </p:style>
+        </p:cxnSp>
+        <p:cxnSp>
+          <p:nvCxnSpPr>
+            <p:cNvPr id="46" name="Rett linje 45"/>
+            <p:cNvCxnSpPr/>
+            <p:nvPr/>
+          </p:nvCxnSpPr>
+          <p:spPr>
+            <a:xfrm>
+              <a:off x="8981403" y="1307627"/>
+              <a:ext cx="11416" cy="42606"/>
+            </a:xfrm>
+            <a:prstGeom prst="line">
+              <a:avLst/>
+            </a:prstGeom>
+            <a:ln w="12700">
+              <a:solidFill>
+                <a:srgbClr val="00A14A"/>
+              </a:solidFill>
+              <a:headEnd type="diamond" w="sm" len="sm"/>
+              <a:tailEnd type="none" w="sm" len="sm"/>
+            </a:ln>
+          </p:spPr>
+          <p:style>
+            <a:lnRef idx="1">
+              <a:schemeClr val="accent1"/>
+            </a:lnRef>
+            <a:fillRef idx="0">
+              <a:schemeClr val="accent1"/>
+            </a:fillRef>
+            <a:effectRef idx="0">
+              <a:schemeClr val="accent1"/>
+            </a:effectRef>
+            <a:fontRef idx="minor">
+              <a:schemeClr val="tx1"/>
+            </a:fontRef>
+          </p:style>
+        </p:cxnSp>
+        <p:cxnSp>
+          <p:nvCxnSpPr>
+            <p:cNvPr id="47" name="Rett linje 46"/>
+            <p:cNvCxnSpPr/>
+            <p:nvPr/>
+          </p:nvCxnSpPr>
+          <p:spPr>
+            <a:xfrm>
+              <a:off x="9034412" y="1298908"/>
+              <a:ext cx="0" cy="44108"/>
+            </a:xfrm>
+            <a:prstGeom prst="line">
+              <a:avLst/>
+            </a:prstGeom>
+            <a:ln w="12700">
+              <a:solidFill>
+                <a:srgbClr val="00A14A"/>
+              </a:solidFill>
+              <a:headEnd type="diamond" w="sm" len="sm"/>
+              <a:tailEnd type="none" w="sm" len="sm"/>
+            </a:ln>
+          </p:spPr>
+          <p:style>
+            <a:lnRef idx="1">
+              <a:schemeClr val="accent1"/>
+            </a:lnRef>
+            <a:fillRef idx="0">
+              <a:schemeClr val="accent1"/>
+            </a:fillRef>
+            <a:effectRef idx="0">
+              <a:schemeClr val="accent1"/>
+            </a:effectRef>
+            <a:fontRef idx="minor">
+              <a:schemeClr val="tx1"/>
+            </a:fontRef>
+          </p:style>
+        </p:cxnSp>
+        <p:cxnSp>
+          <p:nvCxnSpPr>
+            <p:cNvPr id="48" name="Rett linje 47"/>
+            <p:cNvCxnSpPr/>
+            <p:nvPr/>
+          </p:nvCxnSpPr>
+          <p:spPr>
+            <a:xfrm>
+              <a:off x="9109669" y="1609851"/>
+              <a:ext cx="22054" cy="38198"/>
+            </a:xfrm>
+            <a:prstGeom prst="line">
+              <a:avLst/>
+            </a:prstGeom>
+            <a:ln w="12700">
+              <a:solidFill>
+                <a:srgbClr val="00A14A"/>
+              </a:solidFill>
+              <a:tailEnd type="diamond" w="sm" len="sm"/>
+            </a:ln>
+          </p:spPr>
+          <p:style>
+            <a:lnRef idx="1">
+              <a:schemeClr val="accent1"/>
+            </a:lnRef>
+            <a:fillRef idx="0">
+              <a:schemeClr val="accent1"/>
+            </a:fillRef>
+            <a:effectRef idx="0">
+              <a:schemeClr val="accent1"/>
+            </a:effectRef>
+            <a:fontRef idx="minor">
+              <a:schemeClr val="tx1"/>
+            </a:fontRef>
+          </p:style>
+        </p:cxnSp>
       </p:grpSp>
-      <p:sp>
-        <p:nvSpPr>
-          <p:cNvPr id="7" name="Ellipse 6"/>
-          <p:cNvSpPr/>
-          <p:nvPr/>
-        </p:nvSpPr>
-        <p:spPr>
-          <a:xfrm>
-            <a:off x="6424991" y="3405057"/>
-            <a:ext cx="213359" cy="213359"/>
-          </a:xfrm>
-          <a:prstGeom prst="ellipse">
-            <a:avLst/>
-          </a:prstGeom>
-          <a:solidFill>
-            <a:srgbClr val="00A14A"/>
-          </a:solidFill>
-          <a:ln>
-            <a:solidFill>
-              <a:srgbClr val="00A14A"/>
-            </a:solidFill>
-          </a:ln>
-        </p:spPr>
-        <p:style>
-          <a:lnRef idx="2">
-            <a:schemeClr val="accent1">
-              <a:shade val="50000"/>
-            </a:schemeClr>
-          </a:lnRef>
-          <a:fillRef idx="1">
-            <a:schemeClr val="accent1"/>
-          </a:fillRef>
-          <a:effectRef idx="0">
-            <a:schemeClr val="accent1"/>
-          </a:effectRef>
-          <a:fontRef idx="minor">
-            <a:schemeClr val="lt1"/>
-          </a:fontRef>
-        </p:style>
-        <p:txBody>
-          <a:bodyPr rtlCol="0" anchor="ctr"/>
-          <a:lstStyle/>
-          <a:p>
-            <a:pPr algn="ctr"/>
-            <a:endParaRPr lang="nb-NO"/>
-          </a:p>
-        </p:txBody>
-      </p:sp>
-      <p:sp>
-        <p:nvSpPr>
-          <p:cNvPr id="16" name="Ellipse 15"/>
-          <p:cNvSpPr/>
-          <p:nvPr/>
-        </p:nvSpPr>
-        <p:spPr>
-          <a:xfrm>
-            <a:off x="6152953" y="3661029"/>
-            <a:ext cx="213359" cy="213359"/>
-          </a:xfrm>
-          <a:prstGeom prst="ellipse">
-            <a:avLst/>
-          </a:prstGeom>
-          <a:solidFill>
-            <a:srgbClr val="00A6EB"/>
-          </a:solidFill>
-          <a:ln>
-            <a:solidFill>
-              <a:srgbClr val="00A6EB"/>
-            </a:solidFill>
-          </a:ln>
-        </p:spPr>
-        <p:style>
-          <a:lnRef idx="2">
-            <a:schemeClr val="accent1">
-              <a:shade val="50000"/>
-            </a:schemeClr>
-          </a:lnRef>
-          <a:fillRef idx="1">
-            <a:schemeClr val="accent1"/>
-          </a:fillRef>
-          <a:effectRef idx="0">
-            <a:schemeClr val="accent1"/>
-          </a:effectRef>
-          <a:fontRef idx="minor">
-            <a:schemeClr val="lt1"/>
-          </a:fontRef>
-        </p:style>
-        <p:txBody>
-          <a:bodyPr rtlCol="0" anchor="ctr"/>
-          <a:lstStyle/>
-          <a:p>
-            <a:pPr algn="ctr"/>
-            <a:endParaRPr lang="nb-NO"/>
-          </a:p>
-        </p:txBody>
-      </p:sp>
       <p:grpSp>
         <p:nvGrpSpPr>
-          <p:cNvPr id="10" name="Gruppe 9"/>
+          <p:cNvPr id="100" name="Gruppe 99"/>
           <p:cNvGrpSpPr/>
           <p:nvPr/>
         </p:nvGrpSpPr>
         <p:grpSpPr>
-          <a:xfrm rot="-1440000">
-            <a:off x="6032952" y="3249024"/>
-            <a:ext cx="453358" cy="217122"/>
-            <a:chOff x="2155787" y="1179097"/>
-            <a:chExt cx="453358" cy="217122"/>
+          <a:xfrm>
+            <a:off x="8490849" y="2361370"/>
+            <a:ext cx="241057" cy="386783"/>
+            <a:chOff x="8490849" y="2361370"/>
+            <a:chExt cx="241057" cy="386783"/>
           </a:xfrm>
         </p:grpSpPr>
         <p:sp>
           <p:nvSpPr>
-            <p:cNvPr id="8" name="Rektangel 7"/>
+            <p:cNvPr id="16" name="Ellipse 15"/>
             <p:cNvSpPr>
               <a:spLocks/>
             </p:cNvSpPr>
@@ -7091,14 +7712,14 @@
           </p:nvSpPr>
           <p:spPr>
             <a:xfrm>
-              <a:off x="2261065" y="1189953"/>
-              <a:ext cx="242802" cy="195410"/>
+              <a:off x="8520989" y="2389716"/>
+              <a:ext cx="180000" cy="180000"/>
             </a:xfrm>
-            <a:prstGeom prst="rect">
+            <a:prstGeom prst="ellipse">
               <a:avLst/>
             </a:prstGeom>
             <a:solidFill>
-              <a:srgbClr val="DE2212"/>
+              <a:srgbClr val="00A6EB"/>
             </a:solidFill>
             <a:ln>
               <a:noFill/>
@@ -7131,22 +7752,20 @@
         </p:sp>
         <p:sp>
           <p:nvSpPr>
-            <p:cNvPr id="17" name="Ellipse 16"/>
-            <p:cNvSpPr>
-              <a:spLocks/>
-            </p:cNvSpPr>
+            <p:cNvPr id="68" name="Rektangel 67"/>
+            <p:cNvSpPr/>
             <p:nvPr/>
           </p:nvSpPr>
           <p:spPr>
             <a:xfrm>
-              <a:off x="2343580" y="1179097"/>
-              <a:ext cx="265565" cy="217122"/>
+              <a:off x="8520989" y="2467799"/>
+              <a:ext cx="180000" cy="255030"/>
             </a:xfrm>
-            <a:prstGeom prst="ellipse">
+            <a:prstGeom prst="rect">
               <a:avLst/>
             </a:prstGeom>
             <a:solidFill>
-              <a:srgbClr val="DE2212"/>
+              <a:srgbClr val="00A6EB"/>
             </a:solidFill>
             <a:ln>
               <a:noFill/>
@@ -7177,27 +7796,802 @@
             </a:p>
           </p:txBody>
         </p:sp>
+        <p:cxnSp>
+          <p:nvCxnSpPr>
+            <p:cNvPr id="76" name="Rett pilkobling 75"/>
+            <p:cNvCxnSpPr/>
+            <p:nvPr/>
+          </p:nvCxnSpPr>
+          <p:spPr>
+            <a:xfrm rot="12300000" flipH="1">
+              <a:off x="8657403" y="2370567"/>
+              <a:ext cx="0" cy="52972"/>
+            </a:xfrm>
+            <a:prstGeom prst="straightConnector1">
+              <a:avLst/>
+            </a:prstGeom>
+            <a:ln w="12700">
+              <a:solidFill>
+                <a:srgbClr val="00A6EB"/>
+              </a:solidFill>
+              <a:tailEnd type="diamond" w="sm" len="sm"/>
+            </a:ln>
+          </p:spPr>
+          <p:style>
+            <a:lnRef idx="1">
+              <a:schemeClr val="accent1"/>
+            </a:lnRef>
+            <a:fillRef idx="0">
+              <a:schemeClr val="accent1"/>
+            </a:fillRef>
+            <a:effectRef idx="0">
+              <a:schemeClr val="accent1"/>
+            </a:effectRef>
+            <a:fontRef idx="minor">
+              <a:schemeClr val="tx1"/>
+            </a:fontRef>
+          </p:style>
+        </p:cxnSp>
+        <p:cxnSp>
+          <p:nvCxnSpPr>
+            <p:cNvPr id="78" name="Rett pilkobling 77"/>
+            <p:cNvCxnSpPr/>
+            <p:nvPr/>
+          </p:nvCxnSpPr>
+          <p:spPr>
+            <a:xfrm rot="5400000">
+              <a:off x="8701416" y="2486616"/>
+              <a:ext cx="0" cy="52972"/>
+            </a:xfrm>
+            <a:prstGeom prst="straightConnector1">
+              <a:avLst/>
+            </a:prstGeom>
+            <a:ln w="12700">
+              <a:solidFill>
+                <a:srgbClr val="00A6EB"/>
+              </a:solidFill>
+              <a:headEnd type="diamond" w="sm" len="sm"/>
+              <a:tailEnd type="none" w="sm" len="sm"/>
+            </a:ln>
+          </p:spPr>
+          <p:style>
+            <a:lnRef idx="1">
+              <a:schemeClr val="accent1"/>
+            </a:lnRef>
+            <a:fillRef idx="0">
+              <a:schemeClr val="accent1"/>
+            </a:fillRef>
+            <a:effectRef idx="0">
+              <a:schemeClr val="accent1"/>
+            </a:effectRef>
+            <a:fontRef idx="minor">
+              <a:schemeClr val="tx1"/>
+            </a:fontRef>
+          </p:style>
+        </p:cxnSp>
+        <p:cxnSp>
+          <p:nvCxnSpPr>
+            <p:cNvPr id="80" name="Rett pilkobling 79"/>
+            <p:cNvCxnSpPr/>
+            <p:nvPr/>
+          </p:nvCxnSpPr>
+          <p:spPr>
+            <a:xfrm>
+              <a:off x="8613375" y="2361370"/>
+              <a:ext cx="0" cy="52972"/>
+            </a:xfrm>
+            <a:prstGeom prst="straightConnector1">
+              <a:avLst/>
+            </a:prstGeom>
+            <a:ln w="12700">
+              <a:solidFill>
+                <a:srgbClr val="00A6EB"/>
+              </a:solidFill>
+              <a:headEnd type="diamond" w="sm" len="sm"/>
+              <a:tailEnd type="none" w="sm" len="sm"/>
+            </a:ln>
+          </p:spPr>
+          <p:style>
+            <a:lnRef idx="1">
+              <a:schemeClr val="accent1"/>
+            </a:lnRef>
+            <a:fillRef idx="0">
+              <a:schemeClr val="accent1"/>
+            </a:fillRef>
+            <a:effectRef idx="0">
+              <a:schemeClr val="accent1"/>
+            </a:effectRef>
+            <a:fontRef idx="minor">
+              <a:schemeClr val="tx1"/>
+            </a:fontRef>
+          </p:style>
+        </p:cxnSp>
+        <p:cxnSp>
+          <p:nvCxnSpPr>
+            <p:cNvPr id="81" name="Rett pilkobling 80"/>
+            <p:cNvCxnSpPr/>
+            <p:nvPr/>
+          </p:nvCxnSpPr>
+          <p:spPr>
+            <a:xfrm>
+              <a:off x="8669394" y="2695181"/>
+              <a:ext cx="0" cy="52972"/>
+            </a:xfrm>
+            <a:prstGeom prst="straightConnector1">
+              <a:avLst/>
+            </a:prstGeom>
+            <a:ln w="12700">
+              <a:solidFill>
+                <a:srgbClr val="00A6EB"/>
+              </a:solidFill>
+              <a:tailEnd type="diamond" w="sm" len="sm"/>
+            </a:ln>
+          </p:spPr>
+          <p:style>
+            <a:lnRef idx="1">
+              <a:schemeClr val="accent1"/>
+            </a:lnRef>
+            <a:fillRef idx="0">
+              <a:schemeClr val="accent1"/>
+            </a:fillRef>
+            <a:effectRef idx="0">
+              <a:schemeClr val="accent1"/>
+            </a:effectRef>
+            <a:fontRef idx="minor">
+              <a:schemeClr val="tx1"/>
+            </a:fontRef>
+          </p:style>
+        </p:cxnSp>
+        <p:cxnSp>
+          <p:nvCxnSpPr>
+            <p:cNvPr id="82" name="Rett pilkobling 81"/>
+            <p:cNvCxnSpPr/>
+            <p:nvPr/>
+          </p:nvCxnSpPr>
+          <p:spPr>
+            <a:xfrm>
+              <a:off x="8545341" y="2695181"/>
+              <a:ext cx="0" cy="52972"/>
+            </a:xfrm>
+            <a:prstGeom prst="straightConnector1">
+              <a:avLst/>
+            </a:prstGeom>
+            <a:ln w="12700">
+              <a:solidFill>
+                <a:srgbClr val="00A6EB"/>
+              </a:solidFill>
+              <a:tailEnd type="diamond" w="sm" len="sm"/>
+            </a:ln>
+          </p:spPr>
+          <p:style>
+            <a:lnRef idx="1">
+              <a:schemeClr val="accent1"/>
+            </a:lnRef>
+            <a:fillRef idx="0">
+              <a:schemeClr val="accent1"/>
+            </a:fillRef>
+            <a:effectRef idx="0">
+              <a:schemeClr val="accent1"/>
+            </a:effectRef>
+            <a:fontRef idx="minor">
+              <a:schemeClr val="tx1"/>
+            </a:fontRef>
+          </p:style>
+        </p:cxnSp>
+        <p:cxnSp>
+          <p:nvCxnSpPr>
+            <p:cNvPr id="84" name="Rett pilkobling 83"/>
+            <p:cNvCxnSpPr/>
+            <p:nvPr/>
+          </p:nvCxnSpPr>
+          <p:spPr>
+            <a:xfrm rot="5400000">
+              <a:off x="8701416" y="2548644"/>
+              <a:ext cx="0" cy="52972"/>
+            </a:xfrm>
+            <a:prstGeom prst="straightConnector1">
+              <a:avLst/>
+            </a:prstGeom>
+            <a:ln w="12700">
+              <a:solidFill>
+                <a:srgbClr val="00A6EB"/>
+              </a:solidFill>
+              <a:headEnd type="diamond" w="sm" len="sm"/>
+              <a:tailEnd type="none" w="sm" len="sm"/>
+            </a:ln>
+          </p:spPr>
+          <p:style>
+            <a:lnRef idx="1">
+              <a:schemeClr val="accent1"/>
+            </a:lnRef>
+            <a:fillRef idx="0">
+              <a:schemeClr val="accent1"/>
+            </a:fillRef>
+            <a:effectRef idx="0">
+              <a:schemeClr val="accent1"/>
+            </a:effectRef>
+            <a:fontRef idx="minor">
+              <a:schemeClr val="tx1"/>
+            </a:fontRef>
+          </p:style>
+        </p:cxnSp>
+        <p:cxnSp>
+          <p:nvCxnSpPr>
+            <p:cNvPr id="85" name="Rett pilkobling 84"/>
+            <p:cNvCxnSpPr/>
+            <p:nvPr/>
+          </p:nvCxnSpPr>
+          <p:spPr>
+            <a:xfrm rot="5400000">
+              <a:off x="8701416" y="2668695"/>
+              <a:ext cx="0" cy="52972"/>
+            </a:xfrm>
+            <a:prstGeom prst="straightConnector1">
+              <a:avLst/>
+            </a:prstGeom>
+            <a:ln w="12700">
+              <a:solidFill>
+                <a:srgbClr val="00A6EB"/>
+              </a:solidFill>
+              <a:headEnd type="diamond" w="sm" len="sm"/>
+              <a:tailEnd type="none" w="sm" len="sm"/>
+            </a:ln>
+          </p:spPr>
+          <p:style>
+            <a:lnRef idx="1">
+              <a:schemeClr val="accent1"/>
+            </a:lnRef>
+            <a:fillRef idx="0">
+              <a:schemeClr val="accent1"/>
+            </a:fillRef>
+            <a:effectRef idx="0">
+              <a:schemeClr val="accent1"/>
+            </a:effectRef>
+            <a:fontRef idx="minor">
+              <a:schemeClr val="tx1"/>
+            </a:fontRef>
+          </p:style>
+        </p:cxnSp>
+        <p:cxnSp>
+          <p:nvCxnSpPr>
+            <p:cNvPr id="86" name="Rett pilkobling 85"/>
+            <p:cNvCxnSpPr/>
+            <p:nvPr/>
+          </p:nvCxnSpPr>
+          <p:spPr>
+            <a:xfrm flipH="1">
+              <a:off x="8677797" y="2633155"/>
+              <a:ext cx="50105" cy="1999"/>
+            </a:xfrm>
+            <a:prstGeom prst="straightConnector1">
+              <a:avLst/>
+            </a:prstGeom>
+            <a:ln w="12700">
+              <a:solidFill>
+                <a:srgbClr val="00A6EB"/>
+              </a:solidFill>
+              <a:headEnd type="diamond" w="sm" len="sm"/>
+              <a:tailEnd type="none" w="sm" len="sm"/>
+            </a:ln>
+          </p:spPr>
+          <p:style>
+            <a:lnRef idx="1">
+              <a:schemeClr val="accent1"/>
+            </a:lnRef>
+            <a:fillRef idx="0">
+              <a:schemeClr val="accent1"/>
+            </a:fillRef>
+            <a:effectRef idx="0">
+              <a:schemeClr val="accent1"/>
+            </a:effectRef>
+            <a:fontRef idx="minor">
+              <a:schemeClr val="tx1"/>
+            </a:fontRef>
+          </p:style>
+        </p:cxnSp>
+        <p:cxnSp>
+          <p:nvCxnSpPr>
+            <p:cNvPr id="87" name="Rett pilkobling 86"/>
+            <p:cNvCxnSpPr/>
+            <p:nvPr/>
+          </p:nvCxnSpPr>
+          <p:spPr>
+            <a:xfrm rot="5400000">
+              <a:off x="8517335" y="2492619"/>
+              <a:ext cx="0" cy="52972"/>
+            </a:xfrm>
+            <a:prstGeom prst="straightConnector1">
+              <a:avLst/>
+            </a:prstGeom>
+            <a:ln w="12700">
+              <a:solidFill>
+                <a:srgbClr val="00A6EB"/>
+              </a:solidFill>
+              <a:tailEnd type="diamond" w="sm" len="sm"/>
+            </a:ln>
+          </p:spPr>
+          <p:style>
+            <a:lnRef idx="1">
+              <a:schemeClr val="accent1"/>
+            </a:lnRef>
+            <a:fillRef idx="0">
+              <a:schemeClr val="accent1"/>
+            </a:fillRef>
+            <a:effectRef idx="0">
+              <a:schemeClr val="accent1"/>
+            </a:effectRef>
+            <a:fontRef idx="minor">
+              <a:schemeClr val="tx1"/>
+            </a:fontRef>
+          </p:style>
+        </p:cxnSp>
+        <p:cxnSp>
+          <p:nvCxnSpPr>
+            <p:cNvPr id="88" name="Rett pilkobling 87"/>
+            <p:cNvCxnSpPr/>
+            <p:nvPr/>
+          </p:nvCxnSpPr>
+          <p:spPr>
+            <a:xfrm rot="5400000">
+              <a:off x="8517335" y="2548644"/>
+              <a:ext cx="0" cy="52972"/>
+            </a:xfrm>
+            <a:prstGeom prst="straightConnector1">
+              <a:avLst/>
+            </a:prstGeom>
+            <a:ln w="12700">
+              <a:solidFill>
+                <a:srgbClr val="00A6EB"/>
+              </a:solidFill>
+              <a:tailEnd type="diamond" w="sm" len="sm"/>
+            </a:ln>
+          </p:spPr>
+          <p:style>
+            <a:lnRef idx="1">
+              <a:schemeClr val="accent1"/>
+            </a:lnRef>
+            <a:fillRef idx="0">
+              <a:schemeClr val="accent1"/>
+            </a:fillRef>
+            <a:effectRef idx="0">
+              <a:schemeClr val="accent1"/>
+            </a:effectRef>
+            <a:fontRef idx="minor">
+              <a:schemeClr val="tx1"/>
+            </a:fontRef>
+          </p:style>
+        </p:cxnSp>
+        <p:cxnSp>
+          <p:nvCxnSpPr>
+            <p:cNvPr id="89" name="Rett pilkobling 88"/>
+            <p:cNvCxnSpPr/>
+            <p:nvPr/>
+          </p:nvCxnSpPr>
+          <p:spPr>
+            <a:xfrm rot="5400000">
+              <a:off x="8517335" y="2668695"/>
+              <a:ext cx="0" cy="52972"/>
+            </a:xfrm>
+            <a:prstGeom prst="straightConnector1">
+              <a:avLst/>
+            </a:prstGeom>
+            <a:ln w="12700">
+              <a:solidFill>
+                <a:srgbClr val="00A6EB"/>
+              </a:solidFill>
+              <a:tailEnd type="diamond" w="sm" len="sm"/>
+            </a:ln>
+          </p:spPr>
+          <p:style>
+            <a:lnRef idx="1">
+              <a:schemeClr val="accent1"/>
+            </a:lnRef>
+            <a:fillRef idx="0">
+              <a:schemeClr val="accent1"/>
+            </a:fillRef>
+            <a:effectRef idx="0">
+              <a:schemeClr val="accent1"/>
+            </a:effectRef>
+            <a:fontRef idx="minor">
+              <a:schemeClr val="tx1"/>
+            </a:fontRef>
+          </p:style>
+        </p:cxnSp>
+        <p:cxnSp>
+          <p:nvCxnSpPr>
+            <p:cNvPr id="90" name="Rett pilkobling 89"/>
+            <p:cNvCxnSpPr/>
+            <p:nvPr/>
+          </p:nvCxnSpPr>
+          <p:spPr>
+            <a:xfrm flipH="1">
+              <a:off x="8493716" y="2633155"/>
+              <a:ext cx="50105" cy="1999"/>
+            </a:xfrm>
+            <a:prstGeom prst="straightConnector1">
+              <a:avLst/>
+            </a:prstGeom>
+            <a:ln w="12700">
+              <a:solidFill>
+                <a:srgbClr val="00A6EB"/>
+              </a:solidFill>
+              <a:tailEnd type="diamond" w="sm" len="sm"/>
+            </a:ln>
+          </p:spPr>
+          <p:style>
+            <a:lnRef idx="1">
+              <a:schemeClr val="accent1"/>
+            </a:lnRef>
+            <a:fillRef idx="0">
+              <a:schemeClr val="accent1"/>
+            </a:fillRef>
+            <a:effectRef idx="0">
+              <a:schemeClr val="accent1"/>
+            </a:effectRef>
+            <a:fontRef idx="minor">
+              <a:schemeClr val="tx1"/>
+            </a:fontRef>
+          </p:style>
+        </p:cxnSp>
+        <p:cxnSp>
+          <p:nvCxnSpPr>
+            <p:cNvPr id="92" name="Rett pilkobling 91"/>
+            <p:cNvCxnSpPr/>
+            <p:nvPr/>
+          </p:nvCxnSpPr>
+          <p:spPr>
+            <a:xfrm>
+              <a:off x="8607372" y="2695181"/>
+              <a:ext cx="0" cy="52972"/>
+            </a:xfrm>
+            <a:prstGeom prst="straightConnector1">
+              <a:avLst/>
+            </a:prstGeom>
+            <a:ln w="12700">
+              <a:solidFill>
+                <a:srgbClr val="00A6EB"/>
+              </a:solidFill>
+              <a:tailEnd type="diamond" w="sm" len="sm"/>
+            </a:ln>
+          </p:spPr>
+          <p:style>
+            <a:lnRef idx="1">
+              <a:schemeClr val="accent1"/>
+            </a:lnRef>
+            <a:fillRef idx="0">
+              <a:schemeClr val="accent1"/>
+            </a:fillRef>
+            <a:effectRef idx="0">
+              <a:schemeClr val="accent1"/>
+            </a:effectRef>
+            <a:fontRef idx="minor">
+              <a:schemeClr val="tx1"/>
+            </a:fontRef>
+          </p:style>
+        </p:cxnSp>
+        <p:cxnSp>
+          <p:nvCxnSpPr>
+            <p:cNvPr id="95" name="Rett pilkobling 94"/>
+            <p:cNvCxnSpPr/>
+            <p:nvPr/>
+          </p:nvCxnSpPr>
+          <p:spPr>
+            <a:xfrm rot="900000" flipH="1">
+              <a:off x="8493720" y="2463082"/>
+              <a:ext cx="50105" cy="1999"/>
+            </a:xfrm>
+            <a:prstGeom prst="straightConnector1">
+              <a:avLst/>
+            </a:prstGeom>
+            <a:ln w="12700">
+              <a:solidFill>
+                <a:srgbClr val="00A6EB"/>
+              </a:solidFill>
+              <a:tailEnd type="diamond" w="sm" len="sm"/>
+            </a:ln>
+          </p:spPr>
+          <p:style>
+            <a:lnRef idx="1">
+              <a:schemeClr val="accent1"/>
+            </a:lnRef>
+            <a:fillRef idx="0">
+              <a:schemeClr val="accent1"/>
+            </a:fillRef>
+            <a:effectRef idx="0">
+              <a:schemeClr val="accent1"/>
+            </a:effectRef>
+            <a:fontRef idx="minor">
+              <a:schemeClr val="tx1"/>
+            </a:fontRef>
+          </p:style>
+        </p:cxnSp>
+        <p:cxnSp>
+          <p:nvCxnSpPr>
+            <p:cNvPr id="96" name="Rett pilkobling 95"/>
+            <p:cNvCxnSpPr/>
+            <p:nvPr/>
+          </p:nvCxnSpPr>
+          <p:spPr>
+            <a:xfrm rot="20700000">
+              <a:off x="8681801" y="2463082"/>
+              <a:ext cx="50105" cy="1999"/>
+            </a:xfrm>
+            <a:prstGeom prst="straightConnector1">
+              <a:avLst/>
+            </a:prstGeom>
+            <a:ln w="12700">
+              <a:solidFill>
+                <a:srgbClr val="00A6EB"/>
+              </a:solidFill>
+              <a:tailEnd type="diamond" w="sm" len="sm"/>
+            </a:ln>
+          </p:spPr>
+          <p:style>
+            <a:lnRef idx="1">
+              <a:schemeClr val="accent1"/>
+            </a:lnRef>
+            <a:fillRef idx="0">
+              <a:schemeClr val="accent1"/>
+            </a:fillRef>
+            <a:effectRef idx="0">
+              <a:schemeClr val="accent1"/>
+            </a:effectRef>
+            <a:fontRef idx="minor">
+              <a:schemeClr val="tx1"/>
+            </a:fontRef>
+          </p:style>
+        </p:cxnSp>
+        <p:cxnSp>
+          <p:nvCxnSpPr>
+            <p:cNvPr id="97" name="Rett pilkobling 96"/>
+            <p:cNvCxnSpPr/>
+            <p:nvPr/>
+          </p:nvCxnSpPr>
+          <p:spPr>
+            <a:xfrm rot="13500000" flipH="1">
+              <a:off x="8689411" y="2400582"/>
+              <a:ext cx="0" cy="52972"/>
+            </a:xfrm>
+            <a:prstGeom prst="straightConnector1">
+              <a:avLst/>
+            </a:prstGeom>
+            <a:ln w="12700">
+              <a:solidFill>
+                <a:srgbClr val="00A6EB"/>
+              </a:solidFill>
+              <a:tailEnd type="diamond" w="sm" len="sm"/>
+            </a:ln>
+          </p:spPr>
+          <p:style>
+            <a:lnRef idx="1">
+              <a:schemeClr val="accent1"/>
+            </a:lnRef>
+            <a:fillRef idx="0">
+              <a:schemeClr val="accent1"/>
+            </a:fillRef>
+            <a:effectRef idx="0">
+              <a:schemeClr val="accent1"/>
+            </a:effectRef>
+            <a:fontRef idx="minor">
+              <a:schemeClr val="tx1"/>
+            </a:fontRef>
+          </p:style>
+        </p:cxnSp>
+        <p:cxnSp>
+          <p:nvCxnSpPr>
+            <p:cNvPr id="98" name="Rett pilkobling 97"/>
+            <p:cNvCxnSpPr/>
+            <p:nvPr/>
+          </p:nvCxnSpPr>
+          <p:spPr>
+            <a:xfrm rot="9300000">
+              <a:off x="8571362" y="2374569"/>
+              <a:ext cx="0" cy="52972"/>
+            </a:xfrm>
+            <a:prstGeom prst="straightConnector1">
+              <a:avLst/>
+            </a:prstGeom>
+            <a:ln w="12700">
+              <a:solidFill>
+                <a:srgbClr val="00A6EB"/>
+              </a:solidFill>
+              <a:tailEnd type="diamond" w="sm" len="sm"/>
+            </a:ln>
+          </p:spPr>
+          <p:style>
+            <a:lnRef idx="1">
+              <a:schemeClr val="accent1"/>
+            </a:lnRef>
+            <a:fillRef idx="0">
+              <a:schemeClr val="accent1"/>
+            </a:fillRef>
+            <a:effectRef idx="0">
+              <a:schemeClr val="accent1"/>
+            </a:effectRef>
+            <a:fontRef idx="minor">
+              <a:schemeClr val="tx1"/>
+            </a:fontRef>
+          </p:style>
+        </p:cxnSp>
+        <p:cxnSp>
+          <p:nvCxnSpPr>
+            <p:cNvPr id="99" name="Rett pilkobling 98"/>
+            <p:cNvCxnSpPr/>
+            <p:nvPr/>
+          </p:nvCxnSpPr>
+          <p:spPr>
+            <a:xfrm rot="8100000">
+              <a:off x="8535344" y="2402583"/>
+              <a:ext cx="0" cy="52972"/>
+            </a:xfrm>
+            <a:prstGeom prst="straightConnector1">
+              <a:avLst/>
+            </a:prstGeom>
+            <a:ln w="12700">
+              <a:solidFill>
+                <a:srgbClr val="00A6EB"/>
+              </a:solidFill>
+              <a:tailEnd type="diamond" w="sm" len="sm"/>
+            </a:ln>
+          </p:spPr>
+          <p:style>
+            <a:lnRef idx="1">
+              <a:schemeClr val="accent1"/>
+            </a:lnRef>
+            <a:fillRef idx="0">
+              <a:schemeClr val="accent1"/>
+            </a:fillRef>
+            <a:effectRef idx="0">
+              <a:schemeClr val="accent1"/>
+            </a:effectRef>
+            <a:fontRef idx="minor">
+              <a:schemeClr val="tx1"/>
+            </a:fontRef>
+          </p:style>
+        </p:cxnSp>
+      </p:grpSp>
+      <p:grpSp>
+        <p:nvGrpSpPr>
+          <p:cNvPr id="103" name="Gruppe 102"/>
+          <p:cNvGrpSpPr/>
+          <p:nvPr/>
+        </p:nvGrpSpPr>
+        <p:grpSpPr>
+          <a:xfrm>
+            <a:off x="4735200" y="2244483"/>
+            <a:ext cx="2721600" cy="2369033"/>
+            <a:chOff x="4735200" y="2244483"/>
+            <a:chExt cx="2721600" cy="2369033"/>
+          </a:xfrm>
+        </p:grpSpPr>
         <p:sp>
           <p:nvSpPr>
-            <p:cNvPr id="18" name="Ellipse 17"/>
+            <p:cNvPr id="2" name="Hexagon 35">
+              <a:extLst>
+                <a:ext uri="{FF2B5EF4-FFF2-40B4-BE49-F238E27FC236}">
+                  <a16:creationId xmlns:a16="http://schemas.microsoft.com/office/drawing/2014/main" id="{90E46B38-1301-774F-8904-FFF8966BD8C2}"/>
+                </a:ext>
+              </a:extLst>
+            </p:cNvPr>
             <p:cNvSpPr>
-              <a:spLocks/>
+              <a:spLocks noChangeAspect="1"/>
             </p:cNvSpPr>
             <p:nvPr/>
           </p:nvSpPr>
           <p:spPr>
+            <a:xfrm rot="1800000">
+              <a:off x="4735200" y="2244483"/>
+              <a:ext cx="2721600" cy="2369033"/>
+            </a:xfrm>
+            <a:prstGeom prst="hexagon">
+              <a:avLst>
+                <a:gd name="adj" fmla="val 28372"/>
+                <a:gd name="vf" fmla="val 115470"/>
+              </a:avLst>
+            </a:prstGeom>
+            <a:solidFill>
+              <a:srgbClr val="133E4D"/>
+            </a:solidFill>
+            <a:ln w="69850">
+              <a:solidFill>
+                <a:schemeClr val="tx1">
+                  <a:lumMod val="85000"/>
+                  <a:lumOff val="15000"/>
+                </a:schemeClr>
+              </a:solidFill>
+            </a:ln>
+          </p:spPr>
+          <p:style>
+            <a:lnRef idx="2">
+              <a:schemeClr val="accent1">
+                <a:shade val="50000"/>
+              </a:schemeClr>
+            </a:lnRef>
+            <a:fillRef idx="1">
+              <a:schemeClr val="accent1"/>
+            </a:fillRef>
+            <a:effectRef idx="0">
+              <a:schemeClr val="accent1"/>
+            </a:effectRef>
+            <a:fontRef idx="minor">
+              <a:schemeClr val="lt1"/>
+            </a:fontRef>
+          </p:style>
+          <p:txBody>
+            <a:bodyPr rtlCol="0" anchor="ctr"/>
+            <a:lstStyle/>
+            <a:p>
+              <a:pPr algn="ctr"/>
+              <a:endParaRPr lang="en-US" dirty="0"/>
+            </a:p>
+          </p:txBody>
+        </p:sp>
+        <p:sp>
+          <p:nvSpPr>
+            <p:cNvPr id="45" name="TekstSylinder 44"/>
+            <p:cNvSpPr txBox="1"/>
+            <p:nvPr/>
+          </p:nvSpPr>
+          <p:spPr>
             <a:xfrm>
-              <a:off x="2155787" y="1179097"/>
-              <a:ext cx="265565" cy="217122"/>
+              <a:off x="4951956" y="2496396"/>
+              <a:ext cx="2292096" cy="461665"/>
+            </a:xfrm>
+            <a:prstGeom prst="rect">
+              <a:avLst/>
+            </a:prstGeom>
+            <a:noFill/>
+          </p:spPr>
+          <p:txBody>
+            <a:bodyPr wrap="square" rtlCol="0">
+              <a:spAutoFit/>
+            </a:bodyPr>
+            <a:lstStyle/>
+            <a:p>
+              <a:pPr algn="ctr"/>
+              <a:r>
+                <a:rPr lang="nb-NO" sz="2400" dirty="0" err="1" smtClean="0">
+                  <a:solidFill>
+                    <a:schemeClr val="bg2">
+                      <a:lumMod val="90000"/>
+                    </a:schemeClr>
+                  </a:solidFill>
+                  <a:latin typeface="Trebuchet MS" panose="020B0603020202020204" pitchFamily="34" charset="0"/>
+                </a:rPr>
+                <a:t>OKplan</a:t>
+              </a:r>
+              <a:endParaRPr lang="nb-NO" sz="2400" dirty="0">
+                <a:solidFill>
+                  <a:schemeClr val="bg2">
+                    <a:lumMod val="90000"/>
+                  </a:schemeClr>
+                </a:solidFill>
+                <a:latin typeface="Trebuchet MS" panose="020B0603020202020204" pitchFamily="34" charset="0"/>
+              </a:endParaRPr>
+            </a:p>
+          </p:txBody>
+        </p:sp>
+        <p:sp>
+          <p:nvSpPr>
+            <p:cNvPr id="4" name="Ellipse 3"/>
+            <p:cNvSpPr/>
+            <p:nvPr/>
+          </p:nvSpPr>
+          <p:spPr>
+            <a:xfrm>
+              <a:off x="5848287" y="3048675"/>
+              <a:ext cx="963184" cy="979195"/>
             </a:xfrm>
             <a:prstGeom prst="ellipse">
               <a:avLst/>
             </a:prstGeom>
             <a:solidFill>
-              <a:srgbClr val="DE2212"/>
+              <a:schemeClr val="bg1"/>
             </a:solidFill>
-            <a:ln>
-              <a:noFill/>
+            <a:ln w="63500">
+              <a:solidFill>
+                <a:srgbClr val="979EA6"/>
+              </a:solidFill>
             </a:ln>
           </p:spPr>
           <p:style>
@@ -7225,764 +8619,337 @@
             </a:p>
           </p:txBody>
         </p:sp>
+        <p:grpSp>
+          <p:nvGrpSpPr>
+            <p:cNvPr id="19" name="Gruppe 18"/>
+            <p:cNvGrpSpPr/>
+            <p:nvPr/>
+          </p:nvGrpSpPr>
+          <p:grpSpPr>
+            <a:xfrm>
+              <a:off x="5185762" y="3693166"/>
+              <a:ext cx="712256" cy="316256"/>
+              <a:chOff x="5301656" y="3687070"/>
+              <a:chExt cx="712256" cy="316256"/>
+            </a:xfrm>
+          </p:grpSpPr>
+          <p:sp>
+            <p:nvSpPr>
+              <p:cNvPr id="6" name="Avrundet rektangel 5"/>
+              <p:cNvSpPr/>
+              <p:nvPr/>
+            </p:nvSpPr>
+            <p:spPr>
+              <a:xfrm rot="20040000">
+                <a:off x="5832438" y="3687070"/>
+                <a:ext cx="181474" cy="150982"/>
+              </a:xfrm>
+              <a:prstGeom prst="roundRect">
+                <a:avLst/>
+              </a:prstGeom>
+              <a:solidFill>
+                <a:srgbClr val="979EA6"/>
+              </a:solidFill>
+              <a:ln>
+                <a:solidFill>
+                  <a:srgbClr val="979EA6"/>
+                </a:solidFill>
+              </a:ln>
+            </p:spPr>
+            <p:style>
+              <a:lnRef idx="2">
+                <a:schemeClr val="accent1">
+                  <a:shade val="50000"/>
+                </a:schemeClr>
+              </a:lnRef>
+              <a:fillRef idx="1">
+                <a:schemeClr val="accent1"/>
+              </a:fillRef>
+              <a:effectRef idx="0">
+                <a:schemeClr val="accent1"/>
+              </a:effectRef>
+              <a:fontRef idx="minor">
+                <a:schemeClr val="lt1"/>
+              </a:fontRef>
+            </p:style>
+            <p:txBody>
+              <a:bodyPr rtlCol="0" anchor="ctr"/>
+              <a:lstStyle/>
+              <a:p>
+                <a:pPr algn="ctr"/>
+                <a:endParaRPr lang="nb-NO"/>
+              </a:p>
+            </p:txBody>
+          </p:sp>
+          <p:sp>
+            <p:nvSpPr>
+              <p:cNvPr id="3" name="Avrundet rektangel 2"/>
+              <p:cNvSpPr/>
+              <p:nvPr/>
+            </p:nvSpPr>
+            <p:spPr>
+              <a:xfrm rot="20040000">
+                <a:off x="5301656" y="3808774"/>
+                <a:ext cx="654646" cy="194552"/>
+              </a:xfrm>
+              <a:prstGeom prst="roundRect">
+                <a:avLst/>
+              </a:prstGeom>
+              <a:solidFill>
+                <a:srgbClr val="7C858E"/>
+              </a:solidFill>
+              <a:ln w="28575">
+                <a:solidFill>
+                  <a:srgbClr val="979EA6"/>
+                </a:solidFill>
+              </a:ln>
+            </p:spPr>
+            <p:style>
+              <a:lnRef idx="2">
+                <a:schemeClr val="accent1">
+                  <a:shade val="50000"/>
+                </a:schemeClr>
+              </a:lnRef>
+              <a:fillRef idx="1">
+                <a:schemeClr val="accent1"/>
+              </a:fillRef>
+              <a:effectRef idx="0">
+                <a:schemeClr val="accent1"/>
+              </a:effectRef>
+              <a:fontRef idx="minor">
+                <a:schemeClr val="lt1"/>
+              </a:fontRef>
+            </p:style>
+            <p:txBody>
+              <a:bodyPr rtlCol="0" anchor="ctr"/>
+              <a:lstStyle/>
+              <a:p>
+                <a:pPr algn="ctr"/>
+                <a:endParaRPr lang="nb-NO"/>
+              </a:p>
+            </p:txBody>
+          </p:sp>
+        </p:grpSp>
+        <p:grpSp>
+          <p:nvGrpSpPr>
+            <p:cNvPr id="10" name="Gruppe 9"/>
+            <p:cNvGrpSpPr/>
+            <p:nvPr/>
+          </p:nvGrpSpPr>
+          <p:grpSpPr>
+            <a:xfrm rot="-1440000">
+              <a:off x="6029189" y="3260313"/>
+              <a:ext cx="453358" cy="217122"/>
+              <a:chOff x="2155787" y="1179097"/>
+              <a:chExt cx="453358" cy="217122"/>
+            </a:xfrm>
+          </p:grpSpPr>
+          <p:sp>
+            <p:nvSpPr>
+              <p:cNvPr id="8" name="Rektangel 7"/>
+              <p:cNvSpPr>
+                <a:spLocks/>
+              </p:cNvSpPr>
+              <p:nvPr/>
+            </p:nvSpPr>
+            <p:spPr>
+              <a:xfrm>
+                <a:off x="2261065" y="1189953"/>
+                <a:ext cx="242802" cy="195410"/>
+              </a:xfrm>
+              <a:prstGeom prst="rect">
+                <a:avLst/>
+              </a:prstGeom>
+              <a:solidFill>
+                <a:srgbClr val="DE2212"/>
+              </a:solidFill>
+              <a:ln>
+                <a:noFill/>
+              </a:ln>
+            </p:spPr>
+            <p:style>
+              <a:lnRef idx="2">
+                <a:schemeClr val="accent1">
+                  <a:shade val="50000"/>
+                </a:schemeClr>
+              </a:lnRef>
+              <a:fillRef idx="1">
+                <a:schemeClr val="accent1"/>
+              </a:fillRef>
+              <a:effectRef idx="0">
+                <a:schemeClr val="accent1"/>
+              </a:effectRef>
+              <a:fontRef idx="minor">
+                <a:schemeClr val="lt1"/>
+              </a:fontRef>
+            </p:style>
+            <p:txBody>
+              <a:bodyPr rtlCol="0" anchor="ctr"/>
+              <a:lstStyle/>
+              <a:p>
+                <a:pPr algn="ctr"/>
+                <a:endParaRPr lang="nb-NO"/>
+              </a:p>
+            </p:txBody>
+          </p:sp>
+          <p:sp>
+            <p:nvSpPr>
+              <p:cNvPr id="17" name="Ellipse 16"/>
+              <p:cNvSpPr>
+                <a:spLocks/>
+              </p:cNvSpPr>
+              <p:nvPr/>
+            </p:nvSpPr>
+            <p:spPr>
+              <a:xfrm>
+                <a:off x="2343580" y="1179097"/>
+                <a:ext cx="265565" cy="217122"/>
+              </a:xfrm>
+              <a:prstGeom prst="ellipse">
+                <a:avLst/>
+              </a:prstGeom>
+              <a:solidFill>
+                <a:srgbClr val="DE2212"/>
+              </a:solidFill>
+              <a:ln>
+                <a:noFill/>
+              </a:ln>
+            </p:spPr>
+            <p:style>
+              <a:lnRef idx="2">
+                <a:schemeClr val="accent1">
+                  <a:shade val="50000"/>
+                </a:schemeClr>
+              </a:lnRef>
+              <a:fillRef idx="1">
+                <a:schemeClr val="accent1"/>
+              </a:fillRef>
+              <a:effectRef idx="0">
+                <a:schemeClr val="accent1"/>
+              </a:effectRef>
+              <a:fontRef idx="minor">
+                <a:schemeClr val="lt1"/>
+              </a:fontRef>
+            </p:style>
+            <p:txBody>
+              <a:bodyPr rtlCol="0" anchor="ctr"/>
+              <a:lstStyle/>
+              <a:p>
+                <a:pPr algn="ctr"/>
+                <a:endParaRPr lang="nb-NO"/>
+              </a:p>
+            </p:txBody>
+          </p:sp>
+          <p:sp>
+            <p:nvSpPr>
+              <p:cNvPr id="18" name="Ellipse 17"/>
+              <p:cNvSpPr>
+                <a:spLocks/>
+              </p:cNvSpPr>
+              <p:nvPr/>
+            </p:nvSpPr>
+            <p:spPr>
+              <a:xfrm>
+                <a:off x="2155787" y="1179097"/>
+                <a:ext cx="265565" cy="217122"/>
+              </a:xfrm>
+              <a:prstGeom prst="ellipse">
+                <a:avLst/>
+              </a:prstGeom>
+              <a:solidFill>
+                <a:srgbClr val="DE2212"/>
+              </a:solidFill>
+              <a:ln>
+                <a:noFill/>
+              </a:ln>
+            </p:spPr>
+            <p:style>
+              <a:lnRef idx="2">
+                <a:schemeClr val="accent1">
+                  <a:shade val="50000"/>
+                </a:schemeClr>
+              </a:lnRef>
+              <a:fillRef idx="1">
+                <a:schemeClr val="accent1"/>
+              </a:fillRef>
+              <a:effectRef idx="0">
+                <a:schemeClr val="accent1"/>
+              </a:effectRef>
+              <a:fontRef idx="minor">
+                <a:schemeClr val="lt1"/>
+              </a:fontRef>
+            </p:style>
+            <p:txBody>
+              <a:bodyPr rtlCol="0" anchor="ctr"/>
+              <a:lstStyle/>
+              <a:p>
+                <a:pPr algn="ctr"/>
+                <a:endParaRPr lang="nb-NO"/>
+              </a:p>
+            </p:txBody>
+          </p:sp>
+        </p:grpSp>
+        <p:pic>
+          <p:nvPicPr>
+            <p:cNvPr id="67" name="Bilde 66"/>
+            <p:cNvPicPr>
+              <a:picLocks noChangeAspect="1"/>
+            </p:cNvPicPr>
+            <p:nvPr/>
+          </p:nvPicPr>
+          <p:blipFill>
+            <a:blip r:embed="rId2">
+              <a:extLst>
+                <a:ext uri="{28A0092B-C50C-407E-A947-70E740481C1C}">
+                  <a14:useLocalDpi xmlns:a14="http://schemas.microsoft.com/office/drawing/2010/main" val="0"/>
+                </a:ext>
+              </a:extLst>
+            </a:blip>
+            <a:stretch>
+              <a:fillRect/>
+            </a:stretch>
+          </p:blipFill>
+          <p:spPr>
+            <a:xfrm>
+              <a:off x="6380878" y="3411846"/>
+              <a:ext cx="298730" cy="307265"/>
+            </a:xfrm>
+            <a:prstGeom prst="rect">
+              <a:avLst/>
+            </a:prstGeom>
+          </p:spPr>
+        </p:pic>
+        <p:pic>
+          <p:nvPicPr>
+            <p:cNvPr id="102" name="Bilde 101"/>
+            <p:cNvPicPr>
+              <a:picLocks noChangeAspect="1"/>
+            </p:cNvPicPr>
+            <p:nvPr/>
+          </p:nvPicPr>
+          <p:blipFill>
+            <a:blip r:embed="rId3" cstate="print">
+              <a:extLst>
+                <a:ext uri="{28A0092B-C50C-407E-A947-70E740481C1C}">
+                  <a14:useLocalDpi xmlns:a14="http://schemas.microsoft.com/office/drawing/2010/main" val="0"/>
+                </a:ext>
+              </a:extLst>
+            </a:blip>
+            <a:stretch>
+              <a:fillRect/>
+            </a:stretch>
+          </p:blipFill>
+          <p:spPr>
+            <a:xfrm rot="-3180000">
+              <a:off x="6155977" y="3552863"/>
+              <a:ext cx="179238" cy="267028"/>
+            </a:xfrm>
+            <a:prstGeom prst="rect">
+              <a:avLst/>
+            </a:prstGeom>
+          </p:spPr>
+        </p:pic>
       </p:grpSp>
-      <p:sp>
-        <p:nvSpPr>
-          <p:cNvPr id="11" name="Sekskant 10"/>
-          <p:cNvSpPr/>
-          <p:nvPr/>
-        </p:nvSpPr>
-        <p:spPr>
-          <a:xfrm>
-            <a:off x="8920112" y="1389121"/>
-            <a:ext cx="228600" cy="197069"/>
-          </a:xfrm>
-          <a:prstGeom prst="hexagon">
-            <a:avLst/>
-          </a:prstGeom>
-          <a:solidFill>
-            <a:srgbClr val="00A14A"/>
-          </a:solidFill>
-          <a:ln>
-            <a:noFill/>
-          </a:ln>
-        </p:spPr>
-        <p:style>
-          <a:lnRef idx="2">
-            <a:schemeClr val="accent1">
-              <a:shade val="50000"/>
-            </a:schemeClr>
-          </a:lnRef>
-          <a:fillRef idx="1">
-            <a:schemeClr val="accent1"/>
-          </a:fillRef>
-          <a:effectRef idx="0">
-            <a:schemeClr val="accent1"/>
-          </a:effectRef>
-          <a:fontRef idx="minor">
-            <a:schemeClr val="lt1"/>
-          </a:fontRef>
-        </p:style>
-        <p:txBody>
-          <a:bodyPr rtlCol="0" anchor="ctr"/>
-          <a:lstStyle/>
-          <a:p>
-            <a:pPr algn="ctr"/>
-            <a:endParaRPr lang="nb-NO"/>
-          </a:p>
-        </p:txBody>
-      </p:sp>
-      <p:sp>
-        <p:nvSpPr>
-          <p:cNvPr id="12" name="Ellipse 11"/>
-          <p:cNvSpPr/>
-          <p:nvPr/>
-        </p:nvSpPr>
-        <p:spPr>
-          <a:xfrm>
-            <a:off x="8891337" y="1342471"/>
-            <a:ext cx="286953" cy="294014"/>
-          </a:xfrm>
-          <a:prstGeom prst="ellipse">
-            <a:avLst/>
-          </a:prstGeom>
-          <a:noFill/>
-          <a:ln>
-            <a:solidFill>
-              <a:srgbClr val="00A14A"/>
-            </a:solidFill>
-          </a:ln>
-        </p:spPr>
-        <p:style>
-          <a:lnRef idx="2">
-            <a:schemeClr val="accent1">
-              <a:shade val="50000"/>
-            </a:schemeClr>
-          </a:lnRef>
-          <a:fillRef idx="1">
-            <a:schemeClr val="accent1"/>
-          </a:fillRef>
-          <a:effectRef idx="0">
-            <a:schemeClr val="accent1"/>
-          </a:effectRef>
-          <a:fontRef idx="minor">
-            <a:schemeClr val="lt1"/>
-          </a:fontRef>
-        </p:style>
-        <p:txBody>
-          <a:bodyPr rtlCol="0" anchor="ctr"/>
-          <a:lstStyle/>
-          <a:p>
-            <a:pPr algn="ctr"/>
-            <a:endParaRPr lang="nb-NO"/>
-          </a:p>
-        </p:txBody>
-      </p:sp>
-      <p:cxnSp>
-        <p:nvCxnSpPr>
-          <p:cNvPr id="25" name="Rett linje 24"/>
-          <p:cNvCxnSpPr/>
-          <p:nvPr/>
-        </p:nvCxnSpPr>
-        <p:spPr>
-          <a:xfrm>
-            <a:off x="9034412" y="1636485"/>
-            <a:ext cx="0" cy="44108"/>
-          </a:xfrm>
-          <a:prstGeom prst="line">
-            <a:avLst/>
-          </a:prstGeom>
-          <a:ln w="12700">
-            <a:solidFill>
-              <a:srgbClr val="00A14A"/>
-            </a:solidFill>
-          </a:ln>
-        </p:spPr>
-        <p:style>
-          <a:lnRef idx="1">
-            <a:schemeClr val="accent1"/>
-          </a:lnRef>
-          <a:fillRef idx="0">
-            <a:schemeClr val="accent1"/>
-          </a:fillRef>
-          <a:effectRef idx="0">
-            <a:schemeClr val="accent1"/>
-          </a:effectRef>
-          <a:fontRef idx="minor">
-            <a:schemeClr val="tx1"/>
-          </a:fontRef>
-        </p:style>
-      </p:cxnSp>
-      <p:cxnSp>
-        <p:nvCxnSpPr>
-          <p:cNvPr id="24" name="Rett linje 23"/>
-          <p:cNvCxnSpPr/>
-          <p:nvPr/>
-        </p:nvCxnSpPr>
-        <p:spPr>
-          <a:xfrm rot="5400000">
-            <a:off x="8869283" y="1465601"/>
-            <a:ext cx="0" cy="44108"/>
-          </a:xfrm>
-          <a:prstGeom prst="line">
-            <a:avLst/>
-          </a:prstGeom>
-          <a:ln w="12700">
-            <a:solidFill>
-              <a:srgbClr val="00A14A"/>
-            </a:solidFill>
-          </a:ln>
-        </p:spPr>
-        <p:style>
-          <a:lnRef idx="1">
-            <a:schemeClr val="accent1"/>
-          </a:lnRef>
-          <a:fillRef idx="0">
-            <a:schemeClr val="accent1"/>
-          </a:fillRef>
-          <a:effectRef idx="0">
-            <a:schemeClr val="accent1"/>
-          </a:effectRef>
-          <a:fontRef idx="minor">
-            <a:schemeClr val="tx1"/>
-          </a:fontRef>
-        </p:style>
-      </p:cxnSp>
-      <p:cxnSp>
-        <p:nvCxnSpPr>
-          <p:cNvPr id="26" name="Rett linje 25"/>
-          <p:cNvCxnSpPr/>
-          <p:nvPr/>
-        </p:nvCxnSpPr>
-        <p:spPr>
-          <a:xfrm>
-            <a:off x="9034413" y="1294081"/>
-            <a:ext cx="0" cy="44108"/>
-          </a:xfrm>
-          <a:prstGeom prst="line">
-            <a:avLst/>
-          </a:prstGeom>
-          <a:ln w="12700">
-            <a:solidFill>
-              <a:srgbClr val="00A14A"/>
-            </a:solidFill>
-          </a:ln>
-        </p:spPr>
-        <p:style>
-          <a:lnRef idx="1">
-            <a:schemeClr val="accent1"/>
-          </a:lnRef>
-          <a:fillRef idx="0">
-            <a:schemeClr val="accent1"/>
-          </a:fillRef>
-          <a:effectRef idx="0">
-            <a:schemeClr val="accent1"/>
-          </a:effectRef>
-          <a:fontRef idx="minor">
-            <a:schemeClr val="tx1"/>
-          </a:fontRef>
-        </p:style>
-      </p:cxnSp>
-      <p:cxnSp>
-        <p:nvCxnSpPr>
-          <p:cNvPr id="27" name="Rett linje 26"/>
-          <p:cNvCxnSpPr/>
-          <p:nvPr/>
-        </p:nvCxnSpPr>
-        <p:spPr>
-          <a:xfrm rot="18900000" flipV="1">
-            <a:off x="8915497" y="1349333"/>
-            <a:ext cx="0" cy="44108"/>
-          </a:xfrm>
-          <a:prstGeom prst="line">
-            <a:avLst/>
-          </a:prstGeom>
-          <a:ln w="12700">
-            <a:solidFill>
-              <a:srgbClr val="00A14A"/>
-            </a:solidFill>
-          </a:ln>
-        </p:spPr>
-        <p:style>
-          <a:lnRef idx="1">
-            <a:schemeClr val="accent1"/>
-          </a:lnRef>
-          <a:fillRef idx="0">
-            <a:schemeClr val="accent1"/>
-          </a:fillRef>
-          <a:effectRef idx="0">
-            <a:schemeClr val="accent1"/>
-          </a:effectRef>
-          <a:fontRef idx="minor">
-            <a:schemeClr val="tx1"/>
-          </a:fontRef>
-        </p:style>
-      </p:cxnSp>
-      <p:cxnSp>
-        <p:nvCxnSpPr>
-          <p:cNvPr id="28" name="Rett linje 27"/>
-          <p:cNvCxnSpPr/>
-          <p:nvPr/>
-        </p:nvCxnSpPr>
-        <p:spPr>
-          <a:xfrm rot="5400000">
-            <a:off x="9200344" y="1465601"/>
-            <a:ext cx="0" cy="44108"/>
-          </a:xfrm>
-          <a:prstGeom prst="line">
-            <a:avLst/>
-          </a:prstGeom>
-          <a:ln w="12700">
-            <a:solidFill>
-              <a:srgbClr val="00A14A"/>
-            </a:solidFill>
-          </a:ln>
-        </p:spPr>
-        <p:style>
-          <a:lnRef idx="1">
-            <a:schemeClr val="accent1"/>
-          </a:lnRef>
-          <a:fillRef idx="0">
-            <a:schemeClr val="accent1"/>
-          </a:fillRef>
-          <a:effectRef idx="0">
-            <a:schemeClr val="accent1"/>
-          </a:effectRef>
-          <a:fontRef idx="minor">
-            <a:schemeClr val="tx1"/>
-          </a:fontRef>
-        </p:style>
-      </p:cxnSp>
-      <p:cxnSp>
-        <p:nvCxnSpPr>
-          <p:cNvPr id="29" name="Rett linje 28"/>
-          <p:cNvCxnSpPr/>
-          <p:nvPr/>
-        </p:nvCxnSpPr>
-        <p:spPr>
-          <a:xfrm rot="2700000">
-            <a:off x="8920112" y="1582959"/>
-            <a:ext cx="0" cy="44108"/>
-          </a:xfrm>
-          <a:prstGeom prst="line">
-            <a:avLst/>
-          </a:prstGeom>
-          <a:ln w="12700">
-            <a:solidFill>
-              <a:srgbClr val="00A14A"/>
-            </a:solidFill>
-          </a:ln>
-        </p:spPr>
-        <p:style>
-          <a:lnRef idx="1">
-            <a:schemeClr val="accent1"/>
-          </a:lnRef>
-          <a:fillRef idx="0">
-            <a:schemeClr val="accent1"/>
-          </a:fillRef>
-          <a:effectRef idx="0">
-            <a:schemeClr val="accent1"/>
-          </a:effectRef>
-          <a:fontRef idx="minor">
-            <a:schemeClr val="tx1"/>
-          </a:fontRef>
-        </p:style>
-      </p:cxnSp>
-      <p:cxnSp>
-        <p:nvCxnSpPr>
-          <p:cNvPr id="30" name="Rett linje 29"/>
-          <p:cNvCxnSpPr/>
-          <p:nvPr/>
-        </p:nvCxnSpPr>
-        <p:spPr>
-          <a:xfrm rot="4500000">
-            <a:off x="9198071" y="1419436"/>
-            <a:ext cx="0" cy="44108"/>
-          </a:xfrm>
-          <a:prstGeom prst="line">
-            <a:avLst/>
-          </a:prstGeom>
-          <a:ln w="12700">
-            <a:solidFill>
-              <a:srgbClr val="00A14A"/>
-            </a:solidFill>
-          </a:ln>
-        </p:spPr>
-        <p:style>
-          <a:lnRef idx="1">
-            <a:schemeClr val="accent1"/>
-          </a:lnRef>
-          <a:fillRef idx="0">
-            <a:schemeClr val="accent1"/>
-          </a:fillRef>
-          <a:effectRef idx="0">
-            <a:schemeClr val="accent1"/>
-          </a:effectRef>
-          <a:fontRef idx="minor">
-            <a:schemeClr val="tx1"/>
-          </a:fontRef>
-        </p:style>
-      </p:cxnSp>
-      <p:cxnSp>
-        <p:nvCxnSpPr>
-          <p:cNvPr id="31" name="Rett linje 30"/>
-          <p:cNvCxnSpPr/>
-          <p:nvPr/>
-        </p:nvCxnSpPr>
-        <p:spPr>
-          <a:xfrm rot="18900000" flipV="1">
-            <a:off x="9163667" y="1582769"/>
-            <a:ext cx="0" cy="44108"/>
-          </a:xfrm>
-          <a:prstGeom prst="line">
-            <a:avLst/>
-          </a:prstGeom>
-          <a:ln w="12700">
-            <a:solidFill>
-              <a:srgbClr val="00A14A"/>
-            </a:solidFill>
-          </a:ln>
-        </p:spPr>
-        <p:style>
-          <a:lnRef idx="1">
-            <a:schemeClr val="accent1"/>
-          </a:lnRef>
-          <a:fillRef idx="0">
-            <a:schemeClr val="accent1"/>
-          </a:fillRef>
-          <a:effectRef idx="0">
-            <a:schemeClr val="accent1"/>
-          </a:effectRef>
-          <a:fontRef idx="minor">
-            <a:schemeClr val="tx1"/>
-          </a:fontRef>
-        </p:style>
-      </p:cxnSp>
-      <p:cxnSp>
-        <p:nvCxnSpPr>
-          <p:cNvPr id="32" name="Rett linje 31"/>
-          <p:cNvCxnSpPr/>
-          <p:nvPr/>
-        </p:nvCxnSpPr>
-        <p:spPr>
-          <a:xfrm rot="18000000">
-            <a:off x="9184984" y="1552550"/>
-            <a:ext cx="0" cy="44108"/>
-          </a:xfrm>
-          <a:prstGeom prst="line">
-            <a:avLst/>
-          </a:prstGeom>
-          <a:ln w="12700">
-            <a:solidFill>
-              <a:srgbClr val="00A14A"/>
-            </a:solidFill>
-          </a:ln>
-        </p:spPr>
-        <p:style>
-          <a:lnRef idx="1">
-            <a:schemeClr val="accent1"/>
-          </a:lnRef>
-          <a:fillRef idx="0">
-            <a:schemeClr val="accent1"/>
-          </a:fillRef>
-          <a:effectRef idx="0">
-            <a:schemeClr val="accent1"/>
-          </a:effectRef>
-          <a:fontRef idx="minor">
-            <a:schemeClr val="tx1"/>
-          </a:fontRef>
-        </p:style>
-      </p:cxnSp>
-      <p:cxnSp>
-        <p:nvCxnSpPr>
-          <p:cNvPr id="33" name="Rett linje 32"/>
-          <p:cNvCxnSpPr/>
-          <p:nvPr/>
-        </p:nvCxnSpPr>
-        <p:spPr>
-          <a:xfrm rot="2700000">
-            <a:off x="9162245" y="1352031"/>
-            <a:ext cx="0" cy="44108"/>
-          </a:xfrm>
-          <a:prstGeom prst="line">
-            <a:avLst/>
-          </a:prstGeom>
-          <a:ln w="12700">
-            <a:solidFill>
-              <a:srgbClr val="00A14A"/>
-            </a:solidFill>
-          </a:ln>
-        </p:spPr>
-        <p:style>
-          <a:lnRef idx="1">
-            <a:schemeClr val="accent1"/>
-          </a:lnRef>
-          <a:fillRef idx="0">
-            <a:schemeClr val="accent1"/>
-          </a:fillRef>
-          <a:effectRef idx="0">
-            <a:schemeClr val="accent1"/>
-          </a:effectRef>
-          <a:fontRef idx="minor">
-            <a:schemeClr val="tx1"/>
-          </a:fontRef>
-        </p:style>
-      </p:cxnSp>
-      <p:cxnSp>
-        <p:nvCxnSpPr>
-          <p:cNvPr id="34" name="Rett linje 33"/>
-          <p:cNvCxnSpPr/>
-          <p:nvPr/>
-        </p:nvCxnSpPr>
-        <p:spPr>
-          <a:xfrm rot="1800000">
-            <a:off x="8955182" y="1612551"/>
-            <a:ext cx="0" cy="44108"/>
-          </a:xfrm>
-          <a:prstGeom prst="line">
-            <a:avLst/>
-          </a:prstGeom>
-          <a:ln w="12700">
-            <a:solidFill>
-              <a:srgbClr val="00A14A"/>
-            </a:solidFill>
-          </a:ln>
-        </p:spPr>
-        <p:style>
-          <a:lnRef idx="1">
-            <a:schemeClr val="accent1"/>
-          </a:lnRef>
-          <a:fillRef idx="0">
-            <a:schemeClr val="accent1"/>
-          </a:fillRef>
-          <a:effectRef idx="0">
-            <a:schemeClr val="accent1"/>
-          </a:effectRef>
-          <a:fontRef idx="minor">
-            <a:schemeClr val="tx1"/>
-          </a:fontRef>
-        </p:style>
-      </p:cxnSp>
-      <p:cxnSp>
-        <p:nvCxnSpPr>
-          <p:cNvPr id="35" name="Rett linje 34"/>
-          <p:cNvCxnSpPr/>
-          <p:nvPr/>
-        </p:nvCxnSpPr>
-        <p:spPr>
-          <a:xfrm rot="900000">
-            <a:off x="8993398" y="1630411"/>
-            <a:ext cx="0" cy="44108"/>
-          </a:xfrm>
-          <a:prstGeom prst="line">
-            <a:avLst/>
-          </a:prstGeom>
-          <a:ln w="12700">
-            <a:solidFill>
-              <a:srgbClr val="00A14A"/>
-            </a:solidFill>
-          </a:ln>
-        </p:spPr>
-        <p:style>
-          <a:lnRef idx="1">
-            <a:schemeClr val="accent1"/>
-          </a:lnRef>
-          <a:fillRef idx="0">
-            <a:schemeClr val="accent1"/>
-          </a:fillRef>
-          <a:effectRef idx="0">
-            <a:schemeClr val="accent1"/>
-          </a:effectRef>
-          <a:fontRef idx="minor">
-            <a:schemeClr val="tx1"/>
-          </a:fontRef>
-        </p:style>
-      </p:cxnSp>
-      <p:cxnSp>
-        <p:nvCxnSpPr>
-          <p:cNvPr id="36" name="Rett linje 35"/>
-          <p:cNvCxnSpPr/>
-          <p:nvPr/>
-        </p:nvCxnSpPr>
-        <p:spPr>
-          <a:xfrm rot="17100000">
-            <a:off x="9203082" y="1509948"/>
-            <a:ext cx="0" cy="44108"/>
-          </a:xfrm>
-          <a:prstGeom prst="line">
-            <a:avLst/>
-          </a:prstGeom>
-          <a:ln w="12700">
-            <a:solidFill>
-              <a:srgbClr val="00A14A"/>
-            </a:solidFill>
-          </a:ln>
-        </p:spPr>
-        <p:style>
-          <a:lnRef idx="1">
-            <a:schemeClr val="accent1"/>
-          </a:lnRef>
-          <a:fillRef idx="0">
-            <a:schemeClr val="accent1"/>
-          </a:fillRef>
-          <a:effectRef idx="0">
-            <a:schemeClr val="accent1"/>
-          </a:effectRef>
-          <a:fontRef idx="minor">
-            <a:schemeClr val="tx1"/>
-          </a:fontRef>
-        </p:style>
-      </p:cxnSp>
-      <p:cxnSp>
-        <p:nvCxnSpPr>
-          <p:cNvPr id="37" name="Rett linje 36"/>
-          <p:cNvCxnSpPr/>
-          <p:nvPr/>
-        </p:nvCxnSpPr>
-        <p:spPr>
-          <a:xfrm rot="1800000">
-            <a:off x="9121968" y="1317987"/>
-            <a:ext cx="0" cy="44108"/>
-          </a:xfrm>
-          <a:prstGeom prst="line">
-            <a:avLst/>
-          </a:prstGeom>
-          <a:ln w="12700">
-            <a:solidFill>
-              <a:srgbClr val="00A14A"/>
-            </a:solidFill>
-          </a:ln>
-        </p:spPr>
-        <p:style>
-          <a:lnRef idx="1">
-            <a:schemeClr val="accent1"/>
-          </a:lnRef>
-          <a:fillRef idx="0">
-            <a:schemeClr val="accent1"/>
-          </a:fillRef>
-          <a:effectRef idx="0">
-            <a:schemeClr val="accent1"/>
-          </a:effectRef>
-          <a:fontRef idx="minor">
-            <a:schemeClr val="tx1"/>
-          </a:fontRef>
-        </p:style>
-      </p:cxnSp>
-      <p:cxnSp>
-        <p:nvCxnSpPr>
-          <p:cNvPr id="38" name="Rett linje 37"/>
-          <p:cNvCxnSpPr/>
-          <p:nvPr/>
-        </p:nvCxnSpPr>
-        <p:spPr>
-          <a:xfrm rot="18000000">
-            <a:off x="8888383" y="1384956"/>
-            <a:ext cx="0" cy="44108"/>
-          </a:xfrm>
-          <a:prstGeom prst="line">
-            <a:avLst/>
-          </a:prstGeom>
-          <a:ln w="12700">
-            <a:solidFill>
-              <a:srgbClr val="00A14A"/>
-            </a:solidFill>
-          </a:ln>
-        </p:spPr>
-        <p:style>
-          <a:lnRef idx="1">
-            <a:schemeClr val="accent1"/>
-          </a:lnRef>
-          <a:fillRef idx="0">
-            <a:schemeClr val="accent1"/>
-          </a:fillRef>
-          <a:effectRef idx="0">
-            <a:schemeClr val="accent1"/>
-          </a:effectRef>
-          <a:fontRef idx="minor">
-            <a:schemeClr val="tx1"/>
-          </a:fontRef>
-        </p:style>
-      </p:cxnSp>
-      <p:cxnSp>
-        <p:nvCxnSpPr>
-          <p:cNvPr id="39" name="Rett linje 38"/>
-          <p:cNvCxnSpPr/>
-          <p:nvPr/>
-        </p:nvCxnSpPr>
-        <p:spPr>
-          <a:xfrm rot="17100000">
-            <a:off x="8876003" y="1426077"/>
-            <a:ext cx="0" cy="44108"/>
-          </a:xfrm>
-          <a:prstGeom prst="line">
-            <a:avLst/>
-          </a:prstGeom>
-          <a:ln w="12700">
-            <a:solidFill>
-              <a:srgbClr val="00A14A"/>
-            </a:solidFill>
-          </a:ln>
-        </p:spPr>
-        <p:style>
-          <a:lnRef idx="1">
-            <a:schemeClr val="accent1"/>
-          </a:lnRef>
-          <a:fillRef idx="0">
-            <a:schemeClr val="accent1"/>
-          </a:fillRef>
-          <a:effectRef idx="0">
-            <a:schemeClr val="accent1"/>
-          </a:effectRef>
-          <a:fontRef idx="minor">
-            <a:schemeClr val="tx1"/>
-          </a:fontRef>
-        </p:style>
-      </p:cxnSp>
-      <p:cxnSp>
-        <p:nvCxnSpPr>
-          <p:cNvPr id="40" name="Rett linje 39"/>
-          <p:cNvCxnSpPr/>
-          <p:nvPr/>
-        </p:nvCxnSpPr>
-        <p:spPr>
-          <a:xfrm rot="3600000">
-            <a:off x="9182496" y="1384957"/>
-            <a:ext cx="0" cy="44108"/>
-          </a:xfrm>
-          <a:prstGeom prst="line">
-            <a:avLst/>
-          </a:prstGeom>
-          <a:ln w="12700">
-            <a:solidFill>
-              <a:srgbClr val="00A14A"/>
-            </a:solidFill>
-          </a:ln>
-        </p:spPr>
-        <p:style>
-          <a:lnRef idx="1">
-            <a:schemeClr val="accent1"/>
-          </a:lnRef>
-          <a:fillRef idx="0">
-            <a:schemeClr val="accent1"/>
-          </a:fillRef>
-          <a:effectRef idx="0">
-            <a:schemeClr val="accent1"/>
-          </a:effectRef>
-          <a:fontRef idx="minor">
-            <a:schemeClr val="tx1"/>
-          </a:fontRef>
-        </p:style>
-      </p:cxnSp>
-      <p:cxnSp>
-        <p:nvCxnSpPr>
-          <p:cNvPr id="42" name="Rett linje 41"/>
-          <p:cNvCxnSpPr/>
-          <p:nvPr/>
-        </p:nvCxnSpPr>
-        <p:spPr>
-          <a:xfrm rot="3600000">
-            <a:off x="8896398" y="1559965"/>
-            <a:ext cx="0" cy="44108"/>
-          </a:xfrm>
-          <a:prstGeom prst="line">
-            <a:avLst/>
-          </a:prstGeom>
-          <a:ln w="12700">
-            <a:solidFill>
-              <a:srgbClr val="00A14A"/>
-            </a:solidFill>
-          </a:ln>
-        </p:spPr>
-        <p:style>
-          <a:lnRef idx="1">
-            <a:schemeClr val="accent1"/>
-          </a:lnRef>
-          <a:fillRef idx="0">
-            <a:schemeClr val="accent1"/>
-          </a:fillRef>
-          <a:effectRef idx="0">
-            <a:schemeClr val="accent1"/>
-          </a:effectRef>
-          <a:fontRef idx="minor">
-            <a:schemeClr val="tx1"/>
-          </a:fontRef>
-        </p:style>
-      </p:cxnSp>
-      <p:cxnSp>
-        <p:nvCxnSpPr>
-          <p:cNvPr id="44" name="Rett linje 43"/>
-          <p:cNvCxnSpPr/>
-          <p:nvPr/>
-        </p:nvCxnSpPr>
-        <p:spPr>
-          <a:xfrm rot="4500000">
-            <a:off x="8876002" y="1515656"/>
-            <a:ext cx="0" cy="44108"/>
-          </a:xfrm>
-          <a:prstGeom prst="line">
-            <a:avLst/>
-          </a:prstGeom>
-          <a:ln w="12700">
-            <a:solidFill>
-              <a:srgbClr val="00A14A"/>
-            </a:solidFill>
-          </a:ln>
-        </p:spPr>
-        <p:style>
-          <a:lnRef idx="1">
-            <a:schemeClr val="accent1"/>
-          </a:lnRef>
-          <a:fillRef idx="0">
-            <a:schemeClr val="accent1"/>
-          </a:fillRef>
-          <a:effectRef idx="0">
-            <a:schemeClr val="accent1"/>
-          </a:effectRef>
-          <a:fontRef idx="minor">
-            <a:schemeClr val="tx1"/>
-          </a:fontRef>
-        </p:style>
-      </p:cxnSp>
     </p:spTree>
     <p:extLst>
       <p:ext uri="{BB962C8B-B14F-4D97-AF65-F5344CB8AC3E}">
@@ -8072,8 +9039,8 @@
         </p:blipFill>
         <p:spPr>
           <a:xfrm>
-            <a:off x="6851298" y="324821"/>
-            <a:ext cx="892648" cy="1003146"/>
+            <a:off x="6835311" y="489502"/>
+            <a:ext cx="869265" cy="976868"/>
           </a:xfrm>
           <a:prstGeom prst="rect">
             <a:avLst/>
@@ -8202,7 +9169,7 @@
       </p:pic>
       <p:pic>
         <p:nvPicPr>
-          <p:cNvPr id="19" name="Bilde 18"/>
+          <p:cNvPr id="20" name="Bilde 19"/>
           <p:cNvPicPr>
             <a:picLocks noChangeAspect="1"/>
           </p:cNvPicPr>
@@ -8210,36 +9177,6 @@
         </p:nvPicPr>
         <p:blipFill>
           <a:blip r:embed="rId8" cstate="print">
-            <a:extLst>
-              <a:ext uri="{28A0092B-C50C-407E-A947-70E740481C1C}">
-                <a14:useLocalDpi xmlns:a14="http://schemas.microsoft.com/office/drawing/2010/main" val="0"/>
-              </a:ext>
-            </a:extLst>
-          </a:blip>
-          <a:stretch>
-            <a:fillRect/>
-          </a:stretch>
-        </p:blipFill>
-        <p:spPr>
-          <a:xfrm>
-            <a:off x="5196122" y="324821"/>
-            <a:ext cx="863366" cy="996523"/>
-          </a:xfrm>
-          <a:prstGeom prst="rect">
-            <a:avLst/>
-          </a:prstGeom>
-        </p:spPr>
-      </p:pic>
-      <p:pic>
-        <p:nvPicPr>
-          <p:cNvPr id="20" name="Bilde 19"/>
-          <p:cNvPicPr>
-            <a:picLocks noChangeAspect="1"/>
-          </p:cNvPicPr>
-          <p:nvPr/>
-        </p:nvPicPr>
-        <p:blipFill>
-          <a:blip r:embed="rId9" cstate="print">
             <a:extLst>
               <a:ext uri="{28A0092B-C50C-407E-A947-70E740481C1C}">
                 <a14:useLocalDpi xmlns:a14="http://schemas.microsoft.com/office/drawing/2010/main" val="0"/>
@@ -8262,7 +9199,37 @@
       </p:pic>
       <p:pic>
         <p:nvPicPr>
-          <p:cNvPr id="21" name="Bilde 20"/>
+          <p:cNvPr id="5" name="Bilde 4"/>
+          <p:cNvPicPr>
+            <a:picLocks noChangeAspect="1"/>
+          </p:cNvPicPr>
+          <p:nvPr/>
+        </p:nvPicPr>
+        <p:blipFill>
+          <a:blip r:embed="rId9" cstate="print">
+            <a:extLst>
+              <a:ext uri="{28A0092B-C50C-407E-A947-70E740481C1C}">
+                <a14:useLocalDpi xmlns:a14="http://schemas.microsoft.com/office/drawing/2010/main" val="0"/>
+              </a:ext>
+            </a:extLst>
+          </a:blip>
+          <a:stretch>
+            <a:fillRect/>
+          </a:stretch>
+        </p:blipFill>
+        <p:spPr>
+          <a:xfrm>
+            <a:off x="8648717" y="461058"/>
+            <a:ext cx="870981" cy="1005312"/>
+          </a:xfrm>
+          <a:prstGeom prst="rect">
+            <a:avLst/>
+          </a:prstGeom>
+        </p:spPr>
+      </p:pic>
+      <p:pic>
+        <p:nvPicPr>
+          <p:cNvPr id="7" name="Bilde 6"/>
           <p:cNvPicPr>
             <a:picLocks noChangeAspect="1"/>
           </p:cNvPicPr>
@@ -8282,8 +9249,8 @@
         </p:blipFill>
         <p:spPr>
           <a:xfrm>
-            <a:off x="1578577" y="4904813"/>
-            <a:ext cx="863366" cy="997073"/>
+            <a:off x="5109013" y="489502"/>
+            <a:ext cx="863366" cy="994049"/>
           </a:xfrm>
           <a:prstGeom prst="rect">
             <a:avLst/>
@@ -8292,7 +9259,7 @@
       </p:pic>
       <p:pic>
         <p:nvPicPr>
-          <p:cNvPr id="5" name="Bilde 4"/>
+          <p:cNvPr id="9" name="Bilde 8"/>
           <p:cNvPicPr>
             <a:picLocks noChangeAspect="1"/>
           </p:cNvPicPr>
@@ -8312,8 +9279,8 @@
         </p:blipFill>
         <p:spPr>
           <a:xfrm>
-            <a:off x="8648717" y="461058"/>
-            <a:ext cx="870981" cy="1005312"/>
+            <a:off x="1421574" y="4884493"/>
+            <a:ext cx="863366" cy="994375"/>
           </a:xfrm>
           <a:prstGeom prst="rect">
             <a:avLst/>
@@ -24891,18 +25858,18 @@
 </file>
 
 <file path=customXml/item2.xml><?xml version="1.0" encoding="utf-8"?>
+<p:properties xmlns:p="http://schemas.microsoft.com/office/2006/metadata/properties" xmlns:xsi="http://www.w3.org/2001/XMLSchema-instance" xmlns:pc="http://schemas.microsoft.com/office/infopath/2007/PartnerControls">
+  <documentManagement/>
+</p:properties>
+</file>
+
+<file path=customXml/item3.xml><?xml version="1.0" encoding="utf-8"?>
 <?mso-contentType ?>
 <FormTemplates xmlns="http://schemas.microsoft.com/sharepoint/v3/contenttype/forms">
   <Display>DocumentLibraryForm</Display>
   <Edit>DocumentLibraryForm</Edit>
   <New>DocumentLibraryForm</New>
 </FormTemplates>
-</file>
-
-<file path=customXml/item3.xml><?xml version="1.0" encoding="utf-8"?>
-<p:properties xmlns:p="http://schemas.microsoft.com/office/2006/metadata/properties" xmlns:xsi="http://www.w3.org/2001/XMLSchema-instance" xmlns:pc="http://schemas.microsoft.com/office/infopath/2007/PartnerControls">
-  <documentManagement/>
-</p:properties>
 </file>
 
 <file path=customXml/itemProps1.xml><?xml version="1.0" encoding="utf-8"?>
@@ -24924,14 +25891,6 @@
 </file>
 
 <file path=customXml/itemProps2.xml><?xml version="1.0" encoding="utf-8"?>
-<ds:datastoreItem xmlns:ds="http://schemas.openxmlformats.org/officeDocument/2006/customXml" ds:itemID="{4BE7E9B0-0351-4956-BF80-844462B099ED}">
-  <ds:schemaRefs>
-    <ds:schemaRef ds:uri="http://schemas.microsoft.com/sharepoint/v3/contenttype/forms"/>
-  </ds:schemaRefs>
-</ds:datastoreItem>
-</file>
-
-<file path=customXml/itemProps3.xml><?xml version="1.0" encoding="utf-8"?>
 <ds:datastoreItem xmlns:ds="http://schemas.openxmlformats.org/officeDocument/2006/customXml" ds:itemID="{7DEC415D-4AD5-4872-9DD1-7B94914CAE4D}">
   <ds:schemaRefs>
     <ds:schemaRef ds:uri="http://purl.org/dc/elements/1.1/"/>
@@ -24945,4 +25904,12 @@
     <ds:schemaRef ds:uri="http://purl.org/dc/terms/"/>
   </ds:schemaRefs>
 </ds:datastoreItem>
+</file>
+
+<file path=customXml/itemProps3.xml><?xml version="1.0" encoding="utf-8"?>
+<ds:datastoreItem xmlns:ds="http://schemas.openxmlformats.org/officeDocument/2006/customXml" ds:itemID="{4BE7E9B0-0351-4956-BF80-844462B099ED}">
+  <ds:schemaRefs>
+    <ds:schemaRef ds:uri="http://schemas.microsoft.com/sharepoint/v3/contenttype/forms"/>
+  </ds:schemaRefs>
+</ds:datastoreItem>
 </file>
</xml_diff>

<commit_message>
feat: created hexlogo for NVIpjsr
</commit_message>
<xml_diff>
--- a/data-raw/logos.pptx
+++ b/data-raw/logos.pptx
@@ -11,16 +11,17 @@
     <p:sldId id="259" r:id="rId8"/>
     <p:sldId id="272" r:id="rId9"/>
     <p:sldId id="268" r:id="rId10"/>
-    <p:sldId id="274" r:id="rId11"/>
-    <p:sldId id="271" r:id="rId12"/>
-    <p:sldId id="266" r:id="rId13"/>
-    <p:sldId id="269" r:id="rId14"/>
-    <p:sldId id="265" r:id="rId15"/>
-    <p:sldId id="256" r:id="rId16"/>
-    <p:sldId id="257" r:id="rId17"/>
-    <p:sldId id="270" r:id="rId18"/>
-    <p:sldId id="273" r:id="rId19"/>
-    <p:sldId id="258" r:id="rId20"/>
+    <p:sldId id="275" r:id="rId11"/>
+    <p:sldId id="274" r:id="rId12"/>
+    <p:sldId id="271" r:id="rId13"/>
+    <p:sldId id="266" r:id="rId14"/>
+    <p:sldId id="269" r:id="rId15"/>
+    <p:sldId id="265" r:id="rId16"/>
+    <p:sldId id="256" r:id="rId17"/>
+    <p:sldId id="257" r:id="rId18"/>
+    <p:sldId id="270" r:id="rId19"/>
+    <p:sldId id="273" r:id="rId20"/>
+    <p:sldId id="258" r:id="rId21"/>
   </p:sldIdLst>
   <p:sldSz cx="12192000" cy="6858000"/>
   <p:notesSz cx="6858000" cy="9144000"/>
@@ -269,7 +270,7 @@
           <a:p>
             <a:fld id="{09605B3F-6133-425E-A10B-41F9F06FCAC6}" type="datetimeFigureOut">
               <a:rPr lang="nb-NO" smtClean="0"/>
-              <a:t>22.02.2024</a:t>
+              <a:t>13.03.2024</a:t>
             </a:fld>
             <a:endParaRPr lang="nb-NO"/>
           </a:p>
@@ -439,7 +440,7 @@
           <a:p>
             <a:fld id="{09605B3F-6133-425E-A10B-41F9F06FCAC6}" type="datetimeFigureOut">
               <a:rPr lang="nb-NO" smtClean="0"/>
-              <a:t>22.02.2024</a:t>
+              <a:t>13.03.2024</a:t>
             </a:fld>
             <a:endParaRPr lang="nb-NO"/>
           </a:p>
@@ -619,7 +620,7 @@
           <a:p>
             <a:fld id="{09605B3F-6133-425E-A10B-41F9F06FCAC6}" type="datetimeFigureOut">
               <a:rPr lang="nb-NO" smtClean="0"/>
-              <a:t>22.02.2024</a:t>
+              <a:t>13.03.2024</a:t>
             </a:fld>
             <a:endParaRPr lang="nb-NO"/>
           </a:p>
@@ -789,7 +790,7 @@
           <a:p>
             <a:fld id="{09605B3F-6133-425E-A10B-41F9F06FCAC6}" type="datetimeFigureOut">
               <a:rPr lang="nb-NO" smtClean="0"/>
-              <a:t>22.02.2024</a:t>
+              <a:t>13.03.2024</a:t>
             </a:fld>
             <a:endParaRPr lang="nb-NO"/>
           </a:p>
@@ -1035,7 +1036,7 @@
           <a:p>
             <a:fld id="{09605B3F-6133-425E-A10B-41F9F06FCAC6}" type="datetimeFigureOut">
               <a:rPr lang="nb-NO" smtClean="0"/>
-              <a:t>22.02.2024</a:t>
+              <a:t>13.03.2024</a:t>
             </a:fld>
             <a:endParaRPr lang="nb-NO"/>
           </a:p>
@@ -1267,7 +1268,7 @@
           <a:p>
             <a:fld id="{09605B3F-6133-425E-A10B-41F9F06FCAC6}" type="datetimeFigureOut">
               <a:rPr lang="nb-NO" smtClean="0"/>
-              <a:t>22.02.2024</a:t>
+              <a:t>13.03.2024</a:t>
             </a:fld>
             <a:endParaRPr lang="nb-NO"/>
           </a:p>
@@ -1634,7 +1635,7 @@
           <a:p>
             <a:fld id="{09605B3F-6133-425E-A10B-41F9F06FCAC6}" type="datetimeFigureOut">
               <a:rPr lang="nb-NO" smtClean="0"/>
-              <a:t>22.02.2024</a:t>
+              <a:t>13.03.2024</a:t>
             </a:fld>
             <a:endParaRPr lang="nb-NO"/>
           </a:p>
@@ -1752,7 +1753,7 @@
           <a:p>
             <a:fld id="{09605B3F-6133-425E-A10B-41F9F06FCAC6}" type="datetimeFigureOut">
               <a:rPr lang="nb-NO" smtClean="0"/>
-              <a:t>22.02.2024</a:t>
+              <a:t>13.03.2024</a:t>
             </a:fld>
             <a:endParaRPr lang="nb-NO"/>
           </a:p>
@@ -1847,7 +1848,7 @@
           <a:p>
             <a:fld id="{09605B3F-6133-425E-A10B-41F9F06FCAC6}" type="datetimeFigureOut">
               <a:rPr lang="nb-NO" smtClean="0"/>
-              <a:t>22.02.2024</a:t>
+              <a:t>13.03.2024</a:t>
             </a:fld>
             <a:endParaRPr lang="nb-NO"/>
           </a:p>
@@ -2124,7 +2125,7 @@
           <a:p>
             <a:fld id="{09605B3F-6133-425E-A10B-41F9F06FCAC6}" type="datetimeFigureOut">
               <a:rPr lang="nb-NO" smtClean="0"/>
-              <a:t>22.02.2024</a:t>
+              <a:t>13.03.2024</a:t>
             </a:fld>
             <a:endParaRPr lang="nb-NO"/>
           </a:p>
@@ -2377,7 +2378,7 @@
           <a:p>
             <a:fld id="{09605B3F-6133-425E-A10B-41F9F06FCAC6}" type="datetimeFigureOut">
               <a:rPr lang="nb-NO" smtClean="0"/>
-              <a:t>22.02.2024</a:t>
+              <a:t>13.03.2024</a:t>
             </a:fld>
             <a:endParaRPr lang="nb-NO"/>
           </a:p>
@@ -2590,7 +2591,7 @@
           <a:p>
             <a:fld id="{09605B3F-6133-425E-A10B-41F9F06FCAC6}" type="datetimeFigureOut">
               <a:rPr lang="nb-NO" smtClean="0"/>
-              <a:t>22.02.2024</a:t>
+              <a:t>13.03.2024</a:t>
             </a:fld>
             <a:endParaRPr lang="nb-NO"/>
           </a:p>
@@ -6707,6 +6708,427 @@
       </p:grpSpPr>
       <p:grpSp>
         <p:nvGrpSpPr>
+          <p:cNvPr id="22" name="Gruppe 21"/>
+          <p:cNvGrpSpPr/>
+          <p:nvPr/>
+        </p:nvGrpSpPr>
+        <p:grpSpPr>
+          <a:xfrm>
+            <a:off x="4735200" y="2244483"/>
+            <a:ext cx="2721600" cy="2369033"/>
+            <a:chOff x="4735200" y="2244483"/>
+            <a:chExt cx="2721600" cy="2369033"/>
+          </a:xfrm>
+        </p:grpSpPr>
+        <p:sp>
+          <p:nvSpPr>
+            <p:cNvPr id="2" name="Hexagon 35">
+              <a:extLst>
+                <a:ext uri="{FF2B5EF4-FFF2-40B4-BE49-F238E27FC236}">
+                  <a16:creationId xmlns:a16="http://schemas.microsoft.com/office/drawing/2014/main" id="{90E46B38-1301-774F-8904-FFF8966BD8C2}"/>
+                </a:ext>
+              </a:extLst>
+            </p:cNvPr>
+            <p:cNvSpPr>
+              <a:spLocks noChangeAspect="1"/>
+            </p:cNvSpPr>
+            <p:nvPr/>
+          </p:nvSpPr>
+          <p:spPr>
+            <a:xfrm rot="1800000">
+              <a:off x="4735200" y="2244483"/>
+              <a:ext cx="2721600" cy="2369033"/>
+            </a:xfrm>
+            <a:prstGeom prst="hexagon">
+              <a:avLst>
+                <a:gd name="adj" fmla="val 28372"/>
+                <a:gd name="vf" fmla="val 115470"/>
+              </a:avLst>
+            </a:prstGeom>
+            <a:solidFill>
+              <a:srgbClr val="133E4D"/>
+            </a:solidFill>
+            <a:ln w="69850">
+              <a:solidFill>
+                <a:schemeClr val="tx1">
+                  <a:lumMod val="85000"/>
+                  <a:lumOff val="15000"/>
+                </a:schemeClr>
+              </a:solidFill>
+            </a:ln>
+          </p:spPr>
+          <p:style>
+            <a:lnRef idx="2">
+              <a:schemeClr val="accent1">
+                <a:shade val="50000"/>
+              </a:schemeClr>
+            </a:lnRef>
+            <a:fillRef idx="1">
+              <a:schemeClr val="accent1"/>
+            </a:fillRef>
+            <a:effectRef idx="0">
+              <a:schemeClr val="accent1"/>
+            </a:effectRef>
+            <a:fontRef idx="minor">
+              <a:schemeClr val="lt1"/>
+            </a:fontRef>
+          </p:style>
+          <p:txBody>
+            <a:bodyPr rtlCol="0" anchor="ctr"/>
+            <a:lstStyle/>
+            <a:p>
+              <a:pPr algn="ctr"/>
+              <a:endParaRPr lang="en-US" dirty="0"/>
+            </a:p>
+          </p:txBody>
+        </p:sp>
+        <p:sp>
+          <p:nvSpPr>
+            <p:cNvPr id="45" name="TekstSylinder 44"/>
+            <p:cNvSpPr txBox="1"/>
+            <p:nvPr/>
+          </p:nvSpPr>
+          <p:spPr>
+            <a:xfrm>
+              <a:off x="4951956" y="2496396"/>
+              <a:ext cx="2292096" cy="461665"/>
+            </a:xfrm>
+            <a:prstGeom prst="rect">
+              <a:avLst/>
+            </a:prstGeom>
+            <a:noFill/>
+          </p:spPr>
+          <p:txBody>
+            <a:bodyPr wrap="square" rtlCol="0">
+              <a:spAutoFit/>
+            </a:bodyPr>
+            <a:lstStyle/>
+            <a:p>
+              <a:pPr algn="ctr"/>
+              <a:r>
+                <a:rPr lang="nb-NO" sz="2400" dirty="0" err="1" smtClean="0">
+                  <a:solidFill>
+                    <a:schemeClr val="bg2">
+                      <a:lumMod val="90000"/>
+                    </a:schemeClr>
+                  </a:solidFill>
+                  <a:latin typeface="Trebuchet MS" panose="020B0603020202020204" pitchFamily="34" charset="0"/>
+                </a:rPr>
+                <a:t>OKcheck</a:t>
+              </a:r>
+              <a:endParaRPr lang="nb-NO" sz="2400" dirty="0">
+                <a:solidFill>
+                  <a:schemeClr val="bg2">
+                    <a:lumMod val="90000"/>
+                  </a:schemeClr>
+                </a:solidFill>
+                <a:latin typeface="Trebuchet MS" panose="020B0603020202020204" pitchFamily="34" charset="0"/>
+              </a:endParaRPr>
+            </a:p>
+          </p:txBody>
+        </p:sp>
+        <p:grpSp>
+          <p:nvGrpSpPr>
+            <p:cNvPr id="20" name="Gruppe 19"/>
+            <p:cNvGrpSpPr/>
+            <p:nvPr/>
+          </p:nvGrpSpPr>
+          <p:grpSpPr>
+            <a:xfrm>
+              <a:off x="5185762" y="2858516"/>
+              <a:ext cx="1820476" cy="1359514"/>
+              <a:chOff x="5301656" y="2852420"/>
+              <a:chExt cx="1820476" cy="1359514"/>
+            </a:xfrm>
+          </p:grpSpPr>
+          <p:grpSp>
+            <p:nvGrpSpPr>
+              <p:cNvPr id="17" name="Gruppe 16"/>
+              <p:cNvGrpSpPr/>
+              <p:nvPr/>
+            </p:nvGrpSpPr>
+            <p:grpSpPr>
+              <a:xfrm>
+                <a:off x="5769415" y="2852420"/>
+                <a:ext cx="1352717" cy="1359514"/>
+                <a:chOff x="5891335" y="2837180"/>
+                <a:chExt cx="1352717" cy="1359514"/>
+              </a:xfrm>
+            </p:grpSpPr>
+            <p:pic>
+              <p:nvPicPr>
+                <p:cNvPr id="15" name="Bilde 14"/>
+                <p:cNvPicPr>
+                  <a:picLocks noChangeAspect="1"/>
+                </p:cNvPicPr>
+                <p:nvPr/>
+              </p:nvPicPr>
+              <p:blipFill rotWithShape="1">
+                <a:blip r:embed="rId2"/>
+                <a:srcRect l="31009" t="56267" r="40195" b="24390"/>
+                <a:stretch/>
+              </p:blipFill>
+              <p:spPr>
+                <a:xfrm>
+                  <a:off x="6098539" y="3050327"/>
+                  <a:ext cx="936159" cy="929853"/>
+                </a:xfrm>
+                <a:prstGeom prst="rect">
+                  <a:avLst/>
+                </a:prstGeom>
+              </p:spPr>
+            </p:pic>
+            <p:sp>
+              <p:nvSpPr>
+                <p:cNvPr id="8" name="Smultring 7"/>
+                <p:cNvSpPr/>
+                <p:nvPr/>
+              </p:nvSpPr>
+              <p:spPr>
+                <a:xfrm>
+                  <a:off x="5891335" y="2837180"/>
+                  <a:ext cx="1352717" cy="1359514"/>
+                </a:xfrm>
+                <a:prstGeom prst="donut">
+                  <a:avLst>
+                    <a:gd name="adj" fmla="val 13467"/>
+                  </a:avLst>
+                </a:prstGeom>
+                <a:solidFill>
+                  <a:srgbClr val="133E4D"/>
+                </a:solidFill>
+                <a:ln>
+                  <a:noFill/>
+                </a:ln>
+              </p:spPr>
+              <p:style>
+                <a:lnRef idx="2">
+                  <a:schemeClr val="accent1">
+                    <a:shade val="50000"/>
+                  </a:schemeClr>
+                </a:lnRef>
+                <a:fillRef idx="1">
+                  <a:schemeClr val="accent1"/>
+                </a:fillRef>
+                <a:effectRef idx="0">
+                  <a:schemeClr val="accent1"/>
+                </a:effectRef>
+                <a:fontRef idx="minor">
+                  <a:schemeClr val="lt1"/>
+                </a:fontRef>
+              </p:style>
+              <p:txBody>
+                <a:bodyPr rtlCol="0" anchor="ctr"/>
+                <a:lstStyle/>
+                <a:p>
+                  <a:pPr algn="ctr"/>
+                  <a:endParaRPr lang="nb-NO">
+                    <a:solidFill>
+                      <a:schemeClr val="tx1"/>
+                    </a:solidFill>
+                  </a:endParaRPr>
+                </a:p>
+              </p:txBody>
+            </p:sp>
+            <p:sp>
+              <p:nvSpPr>
+                <p:cNvPr id="4" name="Ellipse 3"/>
+                <p:cNvSpPr/>
+                <p:nvPr/>
+              </p:nvSpPr>
+              <p:spPr>
+                <a:xfrm>
+                  <a:off x="6086101" y="3027339"/>
+                  <a:ext cx="963184" cy="979195"/>
+                </a:xfrm>
+                <a:prstGeom prst="ellipse">
+                  <a:avLst/>
+                </a:prstGeom>
+                <a:noFill/>
+                <a:ln w="63500">
+                  <a:solidFill>
+                    <a:srgbClr val="979EA6"/>
+                  </a:solidFill>
+                </a:ln>
+              </p:spPr>
+              <p:style>
+                <a:lnRef idx="2">
+                  <a:schemeClr val="accent1">
+                    <a:shade val="50000"/>
+                  </a:schemeClr>
+                </a:lnRef>
+                <a:fillRef idx="1">
+                  <a:schemeClr val="accent1"/>
+                </a:fillRef>
+                <a:effectRef idx="0">
+                  <a:schemeClr val="accent1"/>
+                </a:effectRef>
+                <a:fontRef idx="minor">
+                  <a:schemeClr val="lt1"/>
+                </a:fontRef>
+              </p:style>
+              <p:txBody>
+                <a:bodyPr rtlCol="0" anchor="ctr"/>
+                <a:lstStyle/>
+                <a:p>
+                  <a:pPr algn="ctr"/>
+                  <a:endParaRPr lang="nb-NO"/>
+                </a:p>
+              </p:txBody>
+            </p:sp>
+          </p:grpSp>
+          <p:grpSp>
+            <p:nvGrpSpPr>
+              <p:cNvPr id="19" name="Gruppe 18"/>
+              <p:cNvGrpSpPr/>
+              <p:nvPr/>
+            </p:nvGrpSpPr>
+            <p:grpSpPr>
+              <a:xfrm>
+                <a:off x="5301656" y="3687070"/>
+                <a:ext cx="712256" cy="316256"/>
+                <a:chOff x="5301656" y="3687070"/>
+                <a:chExt cx="712256" cy="316256"/>
+              </a:xfrm>
+            </p:grpSpPr>
+            <p:sp>
+              <p:nvSpPr>
+                <p:cNvPr id="6" name="Avrundet rektangel 5"/>
+                <p:cNvSpPr/>
+                <p:nvPr/>
+              </p:nvSpPr>
+              <p:spPr>
+                <a:xfrm rot="20040000">
+                  <a:off x="5832438" y="3687070"/>
+                  <a:ext cx="181474" cy="150982"/>
+                </a:xfrm>
+                <a:prstGeom prst="roundRect">
+                  <a:avLst/>
+                </a:prstGeom>
+                <a:solidFill>
+                  <a:srgbClr val="979EA6"/>
+                </a:solidFill>
+                <a:ln>
+                  <a:solidFill>
+                    <a:srgbClr val="979EA6"/>
+                  </a:solidFill>
+                </a:ln>
+              </p:spPr>
+              <p:style>
+                <a:lnRef idx="2">
+                  <a:schemeClr val="accent1">
+                    <a:shade val="50000"/>
+                  </a:schemeClr>
+                </a:lnRef>
+                <a:fillRef idx="1">
+                  <a:schemeClr val="accent1"/>
+                </a:fillRef>
+                <a:effectRef idx="0">
+                  <a:schemeClr val="accent1"/>
+                </a:effectRef>
+                <a:fontRef idx="minor">
+                  <a:schemeClr val="lt1"/>
+                </a:fontRef>
+              </p:style>
+              <p:txBody>
+                <a:bodyPr rtlCol="0" anchor="ctr"/>
+                <a:lstStyle/>
+                <a:p>
+                  <a:pPr algn="ctr"/>
+                  <a:endParaRPr lang="nb-NO"/>
+                </a:p>
+              </p:txBody>
+            </p:sp>
+            <p:sp>
+              <p:nvSpPr>
+                <p:cNvPr id="3" name="Avrundet rektangel 2"/>
+                <p:cNvSpPr/>
+                <p:nvPr/>
+              </p:nvSpPr>
+              <p:spPr>
+                <a:xfrm rot="20040000">
+                  <a:off x="5301656" y="3808774"/>
+                  <a:ext cx="654646" cy="194552"/>
+                </a:xfrm>
+                <a:prstGeom prst="roundRect">
+                  <a:avLst/>
+                </a:prstGeom>
+                <a:solidFill>
+                  <a:srgbClr val="7C858E"/>
+                </a:solidFill>
+                <a:ln w="28575">
+                  <a:solidFill>
+                    <a:srgbClr val="979EA6"/>
+                  </a:solidFill>
+                </a:ln>
+              </p:spPr>
+              <p:style>
+                <a:lnRef idx="2">
+                  <a:schemeClr val="accent1">
+                    <a:shade val="50000"/>
+                  </a:schemeClr>
+                </a:lnRef>
+                <a:fillRef idx="1">
+                  <a:schemeClr val="accent1"/>
+                </a:fillRef>
+                <a:effectRef idx="0">
+                  <a:schemeClr val="accent1"/>
+                </a:effectRef>
+                <a:fontRef idx="minor">
+                  <a:schemeClr val="lt1"/>
+                </a:fontRef>
+              </p:style>
+              <p:txBody>
+                <a:bodyPr rtlCol="0" anchor="ctr"/>
+                <a:lstStyle/>
+                <a:p>
+                  <a:pPr algn="ctr"/>
+                  <a:endParaRPr lang="nb-NO"/>
+                </a:p>
+              </p:txBody>
+            </p:sp>
+          </p:grpSp>
+        </p:grpSp>
+      </p:grpSp>
+    </p:spTree>
+    <p:extLst>
+      <p:ext uri="{BB962C8B-B14F-4D97-AF65-F5344CB8AC3E}">
+        <p14:creationId xmlns:p14="http://schemas.microsoft.com/office/powerpoint/2010/main" val="2421291886"/>
+      </p:ext>
+    </p:extLst>
+  </p:cSld>
+  <p:clrMapOvr>
+    <a:masterClrMapping/>
+  </p:clrMapOvr>
+  <p:timing>
+    <p:tnLst>
+      <p:par>
+        <p:cTn id="1" dur="indefinite" restart="never" nodeType="tmRoot"/>
+      </p:par>
+    </p:tnLst>
+  </p:timing>
+</p:sld>
+</file>
+
+<file path=ppt/slides/slide11.xml><?xml version="1.0" encoding="utf-8"?>
+<p:sld xmlns:a="http://schemas.openxmlformats.org/drawingml/2006/main" xmlns:r="http://schemas.openxmlformats.org/officeDocument/2006/relationships" xmlns:p="http://schemas.openxmlformats.org/presentationml/2006/main">
+  <p:cSld>
+    <p:spTree>
+      <p:nvGrpSpPr>
+        <p:cNvPr id="1" name=""/>
+        <p:cNvGrpSpPr/>
+        <p:nvPr/>
+      </p:nvGrpSpPr>
+      <p:grpSpPr>
+        <a:xfrm>
+          <a:off x="0" y="0"/>
+          <a:ext cx="0" cy="0"/>
+          <a:chOff x="0" y="0"/>
+          <a:chExt cx="0" cy="0"/>
+        </a:xfrm>
+      </p:grpSpPr>
+      <p:grpSp>
+        <p:nvGrpSpPr>
           <p:cNvPr id="66" name="Gruppe 65"/>
           <p:cNvGrpSpPr/>
           <p:nvPr/>
@@ -8970,7 +9392,7 @@
 </p:sld>
 </file>
 
-<file path=ppt/slides/slide11.xml><?xml version="1.0" encoding="utf-8"?>
+<file path=ppt/slides/slide12.xml><?xml version="1.0" encoding="utf-8"?>
 <p:sld xmlns:a="http://schemas.openxmlformats.org/drawingml/2006/main" xmlns:r="http://schemas.openxmlformats.org/officeDocument/2006/relationships" xmlns:p="http://schemas.openxmlformats.org/presentationml/2006/main">
   <p:cSld>
     <p:spTree>
@@ -9300,7 +9722,7 @@
 </p:sld>
 </file>
 
-<file path=ppt/slides/slide12.xml><?xml version="1.0" encoding="utf-8"?>
+<file path=ppt/slides/slide13.xml><?xml version="1.0" encoding="utf-8"?>
 <p:sld xmlns:a="http://schemas.openxmlformats.org/drawingml/2006/main" xmlns:r="http://schemas.openxmlformats.org/officeDocument/2006/relationships" xmlns:p="http://schemas.openxmlformats.org/presentationml/2006/main">
   <p:cSld>
     <p:spTree>
@@ -11436,7 +11858,7 @@
 </p:sld>
 </file>
 
-<file path=ppt/slides/slide13.xml><?xml version="1.0" encoding="utf-8"?>
+<file path=ppt/slides/slide14.xml><?xml version="1.0" encoding="utf-8"?>
 <p:sld xmlns:a="http://schemas.openxmlformats.org/drawingml/2006/main" xmlns:r="http://schemas.openxmlformats.org/officeDocument/2006/relationships" xmlns:p="http://schemas.openxmlformats.org/presentationml/2006/main">
   <p:cSld>
     <p:spTree>
@@ -13150,7 +13572,7 @@
 </p:sld>
 </file>
 
-<file path=ppt/slides/slide14.xml><?xml version="1.0" encoding="utf-8"?>
+<file path=ppt/slides/slide15.xml><?xml version="1.0" encoding="utf-8"?>
 <p:sld xmlns:a="http://schemas.openxmlformats.org/drawingml/2006/main" xmlns:r="http://schemas.openxmlformats.org/officeDocument/2006/relationships" xmlns:p="http://schemas.openxmlformats.org/presentationml/2006/main">
   <p:cSld>
     <p:spTree>
@@ -13294,7 +13716,7 @@
 </p:sld>
 </file>
 
-<file path=ppt/slides/slide15.xml><?xml version="1.0" encoding="utf-8"?>
+<file path=ppt/slides/slide16.xml><?xml version="1.0" encoding="utf-8"?>
 <p:sld xmlns:a="http://schemas.openxmlformats.org/drawingml/2006/main" xmlns:r="http://schemas.openxmlformats.org/officeDocument/2006/relationships" xmlns:p="http://schemas.openxmlformats.org/presentationml/2006/main">
   <p:cSld>
     <p:spTree>
@@ -13453,7 +13875,7 @@
 </p:sld>
 </file>
 
-<file path=ppt/slides/slide16.xml><?xml version="1.0" encoding="utf-8"?>
+<file path=ppt/slides/slide17.xml><?xml version="1.0" encoding="utf-8"?>
 <p:sld xmlns:a="http://schemas.openxmlformats.org/drawingml/2006/main" xmlns:r="http://schemas.openxmlformats.org/officeDocument/2006/relationships" xmlns:p="http://schemas.openxmlformats.org/presentationml/2006/main">
   <p:cSld>
     <p:spTree>
@@ -23929,6 +24351,195 @@
       </p:grpSpPr>
       <p:grpSp>
         <p:nvGrpSpPr>
+          <p:cNvPr id="4" name="Gruppe 3"/>
+          <p:cNvGrpSpPr/>
+          <p:nvPr/>
+        </p:nvGrpSpPr>
+        <p:grpSpPr>
+          <a:xfrm>
+            <a:off x="4735200" y="2244483"/>
+            <a:ext cx="2721600" cy="2369033"/>
+            <a:chOff x="4735200" y="2244483"/>
+            <a:chExt cx="2721600" cy="2369033"/>
+          </a:xfrm>
+        </p:grpSpPr>
+        <p:sp>
+          <p:nvSpPr>
+            <p:cNvPr id="2" name="Hexagon 35">
+              <a:extLst>
+                <a:ext uri="{FF2B5EF4-FFF2-40B4-BE49-F238E27FC236}">
+                  <a16:creationId xmlns:a16="http://schemas.microsoft.com/office/drawing/2014/main" id="{90E46B38-1301-774F-8904-FFF8966BD8C2}"/>
+                </a:ext>
+              </a:extLst>
+            </p:cNvPr>
+            <p:cNvSpPr>
+              <a:spLocks noChangeAspect="1"/>
+            </p:cNvSpPr>
+            <p:nvPr/>
+          </p:nvSpPr>
+          <p:spPr>
+            <a:xfrm rot="1800000">
+              <a:off x="4735200" y="2244483"/>
+              <a:ext cx="2721600" cy="2369033"/>
+            </a:xfrm>
+            <a:prstGeom prst="hexagon">
+              <a:avLst>
+                <a:gd name="adj" fmla="val 28372"/>
+                <a:gd name="vf" fmla="val 115470"/>
+              </a:avLst>
+            </a:prstGeom>
+            <a:solidFill>
+              <a:srgbClr val="133E4D"/>
+            </a:solidFill>
+            <a:ln w="69850">
+              <a:solidFill>
+                <a:schemeClr val="tx1">
+                  <a:lumMod val="85000"/>
+                  <a:lumOff val="15000"/>
+                </a:schemeClr>
+              </a:solidFill>
+            </a:ln>
+          </p:spPr>
+          <p:style>
+            <a:lnRef idx="2">
+              <a:schemeClr val="accent1">
+                <a:shade val="50000"/>
+              </a:schemeClr>
+            </a:lnRef>
+            <a:fillRef idx="1">
+              <a:schemeClr val="accent1"/>
+            </a:fillRef>
+            <a:effectRef idx="0">
+              <a:schemeClr val="accent1"/>
+            </a:effectRef>
+            <a:fontRef idx="minor">
+              <a:schemeClr val="lt1"/>
+            </a:fontRef>
+          </p:style>
+          <p:txBody>
+            <a:bodyPr rtlCol="0" anchor="ctr"/>
+            <a:lstStyle/>
+            <a:p>
+              <a:pPr algn="ctr"/>
+              <a:endParaRPr lang="en-US" dirty="0"/>
+            </a:p>
+          </p:txBody>
+        </p:sp>
+        <p:sp>
+          <p:nvSpPr>
+            <p:cNvPr id="45" name="TekstSylinder 44"/>
+            <p:cNvSpPr txBox="1"/>
+            <p:nvPr/>
+          </p:nvSpPr>
+          <p:spPr>
+            <a:xfrm>
+              <a:off x="4951956" y="2496396"/>
+              <a:ext cx="2292096" cy="461665"/>
+            </a:xfrm>
+            <a:prstGeom prst="rect">
+              <a:avLst/>
+            </a:prstGeom>
+            <a:noFill/>
+          </p:spPr>
+          <p:txBody>
+            <a:bodyPr wrap="square" rtlCol="0">
+              <a:spAutoFit/>
+            </a:bodyPr>
+            <a:lstStyle/>
+            <a:p>
+              <a:pPr algn="ctr"/>
+              <a:r>
+                <a:rPr lang="nb-NO" sz="2400" dirty="0" err="1" smtClean="0">
+                  <a:solidFill>
+                    <a:schemeClr val="bg2">
+                      <a:lumMod val="90000"/>
+                    </a:schemeClr>
+                  </a:solidFill>
+                  <a:latin typeface="Trebuchet MS" panose="020B0603020202020204" pitchFamily="34" charset="0"/>
+                </a:rPr>
+                <a:t>NVIpjsr</a:t>
+              </a:r>
+              <a:endParaRPr lang="nb-NO" sz="2400" dirty="0">
+                <a:solidFill>
+                  <a:schemeClr val="bg2">
+                    <a:lumMod val="90000"/>
+                  </a:schemeClr>
+                </a:solidFill>
+                <a:latin typeface="Trebuchet MS" panose="020B0603020202020204" pitchFamily="34" charset="0"/>
+              </a:endParaRPr>
+            </a:p>
+          </p:txBody>
+        </p:sp>
+        <p:pic>
+          <p:nvPicPr>
+            <p:cNvPr id="3" name="Bilde 2"/>
+            <p:cNvPicPr>
+              <a:picLocks noChangeAspect="1"/>
+            </p:cNvPicPr>
+            <p:nvPr/>
+          </p:nvPicPr>
+          <p:blipFill>
+            <a:blip r:embed="rId2">
+              <a:extLst>
+                <a:ext uri="{28A0092B-C50C-407E-A947-70E740481C1C}">
+                  <a14:useLocalDpi xmlns:a14="http://schemas.microsoft.com/office/drawing/2010/main" val="0"/>
+                </a:ext>
+              </a:extLst>
+            </a:blip>
+            <a:stretch>
+              <a:fillRect/>
+            </a:stretch>
+          </p:blipFill>
+          <p:spPr>
+            <a:xfrm>
+              <a:off x="5350003" y="2955538"/>
+              <a:ext cx="1552282" cy="1552282"/>
+            </a:xfrm>
+            <a:prstGeom prst="rect">
+              <a:avLst/>
+            </a:prstGeom>
+          </p:spPr>
+        </p:pic>
+      </p:grpSp>
+    </p:spTree>
+    <p:extLst>
+      <p:ext uri="{BB962C8B-B14F-4D97-AF65-F5344CB8AC3E}">
+        <p14:creationId xmlns:p14="http://schemas.microsoft.com/office/powerpoint/2010/main" val="3358522401"/>
+      </p:ext>
+    </p:extLst>
+  </p:cSld>
+  <p:clrMapOvr>
+    <a:masterClrMapping/>
+  </p:clrMapOvr>
+  <p:timing>
+    <p:tnLst>
+      <p:par>
+        <p:cTn id="1" dur="indefinite" restart="never" nodeType="tmRoot"/>
+      </p:par>
+    </p:tnLst>
+  </p:timing>
+</p:sld>
+</file>
+
+<file path=ppt/slides/slide8.xml><?xml version="1.0" encoding="utf-8"?>
+<p:sld xmlns:a="http://schemas.openxmlformats.org/drawingml/2006/main" xmlns:r="http://schemas.openxmlformats.org/officeDocument/2006/relationships" xmlns:p="http://schemas.openxmlformats.org/presentationml/2006/main">
+  <p:cSld>
+    <p:spTree>
+      <p:nvGrpSpPr>
+        <p:cNvPr id="1" name=""/>
+        <p:cNvGrpSpPr/>
+        <p:nvPr/>
+      </p:nvGrpSpPr>
+      <p:grpSpPr>
+        <a:xfrm>
+          <a:off x="0" y="0"/>
+          <a:ext cx="0" cy="0"/>
+          <a:chOff x="0" y="0"/>
+          <a:chExt cx="0" cy="0"/>
+        </a:xfrm>
+      </p:grpSpPr>
+      <p:grpSp>
+        <p:nvGrpSpPr>
           <p:cNvPr id="7" name="Gruppe 6"/>
           <p:cNvGrpSpPr/>
           <p:nvPr/>
@@ -25345,7 +25956,7 @@
 </p:sld>
 </file>
 
-<file path=ppt/slides/slide8.xml><?xml version="1.0" encoding="utf-8"?>
+<file path=ppt/slides/slide9.xml><?xml version="1.0" encoding="utf-8"?>
 <p:sld xmlns:a="http://schemas.openxmlformats.org/drawingml/2006/main" xmlns:r="http://schemas.openxmlformats.org/officeDocument/2006/relationships" xmlns:p="http://schemas.openxmlformats.org/presentationml/2006/main">
   <p:cSld>
     <p:spTree>
@@ -26046,427 +26657,6 @@
     <p:extLst>
       <p:ext uri="{BB962C8B-B14F-4D97-AF65-F5344CB8AC3E}">
         <p14:creationId xmlns:p14="http://schemas.microsoft.com/office/powerpoint/2010/main" val="1282746756"/>
-      </p:ext>
-    </p:extLst>
-  </p:cSld>
-  <p:clrMapOvr>
-    <a:masterClrMapping/>
-  </p:clrMapOvr>
-  <p:timing>
-    <p:tnLst>
-      <p:par>
-        <p:cTn id="1" dur="indefinite" restart="never" nodeType="tmRoot"/>
-      </p:par>
-    </p:tnLst>
-  </p:timing>
-</p:sld>
-</file>
-
-<file path=ppt/slides/slide9.xml><?xml version="1.0" encoding="utf-8"?>
-<p:sld xmlns:a="http://schemas.openxmlformats.org/drawingml/2006/main" xmlns:r="http://schemas.openxmlformats.org/officeDocument/2006/relationships" xmlns:p="http://schemas.openxmlformats.org/presentationml/2006/main">
-  <p:cSld>
-    <p:spTree>
-      <p:nvGrpSpPr>
-        <p:cNvPr id="1" name=""/>
-        <p:cNvGrpSpPr/>
-        <p:nvPr/>
-      </p:nvGrpSpPr>
-      <p:grpSpPr>
-        <a:xfrm>
-          <a:off x="0" y="0"/>
-          <a:ext cx="0" cy="0"/>
-          <a:chOff x="0" y="0"/>
-          <a:chExt cx="0" cy="0"/>
-        </a:xfrm>
-      </p:grpSpPr>
-      <p:grpSp>
-        <p:nvGrpSpPr>
-          <p:cNvPr id="22" name="Gruppe 21"/>
-          <p:cNvGrpSpPr/>
-          <p:nvPr/>
-        </p:nvGrpSpPr>
-        <p:grpSpPr>
-          <a:xfrm>
-            <a:off x="4735200" y="2244483"/>
-            <a:ext cx="2721600" cy="2369033"/>
-            <a:chOff x="4735200" y="2244483"/>
-            <a:chExt cx="2721600" cy="2369033"/>
-          </a:xfrm>
-        </p:grpSpPr>
-        <p:sp>
-          <p:nvSpPr>
-            <p:cNvPr id="2" name="Hexagon 35">
-              <a:extLst>
-                <a:ext uri="{FF2B5EF4-FFF2-40B4-BE49-F238E27FC236}">
-                  <a16:creationId xmlns:a16="http://schemas.microsoft.com/office/drawing/2014/main" id="{90E46B38-1301-774F-8904-FFF8966BD8C2}"/>
-                </a:ext>
-              </a:extLst>
-            </p:cNvPr>
-            <p:cNvSpPr>
-              <a:spLocks noChangeAspect="1"/>
-            </p:cNvSpPr>
-            <p:nvPr/>
-          </p:nvSpPr>
-          <p:spPr>
-            <a:xfrm rot="1800000">
-              <a:off x="4735200" y="2244483"/>
-              <a:ext cx="2721600" cy="2369033"/>
-            </a:xfrm>
-            <a:prstGeom prst="hexagon">
-              <a:avLst>
-                <a:gd name="adj" fmla="val 28372"/>
-                <a:gd name="vf" fmla="val 115470"/>
-              </a:avLst>
-            </a:prstGeom>
-            <a:solidFill>
-              <a:srgbClr val="133E4D"/>
-            </a:solidFill>
-            <a:ln w="69850">
-              <a:solidFill>
-                <a:schemeClr val="tx1">
-                  <a:lumMod val="85000"/>
-                  <a:lumOff val="15000"/>
-                </a:schemeClr>
-              </a:solidFill>
-            </a:ln>
-          </p:spPr>
-          <p:style>
-            <a:lnRef idx="2">
-              <a:schemeClr val="accent1">
-                <a:shade val="50000"/>
-              </a:schemeClr>
-            </a:lnRef>
-            <a:fillRef idx="1">
-              <a:schemeClr val="accent1"/>
-            </a:fillRef>
-            <a:effectRef idx="0">
-              <a:schemeClr val="accent1"/>
-            </a:effectRef>
-            <a:fontRef idx="minor">
-              <a:schemeClr val="lt1"/>
-            </a:fontRef>
-          </p:style>
-          <p:txBody>
-            <a:bodyPr rtlCol="0" anchor="ctr"/>
-            <a:lstStyle/>
-            <a:p>
-              <a:pPr algn="ctr"/>
-              <a:endParaRPr lang="en-US" dirty="0"/>
-            </a:p>
-          </p:txBody>
-        </p:sp>
-        <p:sp>
-          <p:nvSpPr>
-            <p:cNvPr id="45" name="TekstSylinder 44"/>
-            <p:cNvSpPr txBox="1"/>
-            <p:nvPr/>
-          </p:nvSpPr>
-          <p:spPr>
-            <a:xfrm>
-              <a:off x="4951956" y="2496396"/>
-              <a:ext cx="2292096" cy="461665"/>
-            </a:xfrm>
-            <a:prstGeom prst="rect">
-              <a:avLst/>
-            </a:prstGeom>
-            <a:noFill/>
-          </p:spPr>
-          <p:txBody>
-            <a:bodyPr wrap="square" rtlCol="0">
-              <a:spAutoFit/>
-            </a:bodyPr>
-            <a:lstStyle/>
-            <a:p>
-              <a:pPr algn="ctr"/>
-              <a:r>
-                <a:rPr lang="nb-NO" sz="2400" dirty="0" err="1" smtClean="0">
-                  <a:solidFill>
-                    <a:schemeClr val="bg2">
-                      <a:lumMod val="90000"/>
-                    </a:schemeClr>
-                  </a:solidFill>
-                  <a:latin typeface="Trebuchet MS" panose="020B0603020202020204" pitchFamily="34" charset="0"/>
-                </a:rPr>
-                <a:t>OKcheck</a:t>
-              </a:r>
-              <a:endParaRPr lang="nb-NO" sz="2400" dirty="0">
-                <a:solidFill>
-                  <a:schemeClr val="bg2">
-                    <a:lumMod val="90000"/>
-                  </a:schemeClr>
-                </a:solidFill>
-                <a:latin typeface="Trebuchet MS" panose="020B0603020202020204" pitchFamily="34" charset="0"/>
-              </a:endParaRPr>
-            </a:p>
-          </p:txBody>
-        </p:sp>
-        <p:grpSp>
-          <p:nvGrpSpPr>
-            <p:cNvPr id="20" name="Gruppe 19"/>
-            <p:cNvGrpSpPr/>
-            <p:nvPr/>
-          </p:nvGrpSpPr>
-          <p:grpSpPr>
-            <a:xfrm>
-              <a:off x="5185762" y="2858516"/>
-              <a:ext cx="1820476" cy="1359514"/>
-              <a:chOff x="5301656" y="2852420"/>
-              <a:chExt cx="1820476" cy="1359514"/>
-            </a:xfrm>
-          </p:grpSpPr>
-          <p:grpSp>
-            <p:nvGrpSpPr>
-              <p:cNvPr id="17" name="Gruppe 16"/>
-              <p:cNvGrpSpPr/>
-              <p:nvPr/>
-            </p:nvGrpSpPr>
-            <p:grpSpPr>
-              <a:xfrm>
-                <a:off x="5769415" y="2852420"/>
-                <a:ext cx="1352717" cy="1359514"/>
-                <a:chOff x="5891335" y="2837180"/>
-                <a:chExt cx="1352717" cy="1359514"/>
-              </a:xfrm>
-            </p:grpSpPr>
-            <p:pic>
-              <p:nvPicPr>
-                <p:cNvPr id="15" name="Bilde 14"/>
-                <p:cNvPicPr>
-                  <a:picLocks noChangeAspect="1"/>
-                </p:cNvPicPr>
-                <p:nvPr/>
-              </p:nvPicPr>
-              <p:blipFill rotWithShape="1">
-                <a:blip r:embed="rId2"/>
-                <a:srcRect l="31009" t="56267" r="40195" b="24390"/>
-                <a:stretch/>
-              </p:blipFill>
-              <p:spPr>
-                <a:xfrm>
-                  <a:off x="6098539" y="3050327"/>
-                  <a:ext cx="936159" cy="929853"/>
-                </a:xfrm>
-                <a:prstGeom prst="rect">
-                  <a:avLst/>
-                </a:prstGeom>
-              </p:spPr>
-            </p:pic>
-            <p:sp>
-              <p:nvSpPr>
-                <p:cNvPr id="8" name="Smultring 7"/>
-                <p:cNvSpPr/>
-                <p:nvPr/>
-              </p:nvSpPr>
-              <p:spPr>
-                <a:xfrm>
-                  <a:off x="5891335" y="2837180"/>
-                  <a:ext cx="1352717" cy="1359514"/>
-                </a:xfrm>
-                <a:prstGeom prst="donut">
-                  <a:avLst>
-                    <a:gd name="adj" fmla="val 13467"/>
-                  </a:avLst>
-                </a:prstGeom>
-                <a:solidFill>
-                  <a:srgbClr val="133E4D"/>
-                </a:solidFill>
-                <a:ln>
-                  <a:noFill/>
-                </a:ln>
-              </p:spPr>
-              <p:style>
-                <a:lnRef idx="2">
-                  <a:schemeClr val="accent1">
-                    <a:shade val="50000"/>
-                  </a:schemeClr>
-                </a:lnRef>
-                <a:fillRef idx="1">
-                  <a:schemeClr val="accent1"/>
-                </a:fillRef>
-                <a:effectRef idx="0">
-                  <a:schemeClr val="accent1"/>
-                </a:effectRef>
-                <a:fontRef idx="minor">
-                  <a:schemeClr val="lt1"/>
-                </a:fontRef>
-              </p:style>
-              <p:txBody>
-                <a:bodyPr rtlCol="0" anchor="ctr"/>
-                <a:lstStyle/>
-                <a:p>
-                  <a:pPr algn="ctr"/>
-                  <a:endParaRPr lang="nb-NO">
-                    <a:solidFill>
-                      <a:schemeClr val="tx1"/>
-                    </a:solidFill>
-                  </a:endParaRPr>
-                </a:p>
-              </p:txBody>
-            </p:sp>
-            <p:sp>
-              <p:nvSpPr>
-                <p:cNvPr id="4" name="Ellipse 3"/>
-                <p:cNvSpPr/>
-                <p:nvPr/>
-              </p:nvSpPr>
-              <p:spPr>
-                <a:xfrm>
-                  <a:off x="6086101" y="3027339"/>
-                  <a:ext cx="963184" cy="979195"/>
-                </a:xfrm>
-                <a:prstGeom prst="ellipse">
-                  <a:avLst/>
-                </a:prstGeom>
-                <a:noFill/>
-                <a:ln w="63500">
-                  <a:solidFill>
-                    <a:srgbClr val="979EA6"/>
-                  </a:solidFill>
-                </a:ln>
-              </p:spPr>
-              <p:style>
-                <a:lnRef idx="2">
-                  <a:schemeClr val="accent1">
-                    <a:shade val="50000"/>
-                  </a:schemeClr>
-                </a:lnRef>
-                <a:fillRef idx="1">
-                  <a:schemeClr val="accent1"/>
-                </a:fillRef>
-                <a:effectRef idx="0">
-                  <a:schemeClr val="accent1"/>
-                </a:effectRef>
-                <a:fontRef idx="minor">
-                  <a:schemeClr val="lt1"/>
-                </a:fontRef>
-              </p:style>
-              <p:txBody>
-                <a:bodyPr rtlCol="0" anchor="ctr"/>
-                <a:lstStyle/>
-                <a:p>
-                  <a:pPr algn="ctr"/>
-                  <a:endParaRPr lang="nb-NO"/>
-                </a:p>
-              </p:txBody>
-            </p:sp>
-          </p:grpSp>
-          <p:grpSp>
-            <p:nvGrpSpPr>
-              <p:cNvPr id="19" name="Gruppe 18"/>
-              <p:cNvGrpSpPr/>
-              <p:nvPr/>
-            </p:nvGrpSpPr>
-            <p:grpSpPr>
-              <a:xfrm>
-                <a:off x="5301656" y="3687070"/>
-                <a:ext cx="712256" cy="316256"/>
-                <a:chOff x="5301656" y="3687070"/>
-                <a:chExt cx="712256" cy="316256"/>
-              </a:xfrm>
-            </p:grpSpPr>
-            <p:sp>
-              <p:nvSpPr>
-                <p:cNvPr id="6" name="Avrundet rektangel 5"/>
-                <p:cNvSpPr/>
-                <p:nvPr/>
-              </p:nvSpPr>
-              <p:spPr>
-                <a:xfrm rot="20040000">
-                  <a:off x="5832438" y="3687070"/>
-                  <a:ext cx="181474" cy="150982"/>
-                </a:xfrm>
-                <a:prstGeom prst="roundRect">
-                  <a:avLst/>
-                </a:prstGeom>
-                <a:solidFill>
-                  <a:srgbClr val="979EA6"/>
-                </a:solidFill>
-                <a:ln>
-                  <a:solidFill>
-                    <a:srgbClr val="979EA6"/>
-                  </a:solidFill>
-                </a:ln>
-              </p:spPr>
-              <p:style>
-                <a:lnRef idx="2">
-                  <a:schemeClr val="accent1">
-                    <a:shade val="50000"/>
-                  </a:schemeClr>
-                </a:lnRef>
-                <a:fillRef idx="1">
-                  <a:schemeClr val="accent1"/>
-                </a:fillRef>
-                <a:effectRef idx="0">
-                  <a:schemeClr val="accent1"/>
-                </a:effectRef>
-                <a:fontRef idx="minor">
-                  <a:schemeClr val="lt1"/>
-                </a:fontRef>
-              </p:style>
-              <p:txBody>
-                <a:bodyPr rtlCol="0" anchor="ctr"/>
-                <a:lstStyle/>
-                <a:p>
-                  <a:pPr algn="ctr"/>
-                  <a:endParaRPr lang="nb-NO"/>
-                </a:p>
-              </p:txBody>
-            </p:sp>
-            <p:sp>
-              <p:nvSpPr>
-                <p:cNvPr id="3" name="Avrundet rektangel 2"/>
-                <p:cNvSpPr/>
-                <p:nvPr/>
-              </p:nvSpPr>
-              <p:spPr>
-                <a:xfrm rot="20040000">
-                  <a:off x="5301656" y="3808774"/>
-                  <a:ext cx="654646" cy="194552"/>
-                </a:xfrm>
-                <a:prstGeom prst="roundRect">
-                  <a:avLst/>
-                </a:prstGeom>
-                <a:solidFill>
-                  <a:srgbClr val="7C858E"/>
-                </a:solidFill>
-                <a:ln w="28575">
-                  <a:solidFill>
-                    <a:srgbClr val="979EA6"/>
-                  </a:solidFill>
-                </a:ln>
-              </p:spPr>
-              <p:style>
-                <a:lnRef idx="2">
-                  <a:schemeClr val="accent1">
-                    <a:shade val="50000"/>
-                  </a:schemeClr>
-                </a:lnRef>
-                <a:fillRef idx="1">
-                  <a:schemeClr val="accent1"/>
-                </a:fillRef>
-                <a:effectRef idx="0">
-                  <a:schemeClr val="accent1"/>
-                </a:effectRef>
-                <a:fontRef idx="minor">
-                  <a:schemeClr val="lt1"/>
-                </a:fontRef>
-              </p:style>
-              <p:txBody>
-                <a:bodyPr rtlCol="0" anchor="ctr"/>
-                <a:lstStyle/>
-                <a:p>
-                  <a:pPr algn="ctr"/>
-                  <a:endParaRPr lang="nb-NO"/>
-                </a:p>
-              </p:txBody>
-            </p:sp>
-          </p:grpSp>
-        </p:grpSp>
-      </p:grpSp>
-    </p:spTree>
-    <p:extLst>
-      <p:ext uri="{BB962C8B-B14F-4D97-AF65-F5344CB8AC3E}">
-        <p14:creationId xmlns:p14="http://schemas.microsoft.com/office/powerpoint/2010/main" val="2421291886"/>
       </p:ext>
     </p:extLst>
   </p:cSld>
@@ -26745,21 +26935,6 @@
 </file>
 
 <file path=customXml/item1.xml><?xml version="1.0" encoding="utf-8"?>
-<p:properties xmlns:p="http://schemas.microsoft.com/office/2006/metadata/properties" xmlns:xsi="http://www.w3.org/2001/XMLSchema-instance" xmlns:pc="http://schemas.microsoft.com/office/infopath/2007/PartnerControls">
-  <documentManagement/>
-</p:properties>
-</file>
-
-<file path=customXml/item2.xml><?xml version="1.0" encoding="utf-8"?>
-<?mso-contentType ?>
-<FormTemplates xmlns="http://schemas.microsoft.com/sharepoint/v3/contenttype/forms">
-  <Display>DocumentLibraryForm</Display>
-  <Edit>DocumentLibraryForm</Edit>
-  <New>DocumentLibraryForm</New>
-</FormTemplates>
-</file>
-
-<file path=customXml/item3.xml><?xml version="1.0" encoding="utf-8"?>
 <ct:contentTypeSchema xmlns:ct="http://schemas.microsoft.com/office/2006/metadata/contentType" xmlns:ma="http://schemas.microsoft.com/office/2006/metadata/properties/metaAttributes" ct:_="" ma:_="" ma:contentTypeName="Dokument" ma:contentTypeID="0x0101004E8DCD7061C9614189F6D0F57B1C8645" ma:contentTypeVersion="9" ma:contentTypeDescription="Opprett et nytt dokument." ma:contentTypeScope="" ma:versionID="d59b8845ebd1283ad3bf6a548e8d2471">
   <xsd:schema xmlns:xsd="http://www.w3.org/2001/XMLSchema" xmlns:xs="http://www.w3.org/2001/XMLSchema" xmlns:p="http://schemas.microsoft.com/office/2006/metadata/properties" xmlns:ns3="077b9b9c-7f67-45a8-98b7-b654137cbace" targetNamespace="http://schemas.microsoft.com/office/2006/metadata/properties" ma:root="true" ma:fieldsID="972a228023c3d388b754ae5803fd6dc7" ns3:_="">
     <xsd:import namespace="077b9b9c-7f67-45a8-98b7-b654137cbace"/>
@@ -26937,31 +27112,22 @@
 </ct:contentTypeSchema>
 </file>
 
-<file path=customXml/itemProps1.xml><?xml version="1.0" encoding="utf-8"?>
-<ds:datastoreItem xmlns:ds="http://schemas.openxmlformats.org/officeDocument/2006/customXml" ds:itemID="{7DEC415D-4AD5-4872-9DD1-7B94914CAE4D}">
-  <ds:schemaRefs>
-    <ds:schemaRef ds:uri="http://purl.org/dc/elements/1.1/"/>
-    <ds:schemaRef ds:uri="http://schemas.microsoft.com/office/2006/metadata/properties"/>
-    <ds:schemaRef ds:uri="http://schemas.microsoft.com/office/2006/documentManagement/types"/>
-    <ds:schemaRef ds:uri="http://schemas.openxmlformats.org/package/2006/metadata/core-properties"/>
-    <ds:schemaRef ds:uri="077b9b9c-7f67-45a8-98b7-b654137cbace"/>
-    <ds:schemaRef ds:uri="http://purl.org/dc/dcmitype/"/>
-    <ds:schemaRef ds:uri="http://schemas.microsoft.com/office/infopath/2007/PartnerControls"/>
-    <ds:schemaRef ds:uri="http://www.w3.org/XML/1998/namespace"/>
-    <ds:schemaRef ds:uri="http://purl.org/dc/terms/"/>
-  </ds:schemaRefs>
-</ds:datastoreItem>
+<file path=customXml/item2.xml><?xml version="1.0" encoding="utf-8"?>
+<?mso-contentType ?>
+<FormTemplates xmlns="http://schemas.microsoft.com/sharepoint/v3/contenttype/forms">
+  <Display>DocumentLibraryForm</Display>
+  <Edit>DocumentLibraryForm</Edit>
+  <New>DocumentLibraryForm</New>
+</FormTemplates>
 </file>
 
-<file path=customXml/itemProps2.xml><?xml version="1.0" encoding="utf-8"?>
-<ds:datastoreItem xmlns:ds="http://schemas.openxmlformats.org/officeDocument/2006/customXml" ds:itemID="{4BE7E9B0-0351-4956-BF80-844462B099ED}">
-  <ds:schemaRefs>
-    <ds:schemaRef ds:uri="http://schemas.microsoft.com/sharepoint/v3/contenttype/forms"/>
-  </ds:schemaRefs>
-</ds:datastoreItem>
+<file path=customXml/item3.xml><?xml version="1.0" encoding="utf-8"?>
+<p:properties xmlns:p="http://schemas.microsoft.com/office/2006/metadata/properties" xmlns:xsi="http://www.w3.org/2001/XMLSchema-instance" xmlns:pc="http://schemas.microsoft.com/office/infopath/2007/PartnerControls">
+  <documentManagement/>
+</p:properties>
 </file>
 
-<file path=customXml/itemProps3.xml><?xml version="1.0" encoding="utf-8"?>
+<file path=customXml/itemProps1.xml><?xml version="1.0" encoding="utf-8"?>
 <ds:datastoreItem xmlns:ds="http://schemas.openxmlformats.org/officeDocument/2006/customXml" ds:itemID="{A3A0C07D-31B7-4057-9C9C-1ED42245A98F}">
   <ds:schemaRefs>
     <ds:schemaRef ds:uri="http://schemas.microsoft.com/office/2006/metadata/contentType"/>
@@ -26977,4 +27143,28 @@
     <ds:schemaRef ds:uri="http://schemas.microsoft.com/internal/obd"/>
   </ds:schemaRefs>
 </ds:datastoreItem>
+</file>
+
+<file path=customXml/itemProps2.xml><?xml version="1.0" encoding="utf-8"?>
+<ds:datastoreItem xmlns:ds="http://schemas.openxmlformats.org/officeDocument/2006/customXml" ds:itemID="{4BE7E9B0-0351-4956-BF80-844462B099ED}">
+  <ds:schemaRefs>
+    <ds:schemaRef ds:uri="http://schemas.microsoft.com/sharepoint/v3/contenttype/forms"/>
+  </ds:schemaRefs>
+</ds:datastoreItem>
+</file>
+
+<file path=customXml/itemProps3.xml><?xml version="1.0" encoding="utf-8"?>
+<ds:datastoreItem xmlns:ds="http://schemas.openxmlformats.org/officeDocument/2006/customXml" ds:itemID="{7DEC415D-4AD5-4872-9DD1-7B94914CAE4D}">
+  <ds:schemaRefs>
+    <ds:schemaRef ds:uri="http://purl.org/dc/elements/1.1/"/>
+    <ds:schemaRef ds:uri="http://schemas.microsoft.com/office/2006/metadata/properties"/>
+    <ds:schemaRef ds:uri="http://schemas.microsoft.com/office/2006/documentManagement/types"/>
+    <ds:schemaRef ds:uri="http://schemas.openxmlformats.org/package/2006/metadata/core-properties"/>
+    <ds:schemaRef ds:uri="077b9b9c-7f67-45a8-98b7-b654137cbace"/>
+    <ds:schemaRef ds:uri="http://purl.org/dc/dcmitype/"/>
+    <ds:schemaRef ds:uri="http://schemas.microsoft.com/office/infopath/2007/PartnerControls"/>
+    <ds:schemaRef ds:uri="http://www.w3.org/XML/1998/namespace"/>
+    <ds:schemaRef ds:uri="http://purl.org/dc/terms/"/>
+  </ds:schemaRefs>
+</ds:datastoreItem>
 </file>
</xml_diff>